<commit_message>
Presentation slides complete draft with notes
</commit_message>
<xml_diff>
--- a/presentation/presentation.pptx
+++ b/presentation/presentation.pptx
@@ -5,7 +5,7 @@
     <p:sldMasterId id="2147483648" r:id="rId1"/>
   </p:sldMasterIdLst>
   <p:notesMasterIdLst>
-    <p:notesMasterId r:id="rId10"/>
+    <p:notesMasterId r:id="rId15"/>
   </p:notesMasterIdLst>
   <p:sldIdLst>
     <p:sldId id="256" r:id="rId2"/>
@@ -15,7 +15,12 @@
     <p:sldId id="260" r:id="rId6"/>
     <p:sldId id="262" r:id="rId7"/>
     <p:sldId id="263" r:id="rId8"/>
-    <p:sldId id="264" r:id="rId9"/>
+    <p:sldId id="265" r:id="rId9"/>
+    <p:sldId id="266" r:id="rId10"/>
+    <p:sldId id="267" r:id="rId11"/>
+    <p:sldId id="268" r:id="rId12"/>
+    <p:sldId id="271" r:id="rId13"/>
+    <p:sldId id="270" r:id="rId14"/>
   </p:sldIdLst>
   <p:sldSz cx="12192000" cy="6858000"/>
   <p:notesSz cx="6858000" cy="9144000"/>
@@ -204,7 +209,7 @@
           <a:p>
             <a:fld id="{D5D123B1-4E28-4CA6-A937-646E6B2B1E96}" type="datetimeFigureOut">
               <a:rPr lang="en-US" smtClean="0"/>
-              <a:t>10/22/2018</a:t>
+              <a:t>10/23/2018</a:t>
             </a:fld>
             <a:endParaRPr lang="en-US"/>
           </a:p>
@@ -471,6 +476,962 @@
 </p:notesMaster>
 </file>
 
+<file path=ppt/notesSlides/notesSlide1.xml><?xml version="1.0" encoding="utf-8"?>
+<p:notes xmlns:a="http://schemas.openxmlformats.org/drawingml/2006/main" xmlns:r="http://schemas.openxmlformats.org/officeDocument/2006/relationships" xmlns:p="http://schemas.openxmlformats.org/presentationml/2006/main">
+  <p:cSld>
+    <p:spTree>
+      <p:nvGrpSpPr>
+        <p:cNvPr id="1" name=""/>
+        <p:cNvGrpSpPr/>
+        <p:nvPr/>
+      </p:nvGrpSpPr>
+      <p:grpSpPr>
+        <a:xfrm>
+          <a:off x="0" y="0"/>
+          <a:ext cx="0" cy="0"/>
+          <a:chOff x="0" y="0"/>
+          <a:chExt cx="0" cy="0"/>
+        </a:xfrm>
+      </p:grpSpPr>
+      <p:sp>
+        <p:nvSpPr>
+          <p:cNvPr id="2" name="Slide Image Placeholder 1"/>
+          <p:cNvSpPr>
+            <a:spLocks noGrp="1" noRot="1" noChangeAspect="1"/>
+          </p:cNvSpPr>
+          <p:nvPr>
+            <p:ph type="sldImg"/>
+          </p:nvPr>
+        </p:nvSpPr>
+        <p:spPr/>
+      </p:sp>
+      <p:sp>
+        <p:nvSpPr>
+          <p:cNvPr id="3" name="Notes Placeholder 2"/>
+          <p:cNvSpPr>
+            <a:spLocks noGrp="1"/>
+          </p:cNvSpPr>
+          <p:nvPr>
+            <p:ph type="body" idx="1"/>
+          </p:nvPr>
+        </p:nvSpPr>
+        <p:spPr/>
+        <p:txBody>
+          <a:bodyPr/>
+          <a:lstStyle/>
+          <a:p>
+            <a:endParaRPr lang="en-US" dirty="0"/>
+          </a:p>
+        </p:txBody>
+      </p:sp>
+      <p:sp>
+        <p:nvSpPr>
+          <p:cNvPr id="4" name="Slide Number Placeholder 3"/>
+          <p:cNvSpPr>
+            <a:spLocks noGrp="1"/>
+          </p:cNvSpPr>
+          <p:nvPr>
+            <p:ph type="sldNum" sz="quarter" idx="5"/>
+          </p:nvPr>
+        </p:nvSpPr>
+        <p:spPr/>
+        <p:txBody>
+          <a:bodyPr/>
+          <a:lstStyle/>
+          <a:p>
+            <a:fld id="{C0AE9E3C-4D80-4F32-8BE5-275D74EA0A70}" type="slidenum">
+              <a:rPr lang="en-US" smtClean="0"/>
+              <a:t>2</a:t>
+            </a:fld>
+            <a:endParaRPr lang="en-US"/>
+          </a:p>
+        </p:txBody>
+      </p:sp>
+    </p:spTree>
+    <p:extLst>
+      <p:ext uri="{BB962C8B-B14F-4D97-AF65-F5344CB8AC3E}">
+        <p14:creationId xmlns:p14="http://schemas.microsoft.com/office/powerpoint/2010/main" val="2507116004"/>
+      </p:ext>
+    </p:extLst>
+  </p:cSld>
+  <p:clrMapOvr>
+    <a:masterClrMapping/>
+  </p:clrMapOvr>
+</p:notes>
+</file>
+
+<file path=ppt/notesSlides/notesSlide2.xml><?xml version="1.0" encoding="utf-8"?>
+<p:notes xmlns:a="http://schemas.openxmlformats.org/drawingml/2006/main" xmlns:r="http://schemas.openxmlformats.org/officeDocument/2006/relationships" xmlns:p="http://schemas.openxmlformats.org/presentationml/2006/main">
+  <p:cSld>
+    <p:spTree>
+      <p:nvGrpSpPr>
+        <p:cNvPr id="1" name=""/>
+        <p:cNvGrpSpPr/>
+        <p:nvPr/>
+      </p:nvGrpSpPr>
+      <p:grpSpPr>
+        <a:xfrm>
+          <a:off x="0" y="0"/>
+          <a:ext cx="0" cy="0"/>
+          <a:chOff x="0" y="0"/>
+          <a:chExt cx="0" cy="0"/>
+        </a:xfrm>
+      </p:grpSpPr>
+      <p:sp>
+        <p:nvSpPr>
+          <p:cNvPr id="2" name="Slide Image Placeholder 1"/>
+          <p:cNvSpPr>
+            <a:spLocks noGrp="1" noRot="1" noChangeAspect="1"/>
+          </p:cNvSpPr>
+          <p:nvPr>
+            <p:ph type="sldImg"/>
+          </p:nvPr>
+        </p:nvSpPr>
+        <p:spPr/>
+      </p:sp>
+      <p:sp>
+        <p:nvSpPr>
+          <p:cNvPr id="3" name="Notes Placeholder 2"/>
+          <p:cNvSpPr>
+            <a:spLocks noGrp="1"/>
+          </p:cNvSpPr>
+          <p:nvPr>
+            <p:ph type="body" idx="1"/>
+          </p:nvPr>
+        </p:nvSpPr>
+        <p:spPr/>
+        <p:txBody>
+          <a:bodyPr/>
+          <a:lstStyle/>
+          <a:p>
+            <a:r>
+              <a:rPr lang="en-US" dirty="0"/>
+              <a:t>To motivate the project, suppose we wish to solve some PDEs.</a:t>
+            </a:r>
+          </a:p>
+          <a:p>
+            <a:endParaRPr lang="en-US" dirty="0"/>
+          </a:p>
+          <a:p>
+            <a:r>
+              <a:rPr lang="en-US" dirty="0"/>
+              <a:t>Solving PDEs is hard.  But if we are lucky, we can transform it into an ODE, which is easier to solve. After obtaining the solution to the ODE, we can then use the inverse transform to turn it into the solution to the PDE.</a:t>
+            </a:r>
+          </a:p>
+          <a:p>
+            <a:endParaRPr lang="en-US" dirty="0"/>
+          </a:p>
+          <a:p>
+            <a:pPr marL="0" marR="0" lvl="0" indent="0" algn="l" defTabSz="914400" rtl="0" eaLnBrk="1" fontAlgn="auto" latinLnBrk="0" hangingPunct="1">
+              <a:lnSpc>
+                <a:spcPct val="100000"/>
+              </a:lnSpc>
+              <a:spcBef>
+                <a:spcPts val="0"/>
+              </a:spcBef>
+              <a:spcAft>
+                <a:spcPts val="0"/>
+              </a:spcAft>
+              <a:buClrTx/>
+              <a:buSzTx/>
+              <a:buFontTx/>
+              <a:buNone/>
+              <a:tabLst/>
+              <a:defRPr/>
+            </a:pPr>
+            <a:r>
+              <a:rPr lang="en-US" dirty="0"/>
+              <a:t>But most of the times we are unlucky.</a:t>
+            </a:r>
+          </a:p>
+        </p:txBody>
+      </p:sp>
+      <p:sp>
+        <p:nvSpPr>
+          <p:cNvPr id="4" name="Slide Number Placeholder 3"/>
+          <p:cNvSpPr>
+            <a:spLocks noGrp="1"/>
+          </p:cNvSpPr>
+          <p:nvPr>
+            <p:ph type="sldNum" sz="quarter" idx="5"/>
+          </p:nvPr>
+        </p:nvSpPr>
+        <p:spPr/>
+        <p:txBody>
+          <a:bodyPr/>
+          <a:lstStyle/>
+          <a:p>
+            <a:fld id="{C0AE9E3C-4D80-4F32-8BE5-275D74EA0A70}" type="slidenum">
+              <a:rPr lang="en-US" smtClean="0"/>
+              <a:t>5</a:t>
+            </a:fld>
+            <a:endParaRPr lang="en-US"/>
+          </a:p>
+        </p:txBody>
+      </p:sp>
+    </p:spTree>
+    <p:extLst>
+      <p:ext uri="{BB962C8B-B14F-4D97-AF65-F5344CB8AC3E}">
+        <p14:creationId xmlns:p14="http://schemas.microsoft.com/office/powerpoint/2010/main" val="2083536631"/>
+      </p:ext>
+    </p:extLst>
+  </p:cSld>
+  <p:clrMapOvr>
+    <a:masterClrMapping/>
+  </p:clrMapOvr>
+</p:notes>
+</file>
+
+<file path=ppt/notesSlides/notesSlide3.xml><?xml version="1.0" encoding="utf-8"?>
+<p:notes xmlns:a="http://schemas.openxmlformats.org/drawingml/2006/main" xmlns:r="http://schemas.openxmlformats.org/officeDocument/2006/relationships" xmlns:p="http://schemas.openxmlformats.org/presentationml/2006/main">
+  <p:cSld>
+    <p:spTree>
+      <p:nvGrpSpPr>
+        <p:cNvPr id="1" name=""/>
+        <p:cNvGrpSpPr/>
+        <p:nvPr/>
+      </p:nvGrpSpPr>
+      <p:grpSpPr>
+        <a:xfrm>
+          <a:off x="0" y="0"/>
+          <a:ext cx="0" cy="0"/>
+          <a:chOff x="0" y="0"/>
+          <a:chExt cx="0" cy="0"/>
+        </a:xfrm>
+      </p:grpSpPr>
+      <p:sp>
+        <p:nvSpPr>
+          <p:cNvPr id="2" name="Slide Image Placeholder 1"/>
+          <p:cNvSpPr>
+            <a:spLocks noGrp="1" noRot="1" noChangeAspect="1"/>
+          </p:cNvSpPr>
+          <p:nvPr>
+            <p:ph type="sldImg"/>
+          </p:nvPr>
+        </p:nvSpPr>
+        <p:spPr/>
+      </p:sp>
+      <p:sp>
+        <p:nvSpPr>
+          <p:cNvPr id="3" name="Notes Placeholder 2"/>
+          <p:cNvSpPr>
+            <a:spLocks noGrp="1"/>
+          </p:cNvSpPr>
+          <p:nvPr>
+            <p:ph type="body" idx="1"/>
+          </p:nvPr>
+        </p:nvSpPr>
+        <p:spPr/>
+        <p:txBody>
+          <a:bodyPr/>
+          <a:lstStyle/>
+          <a:p>
+            <a:r>
+              <a:rPr lang="en-US" dirty="0"/>
+              <a:t>And when we are unlucky, we have to resort to finding some ad-hoc methods to solve it. </a:t>
+            </a:r>
+          </a:p>
+          <a:p>
+            <a:endParaRPr lang="en-US" dirty="0"/>
+          </a:p>
+          <a:p>
+            <a:r>
+              <a:rPr lang="en-US" dirty="0"/>
+              <a:t>Methods found this way typically only work for the problem at hand and cannot be generalized to related problems with different parameters.</a:t>
+            </a:r>
+          </a:p>
+        </p:txBody>
+      </p:sp>
+      <p:sp>
+        <p:nvSpPr>
+          <p:cNvPr id="4" name="Slide Number Placeholder 3"/>
+          <p:cNvSpPr>
+            <a:spLocks noGrp="1"/>
+          </p:cNvSpPr>
+          <p:nvPr>
+            <p:ph type="sldNum" sz="quarter" idx="5"/>
+          </p:nvPr>
+        </p:nvSpPr>
+        <p:spPr/>
+        <p:txBody>
+          <a:bodyPr/>
+          <a:lstStyle/>
+          <a:p>
+            <a:fld id="{C0AE9E3C-4D80-4F32-8BE5-275D74EA0A70}" type="slidenum">
+              <a:rPr lang="en-US" smtClean="0"/>
+              <a:t>6</a:t>
+            </a:fld>
+            <a:endParaRPr lang="en-US"/>
+          </a:p>
+        </p:txBody>
+      </p:sp>
+    </p:spTree>
+    <p:extLst>
+      <p:ext uri="{BB962C8B-B14F-4D97-AF65-F5344CB8AC3E}">
+        <p14:creationId xmlns:p14="http://schemas.microsoft.com/office/powerpoint/2010/main" val="1829186300"/>
+      </p:ext>
+    </p:extLst>
+  </p:cSld>
+  <p:clrMapOvr>
+    <a:masterClrMapping/>
+  </p:clrMapOvr>
+</p:notes>
+</file>
+
+<file path=ppt/notesSlides/notesSlide4.xml><?xml version="1.0" encoding="utf-8"?>
+<p:notes xmlns:a="http://schemas.openxmlformats.org/drawingml/2006/main" xmlns:r="http://schemas.openxmlformats.org/officeDocument/2006/relationships" xmlns:p="http://schemas.openxmlformats.org/presentationml/2006/main">
+  <p:cSld>
+    <p:spTree>
+      <p:nvGrpSpPr>
+        <p:cNvPr id="1" name=""/>
+        <p:cNvGrpSpPr/>
+        <p:nvPr/>
+      </p:nvGrpSpPr>
+      <p:grpSpPr>
+        <a:xfrm>
+          <a:off x="0" y="0"/>
+          <a:ext cx="0" cy="0"/>
+          <a:chOff x="0" y="0"/>
+          <a:chExt cx="0" cy="0"/>
+        </a:xfrm>
+      </p:grpSpPr>
+      <p:sp>
+        <p:nvSpPr>
+          <p:cNvPr id="2" name="Slide Image Placeholder 1"/>
+          <p:cNvSpPr>
+            <a:spLocks noGrp="1" noRot="1" noChangeAspect="1"/>
+          </p:cNvSpPr>
+          <p:nvPr>
+            <p:ph type="sldImg"/>
+          </p:nvPr>
+        </p:nvSpPr>
+        <p:spPr/>
+      </p:sp>
+      <p:sp>
+        <p:nvSpPr>
+          <p:cNvPr id="3" name="Notes Placeholder 2"/>
+          <p:cNvSpPr>
+            <a:spLocks noGrp="1"/>
+          </p:cNvSpPr>
+          <p:nvPr>
+            <p:ph type="body" idx="1"/>
+          </p:nvPr>
+        </p:nvSpPr>
+        <p:spPr/>
+        <p:txBody>
+          <a:bodyPr/>
+          <a:lstStyle/>
+          <a:p>
+            <a:pPr marL="0" marR="0" lvl="0" indent="0" algn="l" defTabSz="914400" rtl="0" eaLnBrk="1" fontAlgn="auto" latinLnBrk="0" hangingPunct="1">
+              <a:lnSpc>
+                <a:spcPct val="100000"/>
+              </a:lnSpc>
+              <a:spcBef>
+                <a:spcPts val="0"/>
+              </a:spcBef>
+              <a:spcAft>
+                <a:spcPts val="0"/>
+              </a:spcAft>
+              <a:buClrTx/>
+              <a:buSzTx/>
+              <a:buFontTx/>
+              <a:buNone/>
+              <a:tabLst/>
+              <a:defRPr/>
+            </a:pPr>
+            <a:r>
+              <a:rPr lang="en-US" dirty="0"/>
+              <a:t>The </a:t>
+            </a:r>
+            <a:r>
+              <a:rPr lang="en-US" dirty="0" err="1"/>
+              <a:t>Fokas</a:t>
+            </a:r>
+            <a:r>
+              <a:rPr lang="en-US" dirty="0"/>
+              <a:t> method makes this diagram possible for an entire class of PDEs. </a:t>
+            </a:r>
+          </a:p>
+          <a:p>
+            <a:pPr marL="0" marR="0" lvl="0" indent="0" algn="l" defTabSz="914400" rtl="0" eaLnBrk="1" fontAlgn="auto" latinLnBrk="0" hangingPunct="1">
+              <a:lnSpc>
+                <a:spcPct val="100000"/>
+              </a:lnSpc>
+              <a:spcBef>
+                <a:spcPts val="0"/>
+              </a:spcBef>
+              <a:spcAft>
+                <a:spcPts val="0"/>
+              </a:spcAft>
+              <a:buClrTx/>
+              <a:buSzTx/>
+              <a:buFontTx/>
+              <a:buNone/>
+              <a:tabLst/>
+              <a:defRPr/>
+            </a:pPr>
+            <a:endParaRPr lang="en-US" dirty="0"/>
+          </a:p>
+          <a:p>
+            <a:pPr marL="0" marR="0" lvl="0" indent="0" algn="l" defTabSz="914400" rtl="0" eaLnBrk="1" fontAlgn="auto" latinLnBrk="0" hangingPunct="1">
+              <a:lnSpc>
+                <a:spcPct val="100000"/>
+              </a:lnSpc>
+              <a:spcBef>
+                <a:spcPts val="0"/>
+              </a:spcBef>
+              <a:spcAft>
+                <a:spcPts val="0"/>
+              </a:spcAft>
+              <a:buClrTx/>
+              <a:buSzTx/>
+              <a:buFontTx/>
+              <a:buNone/>
+              <a:tabLst/>
+              <a:defRPr/>
+            </a:pPr>
+            <a:r>
+              <a:rPr lang="en-US" dirty="0"/>
+              <a:t>The key idea of the </a:t>
+            </a:r>
+            <a:r>
+              <a:rPr lang="en-US" dirty="0" err="1"/>
+              <a:t>Fokas</a:t>
+            </a:r>
+            <a:r>
+              <a:rPr lang="en-US" dirty="0"/>
+              <a:t> method is to construct appropriate transform pairs based on the problem’s parameters (e.g., order of the PDE, boundary conditions). </a:t>
+            </a:r>
+          </a:p>
+          <a:p>
+            <a:pPr marL="0" marR="0" lvl="0" indent="0" algn="l" defTabSz="914400" rtl="0" eaLnBrk="1" fontAlgn="auto" latinLnBrk="0" hangingPunct="1">
+              <a:lnSpc>
+                <a:spcPct val="100000"/>
+              </a:lnSpc>
+              <a:spcBef>
+                <a:spcPts val="0"/>
+              </a:spcBef>
+              <a:spcAft>
+                <a:spcPts val="0"/>
+              </a:spcAft>
+              <a:buClrTx/>
+              <a:buSzTx/>
+              <a:buFontTx/>
+              <a:buNone/>
+              <a:tabLst/>
+              <a:defRPr/>
+            </a:pPr>
+            <a:endParaRPr lang="en-US" dirty="0"/>
+          </a:p>
+          <a:p>
+            <a:pPr marL="0" marR="0" lvl="0" indent="0" algn="l" defTabSz="914400" rtl="0" eaLnBrk="1" fontAlgn="auto" latinLnBrk="0" hangingPunct="1">
+              <a:lnSpc>
+                <a:spcPct val="100000"/>
+              </a:lnSpc>
+              <a:spcBef>
+                <a:spcPts val="0"/>
+              </a:spcBef>
+              <a:spcAft>
+                <a:spcPts val="0"/>
+              </a:spcAft>
+              <a:buClrTx/>
+              <a:buSzTx/>
+              <a:buFontTx/>
+              <a:buNone/>
+              <a:tabLst/>
+              <a:defRPr/>
+            </a:pPr>
+            <a:r>
+              <a:rPr lang="en-US" dirty="0"/>
+              <a:t>This means that the </a:t>
+            </a:r>
+            <a:r>
+              <a:rPr lang="en-US" dirty="0" err="1"/>
+              <a:t>Fokas</a:t>
+            </a:r>
+            <a:r>
+              <a:rPr lang="en-US" dirty="0"/>
+              <a:t> method can be used to solve a whole class of PDEs with different parameters.</a:t>
+            </a:r>
+          </a:p>
+        </p:txBody>
+      </p:sp>
+      <p:sp>
+        <p:nvSpPr>
+          <p:cNvPr id="4" name="Slide Number Placeholder 3"/>
+          <p:cNvSpPr>
+            <a:spLocks noGrp="1"/>
+          </p:cNvSpPr>
+          <p:nvPr>
+            <p:ph type="sldNum" sz="quarter" idx="5"/>
+          </p:nvPr>
+        </p:nvSpPr>
+        <p:spPr/>
+        <p:txBody>
+          <a:bodyPr/>
+          <a:lstStyle/>
+          <a:p>
+            <a:fld id="{C0AE9E3C-4D80-4F32-8BE5-275D74EA0A70}" type="slidenum">
+              <a:rPr lang="en-US" smtClean="0"/>
+              <a:t>7</a:t>
+            </a:fld>
+            <a:endParaRPr lang="en-US"/>
+          </a:p>
+        </p:txBody>
+      </p:sp>
+    </p:spTree>
+    <p:extLst>
+      <p:ext uri="{BB962C8B-B14F-4D97-AF65-F5344CB8AC3E}">
+        <p14:creationId xmlns:p14="http://schemas.microsoft.com/office/powerpoint/2010/main" val="605465584"/>
+      </p:ext>
+    </p:extLst>
+  </p:cSld>
+  <p:clrMapOvr>
+    <a:masterClrMapping/>
+  </p:clrMapOvr>
+</p:notes>
+</file>
+
+<file path=ppt/notesSlides/notesSlide5.xml><?xml version="1.0" encoding="utf-8"?>
+<p:notes xmlns:a="http://schemas.openxmlformats.org/drawingml/2006/main" xmlns:r="http://schemas.openxmlformats.org/officeDocument/2006/relationships" xmlns:p="http://schemas.openxmlformats.org/presentationml/2006/main">
+  <p:cSld>
+    <p:spTree>
+      <p:nvGrpSpPr>
+        <p:cNvPr id="1" name=""/>
+        <p:cNvGrpSpPr/>
+        <p:nvPr/>
+      </p:nvGrpSpPr>
+      <p:grpSpPr>
+        <a:xfrm>
+          <a:off x="0" y="0"/>
+          <a:ext cx="0" cy="0"/>
+          <a:chOff x="0" y="0"/>
+          <a:chExt cx="0" cy="0"/>
+        </a:xfrm>
+      </p:grpSpPr>
+      <p:sp>
+        <p:nvSpPr>
+          <p:cNvPr id="2" name="Slide Image Placeholder 1"/>
+          <p:cNvSpPr>
+            <a:spLocks noGrp="1" noRot="1" noChangeAspect="1"/>
+          </p:cNvSpPr>
+          <p:nvPr>
+            <p:ph type="sldImg"/>
+          </p:nvPr>
+        </p:nvSpPr>
+        <p:spPr/>
+      </p:sp>
+      <p:sp>
+        <p:nvSpPr>
+          <p:cNvPr id="3" name="Notes Placeholder 2"/>
+          <p:cNvSpPr>
+            <a:spLocks noGrp="1"/>
+          </p:cNvSpPr>
+          <p:nvPr>
+            <p:ph type="body" idx="1"/>
+          </p:nvPr>
+        </p:nvSpPr>
+        <p:spPr/>
+        <p:txBody>
+          <a:bodyPr/>
+          <a:lstStyle/>
+          <a:p>
+            <a:r>
+              <a:rPr lang="en-US" dirty="0"/>
+              <a:t>The </a:t>
+            </a:r>
+            <a:r>
+              <a:rPr lang="en-US" dirty="0" err="1"/>
+              <a:t>Fokas</a:t>
+            </a:r>
+            <a:r>
+              <a:rPr lang="en-US" dirty="0"/>
+              <a:t> method provides a way to solve many PDEs algorithmically, which means that for this class of PDEs, we know for sure that the </a:t>
+            </a:r>
+            <a:r>
+              <a:rPr lang="en-US" dirty="0" err="1"/>
+              <a:t>Fokas</a:t>
+            </a:r>
+            <a:r>
+              <a:rPr lang="en-US" dirty="0"/>
+              <a:t> method will produce the correct solutions.</a:t>
+            </a:r>
+          </a:p>
+        </p:txBody>
+      </p:sp>
+      <p:sp>
+        <p:nvSpPr>
+          <p:cNvPr id="4" name="Slide Number Placeholder 3"/>
+          <p:cNvSpPr>
+            <a:spLocks noGrp="1"/>
+          </p:cNvSpPr>
+          <p:nvPr>
+            <p:ph type="sldNum" sz="quarter" idx="5"/>
+          </p:nvPr>
+        </p:nvSpPr>
+        <p:spPr/>
+        <p:txBody>
+          <a:bodyPr/>
+          <a:lstStyle/>
+          <a:p>
+            <a:fld id="{C0AE9E3C-4D80-4F32-8BE5-275D74EA0A70}" type="slidenum">
+              <a:rPr lang="en-US" smtClean="0"/>
+              <a:t>9</a:t>
+            </a:fld>
+            <a:endParaRPr lang="en-US"/>
+          </a:p>
+        </p:txBody>
+      </p:sp>
+    </p:spTree>
+    <p:extLst>
+      <p:ext uri="{BB962C8B-B14F-4D97-AF65-F5344CB8AC3E}">
+        <p14:creationId xmlns:p14="http://schemas.microsoft.com/office/powerpoint/2010/main" val="2992381512"/>
+      </p:ext>
+    </p:extLst>
+  </p:cSld>
+  <p:clrMapOvr>
+    <a:masterClrMapping/>
+  </p:clrMapOvr>
+</p:notes>
+</file>
+
+<file path=ppt/notesSlides/notesSlide6.xml><?xml version="1.0" encoding="utf-8"?>
+<p:notes xmlns:a="http://schemas.openxmlformats.org/drawingml/2006/main" xmlns:r="http://schemas.openxmlformats.org/officeDocument/2006/relationships" xmlns:p="http://schemas.openxmlformats.org/presentationml/2006/main">
+  <p:cSld>
+    <p:spTree>
+      <p:nvGrpSpPr>
+        <p:cNvPr id="1" name=""/>
+        <p:cNvGrpSpPr/>
+        <p:nvPr/>
+      </p:nvGrpSpPr>
+      <p:grpSpPr>
+        <a:xfrm>
+          <a:off x="0" y="0"/>
+          <a:ext cx="0" cy="0"/>
+          <a:chOff x="0" y="0"/>
+          <a:chExt cx="0" cy="0"/>
+        </a:xfrm>
+      </p:grpSpPr>
+      <p:sp>
+        <p:nvSpPr>
+          <p:cNvPr id="2" name="Slide Image Placeholder 1"/>
+          <p:cNvSpPr>
+            <a:spLocks noGrp="1" noRot="1" noChangeAspect="1"/>
+          </p:cNvSpPr>
+          <p:nvPr>
+            <p:ph type="sldImg"/>
+          </p:nvPr>
+        </p:nvSpPr>
+        <p:spPr/>
+      </p:sp>
+      <p:sp>
+        <p:nvSpPr>
+          <p:cNvPr id="3" name="Notes Placeholder 2"/>
+          <p:cNvSpPr>
+            <a:spLocks noGrp="1"/>
+          </p:cNvSpPr>
+          <p:nvPr>
+            <p:ph type="body" idx="1"/>
+          </p:nvPr>
+        </p:nvSpPr>
+        <p:spPr/>
+        <p:txBody>
+          <a:bodyPr/>
+          <a:lstStyle/>
+          <a:p>
+            <a:pPr marL="0" marR="0" lvl="0" indent="0" algn="l" defTabSz="914400" rtl="0" eaLnBrk="1" fontAlgn="auto" latinLnBrk="0" hangingPunct="1">
+              <a:lnSpc>
+                <a:spcPct val="100000"/>
+              </a:lnSpc>
+              <a:spcBef>
+                <a:spcPts val="0"/>
+              </a:spcBef>
+              <a:spcAft>
+                <a:spcPts val="0"/>
+              </a:spcAft>
+              <a:buClrTx/>
+              <a:buSzTx/>
+              <a:buFontTx/>
+              <a:buNone/>
+              <a:tabLst/>
+              <a:defRPr/>
+            </a:pPr>
+            <a:r>
+              <a:rPr lang="en-US" dirty="0"/>
+              <a:t>Solutions of PDEs usually involve infinite sums and integrals. Having accurate numerical descriptions for the solutions would be helpful in visualizing the solutions.</a:t>
+            </a:r>
+          </a:p>
+        </p:txBody>
+      </p:sp>
+      <p:sp>
+        <p:nvSpPr>
+          <p:cNvPr id="4" name="Slide Number Placeholder 3"/>
+          <p:cNvSpPr>
+            <a:spLocks noGrp="1"/>
+          </p:cNvSpPr>
+          <p:nvPr>
+            <p:ph type="sldNum" sz="quarter" idx="5"/>
+          </p:nvPr>
+        </p:nvSpPr>
+        <p:spPr/>
+        <p:txBody>
+          <a:bodyPr/>
+          <a:lstStyle/>
+          <a:p>
+            <a:fld id="{C0AE9E3C-4D80-4F32-8BE5-275D74EA0A70}" type="slidenum">
+              <a:rPr lang="en-US" smtClean="0"/>
+              <a:t>11</a:t>
+            </a:fld>
+            <a:endParaRPr lang="en-US"/>
+          </a:p>
+        </p:txBody>
+      </p:sp>
+    </p:spTree>
+    <p:extLst>
+      <p:ext uri="{BB962C8B-B14F-4D97-AF65-F5344CB8AC3E}">
+        <p14:creationId xmlns:p14="http://schemas.microsoft.com/office/powerpoint/2010/main" val="1562134030"/>
+      </p:ext>
+    </p:extLst>
+  </p:cSld>
+  <p:clrMapOvr>
+    <a:masterClrMapping/>
+  </p:clrMapOvr>
+</p:notes>
+</file>
+
+<file path=ppt/notesSlides/notesSlide7.xml><?xml version="1.0" encoding="utf-8"?>
+<p:notes xmlns:a="http://schemas.openxmlformats.org/drawingml/2006/main" xmlns:r="http://schemas.openxmlformats.org/officeDocument/2006/relationships" xmlns:p="http://schemas.openxmlformats.org/presentationml/2006/main">
+  <p:cSld>
+    <p:spTree>
+      <p:nvGrpSpPr>
+        <p:cNvPr id="1" name=""/>
+        <p:cNvGrpSpPr/>
+        <p:nvPr/>
+      </p:nvGrpSpPr>
+      <p:grpSpPr>
+        <a:xfrm>
+          <a:off x="0" y="0"/>
+          <a:ext cx="0" cy="0"/>
+          <a:chOff x="0" y="0"/>
+          <a:chExt cx="0" cy="0"/>
+        </a:xfrm>
+      </p:grpSpPr>
+      <p:sp>
+        <p:nvSpPr>
+          <p:cNvPr id="2" name="Slide Image Placeholder 1"/>
+          <p:cNvSpPr>
+            <a:spLocks noGrp="1" noRot="1" noChangeAspect="1"/>
+          </p:cNvSpPr>
+          <p:nvPr>
+            <p:ph type="sldImg"/>
+          </p:nvPr>
+        </p:nvSpPr>
+        <p:spPr/>
+      </p:sp>
+      <p:sp>
+        <p:nvSpPr>
+          <p:cNvPr id="3" name="Notes Placeholder 2"/>
+          <p:cNvSpPr>
+            <a:spLocks noGrp="1"/>
+          </p:cNvSpPr>
+          <p:nvPr>
+            <p:ph type="body" idx="1"/>
+          </p:nvPr>
+        </p:nvSpPr>
+        <p:spPr/>
+        <p:txBody>
+          <a:bodyPr/>
+          <a:lstStyle/>
+          <a:p>
+            <a:pPr marL="0" marR="0" lvl="0" indent="0" algn="l" defTabSz="914400" rtl="0" eaLnBrk="1" fontAlgn="auto" latinLnBrk="0" hangingPunct="1">
+              <a:lnSpc>
+                <a:spcPct val="100000"/>
+              </a:lnSpc>
+              <a:spcBef>
+                <a:spcPts val="0"/>
+              </a:spcBef>
+              <a:spcAft>
+                <a:spcPts val="0"/>
+              </a:spcAft>
+              <a:buClrTx/>
+              <a:buSzTx/>
+              <a:buFontTx/>
+              <a:buNone/>
+              <a:tabLst/>
+              <a:defRPr/>
+            </a:pPr>
+            <a:r>
+              <a:rPr lang="en-US" dirty="0"/>
+              <a:t>Focusing on the primary goal: To complete the diagram, need to have the PDE parameters, the </a:t>
+            </a:r>
+            <a:r>
+              <a:rPr lang="en-US" dirty="0" err="1"/>
+              <a:t>Fokas</a:t>
+            </a:r>
+            <a:r>
+              <a:rPr lang="en-US" dirty="0"/>
+              <a:t> transform pairs, and know how to find the ODE solution.</a:t>
+            </a:r>
+          </a:p>
+          <a:p>
+            <a:pPr marL="0" marR="0" lvl="0" indent="0" algn="l" defTabSz="914400" rtl="0" eaLnBrk="1" fontAlgn="auto" latinLnBrk="0" hangingPunct="1">
+              <a:lnSpc>
+                <a:spcPct val="100000"/>
+              </a:lnSpc>
+              <a:spcBef>
+                <a:spcPts val="0"/>
+              </a:spcBef>
+              <a:spcAft>
+                <a:spcPts val="0"/>
+              </a:spcAft>
+              <a:buClrTx/>
+              <a:buSzTx/>
+              <a:buFontTx/>
+              <a:buNone/>
+              <a:tabLst/>
+              <a:defRPr/>
+            </a:pPr>
+            <a:endParaRPr lang="en-US" dirty="0"/>
+          </a:p>
+          <a:p>
+            <a:pPr marL="228600" marR="0" lvl="0" indent="-228600" algn="l" defTabSz="914400" rtl="0" eaLnBrk="1" fontAlgn="auto" latinLnBrk="0" hangingPunct="1">
+              <a:lnSpc>
+                <a:spcPct val="100000"/>
+              </a:lnSpc>
+              <a:spcBef>
+                <a:spcPts val="0"/>
+              </a:spcBef>
+              <a:spcAft>
+                <a:spcPts val="0"/>
+              </a:spcAft>
+              <a:buClrTx/>
+              <a:buSzTx/>
+              <a:buFontTx/>
+              <a:buAutoNum type="arabicPeriod"/>
+              <a:tabLst/>
+              <a:defRPr/>
+            </a:pPr>
+            <a:r>
+              <a:rPr lang="en-US" dirty="0"/>
+              <a:t>Finished encoding or constructing the PDE parameters needed to find the </a:t>
+            </a:r>
+            <a:r>
+              <a:rPr lang="en-US" dirty="0" err="1"/>
+              <a:t>Fokas</a:t>
+            </a:r>
+            <a:r>
+              <a:rPr lang="en-US" dirty="0"/>
+              <a:t> transform pair. Some parameters can be taken directly from the given problem, some need to be constructed and require more work. But they are now done.</a:t>
+            </a:r>
+          </a:p>
+          <a:p>
+            <a:pPr marL="228600" marR="0" lvl="0" indent="-228600" algn="l" defTabSz="914400" rtl="0" eaLnBrk="1" fontAlgn="auto" latinLnBrk="0" hangingPunct="1">
+              <a:lnSpc>
+                <a:spcPct val="100000"/>
+              </a:lnSpc>
+              <a:spcBef>
+                <a:spcPts val="0"/>
+              </a:spcBef>
+              <a:spcAft>
+                <a:spcPts val="0"/>
+              </a:spcAft>
+              <a:buClrTx/>
+              <a:buSzTx/>
+              <a:buFontTx/>
+              <a:buAutoNum type="arabicPeriod"/>
+              <a:tabLst/>
+              <a:defRPr/>
+            </a:pPr>
+            <a:r>
+              <a:rPr lang="en-US" dirty="0"/>
+              <a:t>Now working on implementing the algorithm to find the appropriate </a:t>
+            </a:r>
+            <a:r>
+              <a:rPr lang="en-US" dirty="0" err="1"/>
+              <a:t>Fokas</a:t>
+            </a:r>
+            <a:r>
+              <a:rPr lang="en-US" dirty="0"/>
+              <a:t> transform pair based on the PDE parameters previously constructed.</a:t>
+            </a:r>
+          </a:p>
+          <a:p>
+            <a:pPr marL="228600" marR="0" lvl="0" indent="-228600" algn="l" defTabSz="914400" rtl="0" eaLnBrk="1" fontAlgn="auto" latinLnBrk="0" hangingPunct="1">
+              <a:lnSpc>
+                <a:spcPct val="100000"/>
+              </a:lnSpc>
+              <a:spcBef>
+                <a:spcPts val="0"/>
+              </a:spcBef>
+              <a:spcAft>
+                <a:spcPts val="0"/>
+              </a:spcAft>
+              <a:buClrTx/>
+              <a:buSzTx/>
+              <a:buFontTx/>
+              <a:buAutoNum type="arabicPeriod"/>
+              <a:tabLst/>
+              <a:defRPr/>
+            </a:pPr>
+            <a:r>
+              <a:rPr lang="en-US" dirty="0"/>
+              <a:t>Last step: Implement the algorithm to solve the ODE resulting form the </a:t>
+            </a:r>
+            <a:r>
+              <a:rPr lang="en-US" dirty="0" err="1"/>
+              <a:t>Fokas</a:t>
+            </a:r>
+            <a:r>
+              <a:rPr lang="en-US" dirty="0"/>
+              <a:t> transform, so that when we apply the inverse </a:t>
+            </a:r>
+            <a:r>
+              <a:rPr lang="en-US" dirty="0" err="1"/>
+              <a:t>Fokas</a:t>
+            </a:r>
+            <a:r>
+              <a:rPr lang="en-US" dirty="0"/>
+              <a:t> transform, we get the PDE solution.</a:t>
+            </a:r>
+          </a:p>
+        </p:txBody>
+      </p:sp>
+      <p:sp>
+        <p:nvSpPr>
+          <p:cNvPr id="4" name="Slide Number Placeholder 3"/>
+          <p:cNvSpPr>
+            <a:spLocks noGrp="1"/>
+          </p:cNvSpPr>
+          <p:nvPr>
+            <p:ph type="sldNum" sz="quarter" idx="5"/>
+          </p:nvPr>
+        </p:nvSpPr>
+        <p:spPr/>
+        <p:txBody>
+          <a:bodyPr/>
+          <a:lstStyle/>
+          <a:p>
+            <a:fld id="{C0AE9E3C-4D80-4F32-8BE5-275D74EA0A70}" type="slidenum">
+              <a:rPr lang="en-US" smtClean="0"/>
+              <a:t>12</a:t>
+            </a:fld>
+            <a:endParaRPr lang="en-US"/>
+          </a:p>
+        </p:txBody>
+      </p:sp>
+    </p:spTree>
+    <p:extLst>
+      <p:ext uri="{BB962C8B-B14F-4D97-AF65-F5344CB8AC3E}">
+        <p14:creationId xmlns:p14="http://schemas.microsoft.com/office/powerpoint/2010/main" val="309454526"/>
+      </p:ext>
+    </p:extLst>
+  </p:cSld>
+  <p:clrMapOvr>
+    <a:masterClrMapping/>
+  </p:clrMapOvr>
+</p:notes>
+</file>
+
 <file path=ppt/slideLayouts/slideLayout1.xml><?xml version="1.0" encoding="utf-8"?>
 <p:sldLayout xmlns:a="http://schemas.openxmlformats.org/drawingml/2006/main" xmlns:r="http://schemas.openxmlformats.org/officeDocument/2006/relationships" xmlns:p="http://schemas.openxmlformats.org/presentationml/2006/main" type="title" preserve="1">
   <p:cSld name="Title Slide">
@@ -618,7 +1579,7 @@
           <a:p>
             <a:fld id="{743D5B1A-E5B9-41B2-A4A4-BC15EE566FEB}" type="datetime1">
               <a:rPr lang="en-US" smtClean="0"/>
-              <a:t>10/22/2018</a:t>
+              <a:t>10/23/2018</a:t>
             </a:fld>
             <a:endParaRPr lang="en-US"/>
           </a:p>
@@ -816,7 +1777,7 @@
           <a:p>
             <a:fld id="{96850174-28E0-4A7F-9A7F-1D3666E9A7E5}" type="datetime1">
               <a:rPr lang="en-US" smtClean="0"/>
-              <a:t>10/22/2018</a:t>
+              <a:t>10/23/2018</a:t>
             </a:fld>
             <a:endParaRPr lang="en-US"/>
           </a:p>
@@ -1024,7 +1985,7 @@
           <a:p>
             <a:fld id="{06C3B4AE-98D8-467E-B13B-BA07FD493EF0}" type="datetime1">
               <a:rPr lang="en-US" smtClean="0"/>
-              <a:t>10/22/2018</a:t>
+              <a:t>10/23/2018</a:t>
             </a:fld>
             <a:endParaRPr lang="en-US"/>
           </a:p>
@@ -1132,11 +2093,17 @@
         </p:nvSpPr>
         <p:spPr/>
         <p:txBody>
-          <a:bodyPr/>
-          <a:lstStyle/>
+          <a:bodyPr>
+            <a:normAutofit/>
+          </a:bodyPr>
+          <a:lstStyle>
+            <a:lvl1pPr>
+              <a:defRPr sz="4000"/>
+            </a:lvl1pPr>
+          </a:lstStyle>
           <a:p>
             <a:r>
-              <a:rPr lang="en-US"/>
+              <a:rPr lang="en-US" dirty="0"/>
               <a:t>Click to edit Master title style</a:t>
             </a:r>
           </a:p>
@@ -1161,39 +2128,52 @@
         <p:spPr/>
         <p:txBody>
           <a:bodyPr/>
-          <a:lstStyle/>
+          <a:lstStyle>
+            <a:lvl2pPr>
+              <a:defRPr sz="2600"/>
+            </a:lvl2pPr>
+            <a:lvl3pPr>
+              <a:defRPr sz="2400"/>
+            </a:lvl3pPr>
+            <a:lvl4pPr>
+              <a:defRPr sz="2200"/>
+            </a:lvl4pPr>
+            <a:lvl5pPr>
+              <a:defRPr sz="2000"/>
+            </a:lvl5pPr>
+          </a:lstStyle>
           <a:p>
             <a:pPr lvl="0"/>
             <a:r>
-              <a:rPr lang="en-US"/>
+              <a:rPr lang="en-US" dirty="0"/>
               <a:t>Edit Master text styles</a:t>
             </a:r>
           </a:p>
           <a:p>
             <a:pPr lvl="1"/>
             <a:r>
-              <a:rPr lang="en-US"/>
+              <a:rPr lang="en-US" dirty="0"/>
               <a:t>Second level</a:t>
             </a:r>
           </a:p>
           <a:p>
             <a:pPr lvl="2"/>
             <a:r>
-              <a:rPr lang="en-US"/>
+              <a:rPr lang="en-US" dirty="0"/>
               <a:t>Third level</a:t>
             </a:r>
           </a:p>
           <a:p>
             <a:pPr lvl="3"/>
             <a:r>
-              <a:rPr lang="en-US"/>
+              <a:rPr lang="en-US" dirty="0"/>
               <a:t>Fourth level</a:t>
             </a:r>
           </a:p>
           <a:p>
             <a:pPr lvl="4"/>
             <a:r>
-              <a:rPr lang="en-US"/>
+              <a:rPr lang="en-US" dirty="0"/>
               <a:t>Fifth level</a:t>
             </a:r>
           </a:p>
@@ -1222,7 +2202,7 @@
           <a:p>
             <a:fld id="{2E8C54B8-8BAA-472C-810E-6899C25BB322}" type="datetime1">
               <a:rPr lang="en-US" smtClean="0"/>
-              <a:t>10/22/2018</a:t>
+              <a:t>10/23/2018</a:t>
             </a:fld>
             <a:endParaRPr lang="en-US"/>
           </a:p>
@@ -1497,7 +2477,7 @@
           <a:p>
             <a:fld id="{CC0D8F71-0E54-4C2D-878F-974D77493300}" type="datetime1">
               <a:rPr lang="en-US" smtClean="0"/>
-              <a:t>10/22/2018</a:t>
+              <a:t>10/23/2018</a:t>
             </a:fld>
             <a:endParaRPr lang="en-US"/>
           </a:p>
@@ -1762,7 +2742,7 @@
           <a:p>
             <a:fld id="{03B724D8-50C5-4155-93C4-91B7560F528B}" type="datetime1">
               <a:rPr lang="en-US" smtClean="0"/>
-              <a:t>10/22/2018</a:t>
+              <a:t>10/23/2018</a:t>
             </a:fld>
             <a:endParaRPr lang="en-US"/>
           </a:p>
@@ -2174,7 +3154,7 @@
           <a:p>
             <a:fld id="{D349CC33-BA31-4C58-BC94-66A1D63C8B76}" type="datetime1">
               <a:rPr lang="en-US" smtClean="0"/>
-              <a:t>10/22/2018</a:t>
+              <a:t>10/23/2018</a:t>
             </a:fld>
             <a:endParaRPr lang="en-US"/>
           </a:p>
@@ -2315,7 +3295,7 @@
           <a:p>
             <a:fld id="{EA0D023E-CC73-4DDA-A566-0E148E9E0CA2}" type="datetime1">
               <a:rPr lang="en-US" smtClean="0"/>
-              <a:t>10/22/2018</a:t>
+              <a:t>10/23/2018</a:t>
             </a:fld>
             <a:endParaRPr lang="en-US"/>
           </a:p>
@@ -2428,7 +3408,7 @@
           <a:p>
             <a:fld id="{0BB7F487-1AB1-462C-9F23-505E165EB2E2}" type="datetime1">
               <a:rPr lang="en-US" smtClean="0"/>
-              <a:t>10/22/2018</a:t>
+              <a:t>10/23/2018</a:t>
             </a:fld>
             <a:endParaRPr lang="en-US"/>
           </a:p>
@@ -2739,7 +3719,7 @@
           <a:p>
             <a:fld id="{BB79D818-7B31-4B18-9D61-17C981FE4C8D}" type="datetime1">
               <a:rPr lang="en-US" smtClean="0"/>
-              <a:t>10/22/2018</a:t>
+              <a:t>10/23/2018</a:t>
             </a:fld>
             <a:endParaRPr lang="en-US"/>
           </a:p>
@@ -3027,7 +4007,7 @@
           <a:p>
             <a:fld id="{31D16347-A1A3-40FD-A0AF-D3C5B64BCF98}" type="datetime1">
               <a:rPr lang="en-US" smtClean="0"/>
-              <a:t>10/22/2018</a:t>
+              <a:t>10/23/2018</a:t>
             </a:fld>
             <a:endParaRPr lang="en-US"/>
           </a:p>
@@ -3268,7 +4248,7 @@
           <a:p>
             <a:fld id="{4690E525-EBCB-416D-B630-9C89D51ABD08}" type="datetime1">
               <a:rPr lang="en-US" smtClean="0"/>
-              <a:t>10/22/2018</a:t>
+              <a:t>10/23/2018</a:t>
             </a:fld>
             <a:endParaRPr lang="en-US"/>
           </a:p>
@@ -3725,14 +4705,14 @@
             </a:br>
             <a:r>
               <a:rPr lang="en-US" sz="4400" dirty="0"/>
-              <a:t>in Julia via </a:t>
+              <a:t>in Julia </a:t>
             </a:r>
             <a:br>
               <a:rPr lang="en-US" sz="4400" dirty="0"/>
             </a:br>
             <a:r>
               <a:rPr lang="en-US" sz="4400" dirty="0"/>
-              <a:t>the </a:t>
+              <a:t>via the </a:t>
             </a:r>
             <a:r>
               <a:rPr lang="en-US" sz="4400" dirty="0" err="1"/>
@@ -3845,6 +4825,1599 @@
 </p:sld>
 </file>
 
+<file path=ppt/slides/slide10.xml><?xml version="1.0" encoding="utf-8"?>
+<p:sld xmlns:a="http://schemas.openxmlformats.org/drawingml/2006/main" xmlns:r="http://schemas.openxmlformats.org/officeDocument/2006/relationships" xmlns:p="http://schemas.openxmlformats.org/presentationml/2006/main">
+  <p:cSld>
+    <p:spTree>
+      <p:nvGrpSpPr>
+        <p:cNvPr id="1" name=""/>
+        <p:cNvGrpSpPr/>
+        <p:nvPr/>
+      </p:nvGrpSpPr>
+      <p:grpSpPr>
+        <a:xfrm>
+          <a:off x="0" y="0"/>
+          <a:ext cx="0" cy="0"/>
+          <a:chOff x="0" y="0"/>
+          <a:chExt cx="0" cy="0"/>
+        </a:xfrm>
+      </p:grpSpPr>
+      <p:sp>
+        <p:nvSpPr>
+          <p:cNvPr id="5" name="Title 4">
+            <a:extLst>
+              <a:ext uri="{FF2B5EF4-FFF2-40B4-BE49-F238E27FC236}">
+                <a16:creationId xmlns:a16="http://schemas.microsoft.com/office/drawing/2014/main" id="{D87C7790-F3D9-4263-9C2E-CAF63CA27E0D}"/>
+              </a:ext>
+            </a:extLst>
+          </p:cNvPr>
+          <p:cNvSpPr>
+            <a:spLocks noGrp="1"/>
+          </p:cNvSpPr>
+          <p:nvPr>
+            <p:ph type="title"/>
+          </p:nvPr>
+        </p:nvSpPr>
+        <p:spPr/>
+        <p:txBody>
+          <a:bodyPr/>
+          <a:lstStyle/>
+          <a:p>
+            <a:r>
+              <a:rPr lang="en-US" dirty="0"/>
+              <a:t>Motivation</a:t>
+            </a:r>
+          </a:p>
+        </p:txBody>
+      </p:sp>
+      <p:sp>
+        <p:nvSpPr>
+          <p:cNvPr id="10" name="Content Placeholder 9">
+            <a:extLst>
+              <a:ext uri="{FF2B5EF4-FFF2-40B4-BE49-F238E27FC236}">
+                <a16:creationId xmlns:a16="http://schemas.microsoft.com/office/drawing/2014/main" id="{2D974DB5-7585-4D10-84BC-3350CEF4DF40}"/>
+              </a:ext>
+            </a:extLst>
+          </p:cNvPr>
+          <p:cNvSpPr>
+            <a:spLocks noGrp="1"/>
+          </p:cNvSpPr>
+          <p:nvPr>
+            <p:ph idx="1"/>
+          </p:nvPr>
+        </p:nvSpPr>
+        <p:spPr/>
+        <p:txBody>
+          <a:bodyPr/>
+          <a:lstStyle/>
+          <a:p>
+            <a:pPr marL="0" indent="0" algn="ctr">
+              <a:buNone/>
+            </a:pPr>
+            <a:r>
+              <a:rPr lang="en-US" dirty="0">
+                <a:solidFill>
+                  <a:schemeClr val="bg1">
+                    <a:lumMod val="65000"/>
+                  </a:schemeClr>
+                </a:solidFill>
+              </a:rPr>
+              <a:t>Goal: Solve many types of PDEs </a:t>
+            </a:r>
+            <a:r>
+              <a:rPr lang="en-US" dirty="0"/>
+              <a:t>correctly</a:t>
+            </a:r>
+            <a:r>
+              <a:rPr lang="en-US" baseline="30000" dirty="0"/>
+              <a:t>1</a:t>
+            </a:r>
+            <a:r>
+              <a:rPr lang="en-US" dirty="0">
+                <a:solidFill>
+                  <a:schemeClr val="bg1">
+                    <a:lumMod val="65000"/>
+                  </a:schemeClr>
+                </a:solidFill>
+              </a:rPr>
+              <a:t> and </a:t>
+            </a:r>
+            <a:r>
+              <a:rPr lang="en-US" dirty="0"/>
+              <a:t>efficiently</a:t>
+            </a:r>
+            <a:r>
+              <a:rPr lang="en-US" baseline="30000" dirty="0"/>
+              <a:t>2</a:t>
+            </a:r>
+          </a:p>
+          <a:p>
+            <a:pPr marL="0" indent="0">
+              <a:buNone/>
+            </a:pPr>
+            <a:endParaRPr lang="en-US" dirty="0">
+              <a:solidFill>
+                <a:schemeClr val="bg1">
+                  <a:lumMod val="65000"/>
+                </a:schemeClr>
+              </a:solidFill>
+            </a:endParaRPr>
+          </a:p>
+          <a:p>
+            <a:pPr marL="0" indent="0">
+              <a:buNone/>
+            </a:pPr>
+            <a:r>
+              <a:rPr lang="en-US" baseline="30000" dirty="0"/>
+              <a:t>1</a:t>
+            </a:r>
+            <a:r>
+              <a:rPr lang="en-US" dirty="0"/>
+              <a:t>The </a:t>
+            </a:r>
+            <a:r>
+              <a:rPr lang="en-US" dirty="0" err="1"/>
+              <a:t>Fokas</a:t>
+            </a:r>
+            <a:r>
+              <a:rPr lang="en-US" dirty="0"/>
+              <a:t> method</a:t>
+            </a:r>
+          </a:p>
+          <a:p>
+            <a:pPr lvl="1"/>
+            <a:r>
+              <a:rPr lang="en-US" dirty="0"/>
+              <a:t>Allows solving an entire class of PDEs algorithmically</a:t>
+            </a:r>
+          </a:p>
+          <a:p>
+            <a:pPr lvl="1"/>
+            <a:r>
+              <a:rPr lang="en-US" dirty="0"/>
+              <a:t>But is still much work if done by hand</a:t>
+            </a:r>
+          </a:p>
+          <a:p>
+            <a:pPr marL="0" indent="0">
+              <a:buNone/>
+            </a:pPr>
+            <a:r>
+              <a:rPr lang="en-US" baseline="30000" dirty="0"/>
+              <a:t>2</a:t>
+            </a:r>
+            <a:r>
+              <a:rPr lang="en-US" dirty="0"/>
+              <a:t>Capstone: Implement the </a:t>
+            </a:r>
+            <a:r>
+              <a:rPr lang="en-US" dirty="0" err="1"/>
+              <a:t>Fokas</a:t>
+            </a:r>
+            <a:r>
+              <a:rPr lang="en-US" dirty="0"/>
+              <a:t> method in Julia</a:t>
+            </a:r>
+          </a:p>
+        </p:txBody>
+      </p:sp>
+      <p:sp>
+        <p:nvSpPr>
+          <p:cNvPr id="4" name="Slide Number Placeholder 3">
+            <a:extLst>
+              <a:ext uri="{FF2B5EF4-FFF2-40B4-BE49-F238E27FC236}">
+                <a16:creationId xmlns:a16="http://schemas.microsoft.com/office/drawing/2014/main" id="{45A39F12-3EB8-413B-B1F3-7E39102F98BD}"/>
+              </a:ext>
+            </a:extLst>
+          </p:cNvPr>
+          <p:cNvSpPr>
+            <a:spLocks noGrp="1"/>
+          </p:cNvSpPr>
+          <p:nvPr>
+            <p:ph type="sldNum" sz="quarter" idx="12"/>
+          </p:nvPr>
+        </p:nvSpPr>
+        <p:spPr/>
+        <p:txBody>
+          <a:bodyPr/>
+          <a:lstStyle/>
+          <a:p>
+            <a:fld id="{F3332EFC-B9C2-4EF3-A733-16B7EBFB30C8}" type="slidenum">
+              <a:rPr lang="en-US" smtClean="0"/>
+              <a:t>10</a:t>
+            </a:fld>
+            <a:endParaRPr lang="en-US"/>
+          </a:p>
+        </p:txBody>
+      </p:sp>
+    </p:spTree>
+    <p:extLst>
+      <p:ext uri="{BB962C8B-B14F-4D97-AF65-F5344CB8AC3E}">
+        <p14:creationId xmlns:p14="http://schemas.microsoft.com/office/powerpoint/2010/main" val="2494550919"/>
+      </p:ext>
+    </p:extLst>
+  </p:cSld>
+  <p:clrMapOvr>
+    <a:masterClrMapping/>
+  </p:clrMapOvr>
+</p:sld>
+</file>
+
+<file path=ppt/slides/slide11.xml><?xml version="1.0" encoding="utf-8"?>
+<p:sld xmlns:a="http://schemas.openxmlformats.org/drawingml/2006/main" xmlns:r="http://schemas.openxmlformats.org/officeDocument/2006/relationships" xmlns:p="http://schemas.openxmlformats.org/presentationml/2006/main">
+  <p:cSld>
+    <p:spTree>
+      <p:nvGrpSpPr>
+        <p:cNvPr id="1" name=""/>
+        <p:cNvGrpSpPr/>
+        <p:nvPr/>
+      </p:nvGrpSpPr>
+      <p:grpSpPr>
+        <a:xfrm>
+          <a:off x="0" y="0"/>
+          <a:ext cx="0" cy="0"/>
+          <a:chOff x="0" y="0"/>
+          <a:chExt cx="0" cy="0"/>
+        </a:xfrm>
+      </p:grpSpPr>
+      <p:sp>
+        <p:nvSpPr>
+          <p:cNvPr id="2" name="Title 1">
+            <a:extLst>
+              <a:ext uri="{FF2B5EF4-FFF2-40B4-BE49-F238E27FC236}">
+                <a16:creationId xmlns:a16="http://schemas.microsoft.com/office/drawing/2014/main" id="{2EB59BB1-CD0A-4244-8DEF-DD3CD08C78A2}"/>
+              </a:ext>
+            </a:extLst>
+          </p:cNvPr>
+          <p:cNvSpPr>
+            <a:spLocks noGrp="1"/>
+          </p:cNvSpPr>
+          <p:nvPr>
+            <p:ph type="title"/>
+          </p:nvPr>
+        </p:nvSpPr>
+        <p:spPr/>
+        <p:txBody>
+          <a:bodyPr/>
+          <a:lstStyle/>
+          <a:p>
+            <a:r>
+              <a:rPr lang="en-US" dirty="0"/>
+              <a:t>Capstone outline</a:t>
+            </a:r>
+          </a:p>
+        </p:txBody>
+      </p:sp>
+      <p:sp>
+        <p:nvSpPr>
+          <p:cNvPr id="3" name="Content Placeholder 2">
+            <a:extLst>
+              <a:ext uri="{FF2B5EF4-FFF2-40B4-BE49-F238E27FC236}">
+                <a16:creationId xmlns:a16="http://schemas.microsoft.com/office/drawing/2014/main" id="{D215A1B0-7E78-4C4C-AF67-5ACD0A22475E}"/>
+              </a:ext>
+            </a:extLst>
+          </p:cNvPr>
+          <p:cNvSpPr>
+            <a:spLocks noGrp="1"/>
+          </p:cNvSpPr>
+          <p:nvPr>
+            <p:ph idx="1"/>
+          </p:nvPr>
+        </p:nvSpPr>
+        <p:spPr/>
+        <p:txBody>
+          <a:bodyPr/>
+          <a:lstStyle/>
+          <a:p>
+            <a:r>
+              <a:rPr lang="en-US" dirty="0"/>
+              <a:t>Goals</a:t>
+            </a:r>
+          </a:p>
+          <a:p>
+            <a:pPr lvl="1"/>
+            <a:r>
+              <a:rPr lang="en-US" b="1" dirty="0"/>
+              <a:t>Primary:</a:t>
+            </a:r>
+            <a:r>
+              <a:rPr lang="en-US" dirty="0"/>
+              <a:t> </a:t>
+            </a:r>
+            <a:r>
+              <a:rPr lang="en-US" b="1" dirty="0"/>
+              <a:t>Implement the </a:t>
+            </a:r>
+            <a:r>
+              <a:rPr lang="en-US" b="1" dirty="0" err="1"/>
+              <a:t>Fokas</a:t>
+            </a:r>
+            <a:r>
+              <a:rPr lang="en-US" b="1" dirty="0"/>
+              <a:t> method </a:t>
+            </a:r>
+            <a:r>
+              <a:rPr lang="en-US" dirty="0"/>
+              <a:t>as a Julia package that allows mathematicians to quickly obtain analytic solutions of complicated PDEs.</a:t>
+            </a:r>
+          </a:p>
+          <a:p>
+            <a:pPr lvl="1"/>
+            <a:r>
+              <a:rPr lang="en-US" b="1" dirty="0"/>
+              <a:t>Secondary: Build an analytic-numeric integrator </a:t>
+            </a:r>
+            <a:r>
+              <a:rPr lang="en-US" dirty="0"/>
+              <a:t>to provide accurate numerical descriptions for the analytic solutions.</a:t>
+            </a:r>
+          </a:p>
+        </p:txBody>
+      </p:sp>
+      <p:sp>
+        <p:nvSpPr>
+          <p:cNvPr id="4" name="Slide Number Placeholder 3">
+            <a:extLst>
+              <a:ext uri="{FF2B5EF4-FFF2-40B4-BE49-F238E27FC236}">
+                <a16:creationId xmlns:a16="http://schemas.microsoft.com/office/drawing/2014/main" id="{202DAD29-2EF5-43DD-9D0C-CBCC8F564E13}"/>
+              </a:ext>
+            </a:extLst>
+          </p:cNvPr>
+          <p:cNvSpPr>
+            <a:spLocks noGrp="1"/>
+          </p:cNvSpPr>
+          <p:nvPr>
+            <p:ph type="sldNum" sz="quarter" idx="12"/>
+          </p:nvPr>
+        </p:nvSpPr>
+        <p:spPr/>
+        <p:txBody>
+          <a:bodyPr/>
+          <a:lstStyle/>
+          <a:p>
+            <a:fld id="{F3332EFC-B9C2-4EF3-A733-16B7EBFB30C8}" type="slidenum">
+              <a:rPr lang="en-US" smtClean="0"/>
+              <a:t>11</a:t>
+            </a:fld>
+            <a:endParaRPr lang="en-US"/>
+          </a:p>
+        </p:txBody>
+      </p:sp>
+    </p:spTree>
+    <p:extLst>
+      <p:ext uri="{BB962C8B-B14F-4D97-AF65-F5344CB8AC3E}">
+        <p14:creationId xmlns:p14="http://schemas.microsoft.com/office/powerpoint/2010/main" val="1363476497"/>
+      </p:ext>
+    </p:extLst>
+  </p:cSld>
+  <p:clrMapOvr>
+    <a:masterClrMapping/>
+  </p:clrMapOvr>
+</p:sld>
+</file>
+
+<file path=ppt/slides/slide12.xml><?xml version="1.0" encoding="utf-8"?>
+<p:sld xmlns:a="http://schemas.openxmlformats.org/drawingml/2006/main" xmlns:r="http://schemas.openxmlformats.org/officeDocument/2006/relationships" xmlns:p="http://schemas.openxmlformats.org/presentationml/2006/main">
+  <p:cSld>
+    <p:spTree>
+      <p:nvGrpSpPr>
+        <p:cNvPr id="1" name=""/>
+        <p:cNvGrpSpPr/>
+        <p:nvPr/>
+      </p:nvGrpSpPr>
+      <p:grpSpPr>
+        <a:xfrm>
+          <a:off x="0" y="0"/>
+          <a:ext cx="0" cy="0"/>
+          <a:chOff x="0" y="0"/>
+          <a:chExt cx="0" cy="0"/>
+        </a:xfrm>
+      </p:grpSpPr>
+      <p:sp>
+        <p:nvSpPr>
+          <p:cNvPr id="2" name="Title 1">
+            <a:extLst>
+              <a:ext uri="{FF2B5EF4-FFF2-40B4-BE49-F238E27FC236}">
+                <a16:creationId xmlns:a16="http://schemas.microsoft.com/office/drawing/2014/main" id="{2EB59BB1-CD0A-4244-8DEF-DD3CD08C78A2}"/>
+              </a:ext>
+            </a:extLst>
+          </p:cNvPr>
+          <p:cNvSpPr>
+            <a:spLocks noGrp="1"/>
+          </p:cNvSpPr>
+          <p:nvPr>
+            <p:ph type="title"/>
+          </p:nvPr>
+        </p:nvSpPr>
+        <p:spPr/>
+        <p:txBody>
+          <a:bodyPr/>
+          <a:lstStyle/>
+          <a:p>
+            <a:r>
+              <a:rPr lang="en-US" dirty="0"/>
+              <a:t>Capstone outline</a:t>
+            </a:r>
+          </a:p>
+        </p:txBody>
+      </p:sp>
+      <p:sp>
+        <p:nvSpPr>
+          <p:cNvPr id="3" name="Content Placeholder 2">
+            <a:extLst>
+              <a:ext uri="{FF2B5EF4-FFF2-40B4-BE49-F238E27FC236}">
+                <a16:creationId xmlns:a16="http://schemas.microsoft.com/office/drawing/2014/main" id="{D215A1B0-7E78-4C4C-AF67-5ACD0A22475E}"/>
+              </a:ext>
+            </a:extLst>
+          </p:cNvPr>
+          <p:cNvSpPr>
+            <a:spLocks noGrp="1"/>
+          </p:cNvSpPr>
+          <p:nvPr>
+            <p:ph idx="1"/>
+          </p:nvPr>
+        </p:nvSpPr>
+        <p:spPr/>
+        <p:txBody>
+          <a:bodyPr/>
+          <a:lstStyle/>
+          <a:p>
+            <a:r>
+              <a:rPr lang="en-US" dirty="0"/>
+              <a:t>Progress</a:t>
+            </a:r>
+          </a:p>
+        </p:txBody>
+      </p:sp>
+      <p:sp>
+        <p:nvSpPr>
+          <p:cNvPr id="4" name="Slide Number Placeholder 3">
+            <a:extLst>
+              <a:ext uri="{FF2B5EF4-FFF2-40B4-BE49-F238E27FC236}">
+                <a16:creationId xmlns:a16="http://schemas.microsoft.com/office/drawing/2014/main" id="{202DAD29-2EF5-43DD-9D0C-CBCC8F564E13}"/>
+              </a:ext>
+            </a:extLst>
+          </p:cNvPr>
+          <p:cNvSpPr>
+            <a:spLocks noGrp="1"/>
+          </p:cNvSpPr>
+          <p:nvPr>
+            <p:ph type="sldNum" sz="quarter" idx="12"/>
+          </p:nvPr>
+        </p:nvSpPr>
+        <p:spPr/>
+        <p:txBody>
+          <a:bodyPr/>
+          <a:lstStyle/>
+          <a:p>
+            <a:fld id="{F3332EFC-B9C2-4EF3-A733-16B7EBFB30C8}" type="slidenum">
+              <a:rPr lang="en-US" smtClean="0">
+                <a:solidFill>
+                  <a:schemeClr val="bg1">
+                    <a:lumMod val="65000"/>
+                  </a:schemeClr>
+                </a:solidFill>
+              </a:rPr>
+              <a:t>12</a:t>
+            </a:fld>
+            <a:endParaRPr lang="en-US">
+              <a:solidFill>
+                <a:schemeClr val="bg1">
+                  <a:lumMod val="65000"/>
+                </a:schemeClr>
+              </a:solidFill>
+            </a:endParaRPr>
+          </a:p>
+        </p:txBody>
+      </p:sp>
+      <p:sp>
+        <p:nvSpPr>
+          <p:cNvPr id="7" name="Rectangle: Rounded Corners 6">
+            <a:extLst>
+              <a:ext uri="{FF2B5EF4-FFF2-40B4-BE49-F238E27FC236}">
+                <a16:creationId xmlns:a16="http://schemas.microsoft.com/office/drawing/2014/main" id="{477E647D-4DCD-4792-828E-F8F08A47F803}"/>
+              </a:ext>
+            </a:extLst>
+          </p:cNvPr>
+          <p:cNvSpPr/>
+          <p:nvPr/>
+        </p:nvSpPr>
+        <p:spPr>
+          <a:xfrm>
+            <a:off x="1732722" y="5014085"/>
+            <a:ext cx="2544418" cy="1162878"/>
+          </a:xfrm>
+          <a:prstGeom prst="roundRect">
+            <a:avLst/>
+          </a:prstGeom>
+        </p:spPr>
+        <p:style>
+          <a:lnRef idx="2">
+            <a:schemeClr val="dk1"/>
+          </a:lnRef>
+          <a:fillRef idx="1">
+            <a:schemeClr val="lt1"/>
+          </a:fillRef>
+          <a:effectRef idx="0">
+            <a:schemeClr val="dk1"/>
+          </a:effectRef>
+          <a:fontRef idx="minor">
+            <a:schemeClr val="dk1"/>
+          </a:fontRef>
+        </p:style>
+        <p:txBody>
+          <a:bodyPr rtlCol="0" anchor="ctr"/>
+          <a:lstStyle/>
+          <a:p>
+            <a:pPr algn="ctr"/>
+            <a:r>
+              <a:rPr lang="en-US" sz="2800" dirty="0">
+                <a:solidFill>
+                  <a:schemeClr val="tx1"/>
+                </a:solidFill>
+              </a:rPr>
+              <a:t>PDE</a:t>
+            </a:r>
+          </a:p>
+          <a:p>
+            <a:pPr algn="ctr"/>
+            <a:r>
+              <a:rPr lang="en-US" sz="2400" dirty="0">
+                <a:solidFill>
+                  <a:schemeClr val="tx1"/>
+                </a:solidFill>
+              </a:rPr>
+              <a:t>(with certain parameters)</a:t>
+            </a:r>
+          </a:p>
+        </p:txBody>
+      </p:sp>
+      <p:sp>
+        <p:nvSpPr>
+          <p:cNvPr id="8" name="Rectangle: Rounded Corners 7">
+            <a:extLst>
+              <a:ext uri="{FF2B5EF4-FFF2-40B4-BE49-F238E27FC236}">
+                <a16:creationId xmlns:a16="http://schemas.microsoft.com/office/drawing/2014/main" id="{234FA807-0F1C-413F-96C9-53DEB0D464C8}"/>
+              </a:ext>
+            </a:extLst>
+          </p:cNvPr>
+          <p:cNvSpPr/>
+          <p:nvPr/>
+        </p:nvSpPr>
+        <p:spPr>
+          <a:xfrm>
+            <a:off x="1732722" y="2482920"/>
+            <a:ext cx="2544418" cy="1162878"/>
+          </a:xfrm>
+          <a:prstGeom prst="roundRect">
+            <a:avLst/>
+          </a:prstGeom>
+          <a:ln>
+            <a:solidFill>
+              <a:schemeClr val="bg1">
+                <a:lumMod val="65000"/>
+              </a:schemeClr>
+            </a:solidFill>
+          </a:ln>
+        </p:spPr>
+        <p:style>
+          <a:lnRef idx="2">
+            <a:schemeClr val="dk1"/>
+          </a:lnRef>
+          <a:fillRef idx="1">
+            <a:schemeClr val="lt1"/>
+          </a:fillRef>
+          <a:effectRef idx="0">
+            <a:schemeClr val="dk1"/>
+          </a:effectRef>
+          <a:fontRef idx="minor">
+            <a:schemeClr val="dk1"/>
+          </a:fontRef>
+        </p:style>
+        <p:txBody>
+          <a:bodyPr rtlCol="0" anchor="ctr"/>
+          <a:lstStyle/>
+          <a:p>
+            <a:pPr algn="ctr"/>
+            <a:r>
+              <a:rPr lang="en-US" sz="2800" dirty="0">
+                <a:solidFill>
+                  <a:schemeClr val="bg1">
+                    <a:lumMod val="65000"/>
+                  </a:schemeClr>
+                </a:solidFill>
+              </a:rPr>
+              <a:t>ODE</a:t>
+            </a:r>
+          </a:p>
+        </p:txBody>
+      </p:sp>
+      <p:cxnSp>
+        <p:nvCxnSpPr>
+          <p:cNvPr id="9" name="Straight Arrow Connector 8">
+            <a:extLst>
+              <a:ext uri="{FF2B5EF4-FFF2-40B4-BE49-F238E27FC236}">
+                <a16:creationId xmlns:a16="http://schemas.microsoft.com/office/drawing/2014/main" id="{9C701BA7-49A9-4470-A37E-E0DBDAFD35B7}"/>
+              </a:ext>
+            </a:extLst>
+          </p:cNvPr>
+          <p:cNvCxnSpPr/>
+          <p:nvPr/>
+        </p:nvCxnSpPr>
+        <p:spPr>
+          <a:xfrm flipV="1">
+            <a:off x="3004931" y="3645798"/>
+            <a:ext cx="0" cy="1368287"/>
+          </a:xfrm>
+          <a:prstGeom prst="straightConnector1">
+            <a:avLst/>
+          </a:prstGeom>
+          <a:ln>
+            <a:prstDash val="solid"/>
+            <a:tailEnd type="triangle"/>
+          </a:ln>
+        </p:spPr>
+        <p:style>
+          <a:lnRef idx="1">
+            <a:schemeClr val="dk1"/>
+          </a:lnRef>
+          <a:fillRef idx="0">
+            <a:schemeClr val="dk1"/>
+          </a:fillRef>
+          <a:effectRef idx="0">
+            <a:schemeClr val="dk1"/>
+          </a:effectRef>
+          <a:fontRef idx="minor">
+            <a:schemeClr val="tx1"/>
+          </a:fontRef>
+        </p:style>
+      </p:cxnSp>
+      <p:sp>
+        <p:nvSpPr>
+          <p:cNvPr id="10" name="Rectangle: Rounded Corners 9">
+            <a:extLst>
+              <a:ext uri="{FF2B5EF4-FFF2-40B4-BE49-F238E27FC236}">
+                <a16:creationId xmlns:a16="http://schemas.microsoft.com/office/drawing/2014/main" id="{39E0394B-01E8-48F5-939B-EE224AB3B055}"/>
+              </a:ext>
+            </a:extLst>
+          </p:cNvPr>
+          <p:cNvSpPr/>
+          <p:nvPr/>
+        </p:nvSpPr>
+        <p:spPr>
+          <a:xfrm>
+            <a:off x="7437782" y="5014085"/>
+            <a:ext cx="2544418" cy="1162878"/>
+          </a:xfrm>
+          <a:prstGeom prst="roundRect">
+            <a:avLst/>
+          </a:prstGeom>
+          <a:ln>
+            <a:solidFill>
+              <a:schemeClr val="bg1">
+                <a:lumMod val="65000"/>
+              </a:schemeClr>
+            </a:solidFill>
+          </a:ln>
+        </p:spPr>
+        <p:style>
+          <a:lnRef idx="2">
+            <a:schemeClr val="dk1"/>
+          </a:lnRef>
+          <a:fillRef idx="1">
+            <a:schemeClr val="lt1"/>
+          </a:fillRef>
+          <a:effectRef idx="0">
+            <a:schemeClr val="dk1"/>
+          </a:effectRef>
+          <a:fontRef idx="minor">
+            <a:schemeClr val="dk1"/>
+          </a:fontRef>
+        </p:style>
+        <p:txBody>
+          <a:bodyPr rtlCol="0" anchor="ctr"/>
+          <a:lstStyle/>
+          <a:p>
+            <a:pPr algn="ctr"/>
+            <a:r>
+              <a:rPr lang="en-US" sz="2800" dirty="0">
+                <a:solidFill>
+                  <a:schemeClr val="bg1">
+                    <a:lumMod val="65000"/>
+                  </a:schemeClr>
+                </a:solidFill>
+              </a:rPr>
+              <a:t>PDE solution</a:t>
+            </a:r>
+          </a:p>
+        </p:txBody>
+      </p:sp>
+      <p:sp>
+        <p:nvSpPr>
+          <p:cNvPr id="11" name="Rectangle: Rounded Corners 10">
+            <a:extLst>
+              <a:ext uri="{FF2B5EF4-FFF2-40B4-BE49-F238E27FC236}">
+                <a16:creationId xmlns:a16="http://schemas.microsoft.com/office/drawing/2014/main" id="{255F1536-A156-4537-AD34-647B571FFF1A}"/>
+              </a:ext>
+            </a:extLst>
+          </p:cNvPr>
+          <p:cNvSpPr/>
+          <p:nvPr/>
+        </p:nvSpPr>
+        <p:spPr>
+          <a:xfrm>
+            <a:off x="7437782" y="2482920"/>
+            <a:ext cx="2544418" cy="1162878"/>
+          </a:xfrm>
+          <a:prstGeom prst="roundRect">
+            <a:avLst/>
+          </a:prstGeom>
+          <a:ln>
+            <a:solidFill>
+              <a:schemeClr val="bg1">
+                <a:lumMod val="65000"/>
+              </a:schemeClr>
+            </a:solidFill>
+          </a:ln>
+        </p:spPr>
+        <p:style>
+          <a:lnRef idx="2">
+            <a:schemeClr val="dk1"/>
+          </a:lnRef>
+          <a:fillRef idx="1">
+            <a:schemeClr val="lt1"/>
+          </a:fillRef>
+          <a:effectRef idx="0">
+            <a:schemeClr val="dk1"/>
+          </a:effectRef>
+          <a:fontRef idx="minor">
+            <a:schemeClr val="dk1"/>
+          </a:fontRef>
+        </p:style>
+        <p:txBody>
+          <a:bodyPr rtlCol="0" anchor="ctr"/>
+          <a:lstStyle/>
+          <a:p>
+            <a:pPr algn="ctr"/>
+            <a:r>
+              <a:rPr lang="en-US" sz="2800" dirty="0">
+                <a:solidFill>
+                  <a:schemeClr val="bg1">
+                    <a:lumMod val="65000"/>
+                  </a:schemeClr>
+                </a:solidFill>
+              </a:rPr>
+              <a:t>ODE solution</a:t>
+            </a:r>
+          </a:p>
+        </p:txBody>
+      </p:sp>
+      <p:cxnSp>
+        <p:nvCxnSpPr>
+          <p:cNvPr id="12" name="Straight Arrow Connector 11">
+            <a:extLst>
+              <a:ext uri="{FF2B5EF4-FFF2-40B4-BE49-F238E27FC236}">
+                <a16:creationId xmlns:a16="http://schemas.microsoft.com/office/drawing/2014/main" id="{D2AFB6B5-E275-4736-A25D-769F527A0342}"/>
+              </a:ext>
+            </a:extLst>
+          </p:cNvPr>
+          <p:cNvCxnSpPr>
+            <a:cxnSpLocks/>
+          </p:cNvCxnSpPr>
+          <p:nvPr/>
+        </p:nvCxnSpPr>
+        <p:spPr>
+          <a:xfrm>
+            <a:off x="4277140" y="3064359"/>
+            <a:ext cx="3160642" cy="0"/>
+          </a:xfrm>
+          <a:prstGeom prst="straightConnector1">
+            <a:avLst/>
+          </a:prstGeom>
+          <a:ln>
+            <a:solidFill>
+              <a:schemeClr val="bg1">
+                <a:lumMod val="65000"/>
+              </a:schemeClr>
+            </a:solidFill>
+            <a:tailEnd type="triangle"/>
+          </a:ln>
+        </p:spPr>
+        <p:style>
+          <a:lnRef idx="1">
+            <a:schemeClr val="dk1"/>
+          </a:lnRef>
+          <a:fillRef idx="0">
+            <a:schemeClr val="dk1"/>
+          </a:fillRef>
+          <a:effectRef idx="0">
+            <a:schemeClr val="dk1"/>
+          </a:effectRef>
+          <a:fontRef idx="minor">
+            <a:schemeClr val="tx1"/>
+          </a:fontRef>
+        </p:style>
+      </p:cxnSp>
+      <p:cxnSp>
+        <p:nvCxnSpPr>
+          <p:cNvPr id="13" name="Straight Arrow Connector 12">
+            <a:extLst>
+              <a:ext uri="{FF2B5EF4-FFF2-40B4-BE49-F238E27FC236}">
+                <a16:creationId xmlns:a16="http://schemas.microsoft.com/office/drawing/2014/main" id="{A72F9DBB-DDD0-4A55-A218-7CD966F5A51C}"/>
+              </a:ext>
+            </a:extLst>
+          </p:cNvPr>
+          <p:cNvCxnSpPr/>
+          <p:nvPr/>
+        </p:nvCxnSpPr>
+        <p:spPr>
+          <a:xfrm>
+            <a:off x="8709991" y="3645798"/>
+            <a:ext cx="0" cy="1368287"/>
+          </a:xfrm>
+          <a:prstGeom prst="straightConnector1">
+            <a:avLst/>
+          </a:prstGeom>
+          <a:ln>
+            <a:tailEnd type="triangle"/>
+          </a:ln>
+        </p:spPr>
+        <p:style>
+          <a:lnRef idx="1">
+            <a:schemeClr val="dk1"/>
+          </a:lnRef>
+          <a:fillRef idx="0">
+            <a:schemeClr val="dk1"/>
+          </a:fillRef>
+          <a:effectRef idx="0">
+            <a:schemeClr val="dk1"/>
+          </a:effectRef>
+          <a:fontRef idx="minor">
+            <a:schemeClr val="tx1"/>
+          </a:fontRef>
+        </p:style>
+      </p:cxnSp>
+      <p:sp>
+        <p:nvSpPr>
+          <p:cNvPr id="14" name="TextBox 13">
+            <a:extLst>
+              <a:ext uri="{FF2B5EF4-FFF2-40B4-BE49-F238E27FC236}">
+                <a16:creationId xmlns:a16="http://schemas.microsoft.com/office/drawing/2014/main" id="{17229C29-DFC7-4C32-B421-CC6014BE533E}"/>
+              </a:ext>
+            </a:extLst>
+          </p:cNvPr>
+          <p:cNvSpPr txBox="1"/>
+          <p:nvPr/>
+        </p:nvSpPr>
+        <p:spPr>
+          <a:xfrm>
+            <a:off x="8979693" y="3920206"/>
+            <a:ext cx="2948597" cy="461665"/>
+          </a:xfrm>
+          <a:prstGeom prst="rect">
+            <a:avLst/>
+          </a:prstGeom>
+          <a:noFill/>
+        </p:spPr>
+        <p:txBody>
+          <a:bodyPr wrap="square" rtlCol="0">
+            <a:spAutoFit/>
+          </a:bodyPr>
+          <a:lstStyle/>
+          <a:p>
+            <a:pPr algn="ctr"/>
+            <a:r>
+              <a:rPr lang="en-US" sz="2400" dirty="0"/>
+              <a:t>inverse transform</a:t>
+            </a:r>
+          </a:p>
+        </p:txBody>
+      </p:sp>
+      <p:sp>
+        <p:nvSpPr>
+          <p:cNvPr id="15" name="TextBox 14">
+            <a:extLst>
+              <a:ext uri="{FF2B5EF4-FFF2-40B4-BE49-F238E27FC236}">
+                <a16:creationId xmlns:a16="http://schemas.microsoft.com/office/drawing/2014/main" id="{4A517629-1A28-4881-9444-62F36EFF83FF}"/>
+              </a:ext>
+            </a:extLst>
+          </p:cNvPr>
+          <p:cNvSpPr txBox="1"/>
+          <p:nvPr/>
+        </p:nvSpPr>
+        <p:spPr>
+          <a:xfrm>
+            <a:off x="4383162" y="3074804"/>
+            <a:ext cx="2948597" cy="461665"/>
+          </a:xfrm>
+          <a:prstGeom prst="rect">
+            <a:avLst/>
+          </a:prstGeom>
+          <a:noFill/>
+        </p:spPr>
+        <p:txBody>
+          <a:bodyPr wrap="square" rtlCol="0">
+            <a:spAutoFit/>
+          </a:bodyPr>
+          <a:lstStyle/>
+          <a:p>
+            <a:pPr algn="ctr"/>
+            <a:r>
+              <a:rPr lang="en-US" sz="2400" b="1" dirty="0">
+                <a:solidFill>
+                  <a:schemeClr val="bg1">
+                    <a:lumMod val="65000"/>
+                  </a:schemeClr>
+                </a:solidFill>
+              </a:rPr>
+              <a:t>Easy</a:t>
+            </a:r>
+          </a:p>
+        </p:txBody>
+      </p:sp>
+      <p:sp>
+        <p:nvSpPr>
+          <p:cNvPr id="16" name="TextBox 15">
+            <a:extLst>
+              <a:ext uri="{FF2B5EF4-FFF2-40B4-BE49-F238E27FC236}">
+                <a16:creationId xmlns:a16="http://schemas.microsoft.com/office/drawing/2014/main" id="{69064DA8-537E-4F97-9EC5-A669D5BA299A}"/>
+              </a:ext>
+            </a:extLst>
+          </p:cNvPr>
+          <p:cNvSpPr txBox="1"/>
+          <p:nvPr/>
+        </p:nvSpPr>
+        <p:spPr>
+          <a:xfrm>
+            <a:off x="4383162" y="5133859"/>
+            <a:ext cx="2948597" cy="461665"/>
+          </a:xfrm>
+          <a:prstGeom prst="rect">
+            <a:avLst/>
+          </a:prstGeom>
+          <a:noFill/>
+        </p:spPr>
+        <p:txBody>
+          <a:bodyPr wrap="square" rtlCol="0">
+            <a:spAutoFit/>
+          </a:bodyPr>
+          <a:lstStyle/>
+          <a:p>
+            <a:pPr algn="ctr"/>
+            <a:r>
+              <a:rPr lang="en-US" sz="2400" b="1" dirty="0">
+                <a:solidFill>
+                  <a:schemeClr val="bg1">
+                    <a:lumMod val="65000"/>
+                  </a:schemeClr>
+                </a:solidFill>
+              </a:rPr>
+              <a:t>H</a:t>
+            </a:r>
+            <a:r>
+              <a:rPr lang="en-US" altLang="zh-CN" sz="2400" b="1" dirty="0">
+                <a:solidFill>
+                  <a:schemeClr val="bg1">
+                    <a:lumMod val="65000"/>
+                  </a:schemeClr>
+                </a:solidFill>
+              </a:rPr>
+              <a:t>ard</a:t>
+            </a:r>
+            <a:endParaRPr lang="en-US" sz="2400" b="1" dirty="0">
+              <a:solidFill>
+                <a:schemeClr val="bg1">
+                  <a:lumMod val="65000"/>
+                </a:schemeClr>
+              </a:solidFill>
+            </a:endParaRPr>
+          </a:p>
+        </p:txBody>
+      </p:sp>
+      <p:cxnSp>
+        <p:nvCxnSpPr>
+          <p:cNvPr id="17" name="Straight Arrow Connector 16">
+            <a:extLst>
+              <a:ext uri="{FF2B5EF4-FFF2-40B4-BE49-F238E27FC236}">
+                <a16:creationId xmlns:a16="http://schemas.microsoft.com/office/drawing/2014/main" id="{18718E12-7293-4EEF-9C25-3BFAF43B0615}"/>
+              </a:ext>
+            </a:extLst>
+          </p:cNvPr>
+          <p:cNvCxnSpPr/>
+          <p:nvPr/>
+        </p:nvCxnSpPr>
+        <p:spPr>
+          <a:xfrm>
+            <a:off x="4277140" y="5595524"/>
+            <a:ext cx="3160642" cy="0"/>
+          </a:xfrm>
+          <a:prstGeom prst="straightConnector1">
+            <a:avLst/>
+          </a:prstGeom>
+          <a:ln>
+            <a:solidFill>
+              <a:schemeClr val="bg1">
+                <a:lumMod val="65000"/>
+              </a:schemeClr>
+            </a:solidFill>
+            <a:tailEnd type="triangle"/>
+          </a:ln>
+        </p:spPr>
+        <p:style>
+          <a:lnRef idx="1">
+            <a:schemeClr val="dk1"/>
+          </a:lnRef>
+          <a:fillRef idx="0">
+            <a:schemeClr val="dk1"/>
+          </a:fillRef>
+          <a:effectRef idx="0">
+            <a:schemeClr val="dk1"/>
+          </a:effectRef>
+          <a:fontRef idx="minor">
+            <a:schemeClr val="tx1"/>
+          </a:fontRef>
+        </p:style>
+      </p:cxnSp>
+      <p:pic>
+        <p:nvPicPr>
+          <p:cNvPr id="18" name="Picture 17">
+            <a:extLst>
+              <a:ext uri="{FF2B5EF4-FFF2-40B4-BE49-F238E27FC236}">
+                <a16:creationId xmlns:a16="http://schemas.microsoft.com/office/drawing/2014/main" id="{9E5FC9A1-C2BF-4C0F-99C5-3356055CB975}"/>
+              </a:ext>
+            </a:extLst>
+          </p:cNvPr>
+          <p:cNvPicPr>
+            <a:picLocks noChangeAspect="1"/>
+          </p:cNvPicPr>
+          <p:nvPr>
+            <p:custDataLst>
+              <p:tags r:id="rId1"/>
+            </p:custDataLst>
+          </p:nvPr>
+        </p:nvPicPr>
+        <p:blipFill>
+          <a:blip r:embed="rId5">
+            <a:extLst>
+              <a:ext uri="{28A0092B-C50C-407E-A947-70E740481C1C}">
+                <a14:useLocalDpi xmlns:a14="http://schemas.microsoft.com/office/drawing/2010/main" val="0"/>
+              </a:ext>
+            </a:extLst>
+          </a:blip>
+          <a:stretch>
+            <a:fillRect/>
+          </a:stretch>
+        </p:blipFill>
+        <p:spPr>
+          <a:xfrm>
+            <a:off x="8868466" y="4330984"/>
+            <a:ext cx="3171049" cy="284953"/>
+          </a:xfrm>
+          <a:prstGeom prst="rect">
+            <a:avLst/>
+          </a:prstGeom>
+        </p:spPr>
+      </p:pic>
+      <p:sp>
+        <p:nvSpPr>
+          <p:cNvPr id="19" name="TextBox 18">
+            <a:extLst>
+              <a:ext uri="{FF2B5EF4-FFF2-40B4-BE49-F238E27FC236}">
+                <a16:creationId xmlns:a16="http://schemas.microsoft.com/office/drawing/2014/main" id="{0B5495E7-E8FA-406C-8761-3FA95D4BDF49}"/>
+              </a:ext>
+            </a:extLst>
+          </p:cNvPr>
+          <p:cNvSpPr txBox="1"/>
+          <p:nvPr/>
+        </p:nvSpPr>
+        <p:spPr>
+          <a:xfrm>
+            <a:off x="27876" y="3920206"/>
+            <a:ext cx="2948597" cy="461665"/>
+          </a:xfrm>
+          <a:prstGeom prst="rect">
+            <a:avLst/>
+          </a:prstGeom>
+          <a:noFill/>
+        </p:spPr>
+        <p:txBody>
+          <a:bodyPr wrap="square" rtlCol="0">
+            <a:spAutoFit/>
+          </a:bodyPr>
+          <a:lstStyle/>
+          <a:p>
+            <a:pPr algn="ctr"/>
+            <a:r>
+              <a:rPr lang="en-US" sz="2400" dirty="0" err="1"/>
+              <a:t>Fokas</a:t>
+            </a:r>
+            <a:r>
+              <a:rPr lang="en-US" sz="2400" dirty="0"/>
+              <a:t> transform</a:t>
+            </a:r>
+          </a:p>
+        </p:txBody>
+      </p:sp>
+      <p:pic>
+        <p:nvPicPr>
+          <p:cNvPr id="20" name="Picture 19">
+            <a:extLst>
+              <a:ext uri="{FF2B5EF4-FFF2-40B4-BE49-F238E27FC236}">
+                <a16:creationId xmlns:a16="http://schemas.microsoft.com/office/drawing/2014/main" id="{7D457F27-4D52-4DEF-AD7E-1935902EE395}"/>
+              </a:ext>
+            </a:extLst>
+          </p:cNvPr>
+          <p:cNvPicPr>
+            <a:picLocks noChangeAspect="1"/>
+          </p:cNvPicPr>
+          <p:nvPr>
+            <p:custDataLst>
+              <p:tags r:id="rId2"/>
+            </p:custDataLst>
+          </p:nvPr>
+        </p:nvPicPr>
+        <p:blipFill>
+          <a:blip r:embed="rId6">
+            <a:extLst>
+              <a:ext uri="{28A0092B-C50C-407E-A947-70E740481C1C}">
+                <a14:useLocalDpi xmlns:a14="http://schemas.microsoft.com/office/drawing/2010/main" val="0"/>
+              </a:ext>
+            </a:extLst>
+          </a:blip>
+          <a:stretch>
+            <a:fillRect/>
+          </a:stretch>
+        </p:blipFill>
+        <p:spPr>
+          <a:xfrm>
+            <a:off x="119825" y="4381252"/>
+            <a:ext cx="2828191" cy="251429"/>
+          </a:xfrm>
+          <a:prstGeom prst="rect">
+            <a:avLst/>
+          </a:prstGeom>
+        </p:spPr>
+      </p:pic>
+    </p:spTree>
+    <p:extLst>
+      <p:ext uri="{BB962C8B-B14F-4D97-AF65-F5344CB8AC3E}">
+        <p14:creationId xmlns:p14="http://schemas.microsoft.com/office/powerpoint/2010/main" val="2033689713"/>
+      </p:ext>
+    </p:extLst>
+  </p:cSld>
+  <p:clrMapOvr>
+    <a:masterClrMapping/>
+  </p:clrMapOvr>
+</p:sld>
+</file>
+
+<file path=ppt/slides/slide13.xml><?xml version="1.0" encoding="utf-8"?>
+<p:sld xmlns:a="http://schemas.openxmlformats.org/drawingml/2006/main" xmlns:r="http://schemas.openxmlformats.org/officeDocument/2006/relationships" xmlns:p="http://schemas.openxmlformats.org/presentationml/2006/main">
+  <p:cSld>
+    <p:spTree>
+      <p:nvGrpSpPr>
+        <p:cNvPr id="1" name=""/>
+        <p:cNvGrpSpPr/>
+        <p:nvPr/>
+      </p:nvGrpSpPr>
+      <p:grpSpPr>
+        <a:xfrm>
+          <a:off x="0" y="0"/>
+          <a:ext cx="0" cy="0"/>
+          <a:chOff x="0" y="0"/>
+          <a:chExt cx="0" cy="0"/>
+        </a:xfrm>
+      </p:grpSpPr>
+      <p:sp>
+        <p:nvSpPr>
+          <p:cNvPr id="2" name="Title 1">
+            <a:extLst>
+              <a:ext uri="{FF2B5EF4-FFF2-40B4-BE49-F238E27FC236}">
+                <a16:creationId xmlns:a16="http://schemas.microsoft.com/office/drawing/2014/main" id="{74196386-6B55-49F1-86AB-BDFEE842CD0E}"/>
+              </a:ext>
+            </a:extLst>
+          </p:cNvPr>
+          <p:cNvSpPr>
+            <a:spLocks noGrp="1"/>
+          </p:cNvSpPr>
+          <p:nvPr>
+            <p:ph type="title"/>
+          </p:nvPr>
+        </p:nvSpPr>
+        <p:spPr/>
+        <p:txBody>
+          <a:bodyPr/>
+          <a:lstStyle/>
+          <a:p>
+            <a:r>
+              <a:rPr lang="en-US" dirty="0"/>
+              <a:t>Summary</a:t>
+            </a:r>
+          </a:p>
+        </p:txBody>
+      </p:sp>
+      <p:sp>
+        <p:nvSpPr>
+          <p:cNvPr id="3" name="Content Placeholder 2">
+            <a:extLst>
+              <a:ext uri="{FF2B5EF4-FFF2-40B4-BE49-F238E27FC236}">
+                <a16:creationId xmlns:a16="http://schemas.microsoft.com/office/drawing/2014/main" id="{F65B2E0D-F982-4C7E-9230-F95A144FA02F}"/>
+              </a:ext>
+            </a:extLst>
+          </p:cNvPr>
+          <p:cNvSpPr>
+            <a:spLocks noGrp="1"/>
+          </p:cNvSpPr>
+          <p:nvPr>
+            <p:ph idx="1"/>
+          </p:nvPr>
+        </p:nvSpPr>
+        <p:spPr/>
+        <p:txBody>
+          <a:bodyPr>
+            <a:normAutofit lnSpcReduction="10000"/>
+          </a:bodyPr>
+          <a:lstStyle/>
+          <a:p>
+            <a:pPr marL="514350" indent="-514350">
+              <a:buFont typeface="+mj-lt"/>
+              <a:buAutoNum type="arabicPeriod"/>
+            </a:pPr>
+            <a:r>
+              <a:rPr lang="en-US" dirty="0"/>
+              <a:t>Solving (complicated) PDEs usually requires ad-hoc methods that are often problem-specific and cannot be generalized to related PDEs.</a:t>
+            </a:r>
+          </a:p>
+          <a:p>
+            <a:pPr marL="514350" indent="-514350">
+              <a:buFont typeface="+mj-lt"/>
+              <a:buAutoNum type="arabicPeriod"/>
+            </a:pPr>
+            <a:r>
+              <a:rPr lang="en-US" dirty="0"/>
+              <a:t>The </a:t>
+            </a:r>
+            <a:r>
+              <a:rPr lang="en-US" dirty="0" err="1"/>
+              <a:t>Fokas</a:t>
+            </a:r>
+            <a:r>
+              <a:rPr lang="en-US" dirty="0"/>
+              <a:t> method allows solving an entire class of PDEs algorithmically by constructing appropriate </a:t>
+            </a:r>
+            <a:r>
+              <a:rPr lang="en-US" dirty="0" err="1"/>
+              <a:t>Fokas</a:t>
+            </a:r>
+            <a:r>
+              <a:rPr lang="en-US" dirty="0"/>
+              <a:t> transform pairs based on the PDE parameters.</a:t>
+            </a:r>
+          </a:p>
+          <a:p>
+            <a:pPr marL="514350" indent="-514350">
+              <a:buFont typeface="+mj-lt"/>
+              <a:buAutoNum type="arabicPeriod"/>
+            </a:pPr>
+            <a:r>
+              <a:rPr lang="en-US" dirty="0"/>
+              <a:t>It is of interest to implement the </a:t>
+            </a:r>
+            <a:r>
+              <a:rPr lang="en-US" dirty="0" err="1"/>
+              <a:t>Fokas</a:t>
+            </a:r>
+            <a:r>
+              <a:rPr lang="en-US" dirty="0"/>
+              <a:t> method as a package/library. This will allow mathematicians to quickly obtain </a:t>
+            </a:r>
+          </a:p>
+          <a:p>
+            <a:pPr marL="971550" lvl="1" indent="-514350">
+              <a:buFont typeface="+mj-lt"/>
+              <a:buAutoNum type="arabicParenR"/>
+            </a:pPr>
+            <a:r>
+              <a:rPr lang="en-US" dirty="0"/>
+              <a:t>analytic solutions of complicated PDEs, </a:t>
+            </a:r>
+          </a:p>
+          <a:p>
+            <a:pPr marL="971550" lvl="1" indent="-514350">
+              <a:buFont typeface="+mj-lt"/>
+              <a:buAutoNum type="arabicParenR"/>
+            </a:pPr>
+            <a:r>
+              <a:rPr lang="en-US" dirty="0"/>
+              <a:t>and (perhaps) numerical descriptions of them, which would help with visualizing PDE solutions.</a:t>
+            </a:r>
+          </a:p>
+          <a:p>
+            <a:endParaRPr lang="en-US" dirty="0"/>
+          </a:p>
+        </p:txBody>
+      </p:sp>
+      <p:sp>
+        <p:nvSpPr>
+          <p:cNvPr id="4" name="Slide Number Placeholder 3">
+            <a:extLst>
+              <a:ext uri="{FF2B5EF4-FFF2-40B4-BE49-F238E27FC236}">
+                <a16:creationId xmlns:a16="http://schemas.microsoft.com/office/drawing/2014/main" id="{494E16DF-4F07-4CFD-A096-8E1CA61857B3}"/>
+              </a:ext>
+            </a:extLst>
+          </p:cNvPr>
+          <p:cNvSpPr>
+            <a:spLocks noGrp="1"/>
+          </p:cNvSpPr>
+          <p:nvPr>
+            <p:ph type="sldNum" sz="quarter" idx="12"/>
+          </p:nvPr>
+        </p:nvSpPr>
+        <p:spPr/>
+        <p:txBody>
+          <a:bodyPr/>
+          <a:lstStyle/>
+          <a:p>
+            <a:fld id="{F3332EFC-B9C2-4EF3-A733-16B7EBFB30C8}" type="slidenum">
+              <a:rPr lang="en-US" smtClean="0"/>
+              <a:t>13</a:t>
+            </a:fld>
+            <a:endParaRPr lang="en-US"/>
+          </a:p>
+        </p:txBody>
+      </p:sp>
+    </p:spTree>
+    <p:extLst>
+      <p:ext uri="{BB962C8B-B14F-4D97-AF65-F5344CB8AC3E}">
+        <p14:creationId xmlns:p14="http://schemas.microsoft.com/office/powerpoint/2010/main" val="1784804388"/>
+      </p:ext>
+    </p:extLst>
+  </p:cSld>
+  <p:clrMapOvr>
+    <a:masterClrMapping/>
+  </p:clrMapOvr>
+  <p:timing>
+    <p:tnLst>
+      <p:par>
+        <p:cTn id="1" dur="indefinite" restart="never" nodeType="tmRoot">
+          <p:childTnLst>
+            <p:seq concurrent="1" nextAc="seek">
+              <p:cTn id="2" dur="indefinite" nodeType="mainSeq">
+                <p:childTnLst>
+                  <p:par>
+                    <p:cTn id="3" fill="hold">
+                      <p:stCondLst>
+                        <p:cond delay="indefinite"/>
+                      </p:stCondLst>
+                      <p:childTnLst>
+                        <p:par>
+                          <p:cTn id="4" fill="hold">
+                            <p:stCondLst>
+                              <p:cond delay="0"/>
+                            </p:stCondLst>
+                            <p:childTnLst>
+                              <p:par>
+                                <p:cTn id="5" presetID="1" presetClass="entr" presetSubtype="0" fill="hold" nodeType="clickEffect">
+                                  <p:stCondLst>
+                                    <p:cond delay="0"/>
+                                  </p:stCondLst>
+                                  <p:childTnLst>
+                                    <p:set>
+                                      <p:cBhvr>
+                                        <p:cTn id="6" dur="1" fill="hold">
+                                          <p:stCondLst>
+                                            <p:cond delay="0"/>
+                                          </p:stCondLst>
+                                        </p:cTn>
+                                        <p:tgtEl>
+                                          <p:spTgt spid="3">
+                                            <p:txEl>
+                                              <p:pRg st="0" end="0"/>
+                                            </p:txEl>
+                                          </p:spTgt>
+                                        </p:tgtEl>
+                                        <p:attrNameLst>
+                                          <p:attrName>style.visibility</p:attrName>
+                                        </p:attrNameLst>
+                                      </p:cBhvr>
+                                      <p:to>
+                                        <p:strVal val="visible"/>
+                                      </p:to>
+                                    </p:set>
+                                  </p:childTnLst>
+                                </p:cTn>
+                              </p:par>
+                            </p:childTnLst>
+                          </p:cTn>
+                        </p:par>
+                      </p:childTnLst>
+                    </p:cTn>
+                  </p:par>
+                  <p:par>
+                    <p:cTn id="7" fill="hold">
+                      <p:stCondLst>
+                        <p:cond delay="indefinite"/>
+                      </p:stCondLst>
+                      <p:childTnLst>
+                        <p:par>
+                          <p:cTn id="8" fill="hold">
+                            <p:stCondLst>
+                              <p:cond delay="0"/>
+                            </p:stCondLst>
+                            <p:childTnLst>
+                              <p:par>
+                                <p:cTn id="9" presetID="1" presetClass="entr" presetSubtype="0" fill="hold" nodeType="clickEffect">
+                                  <p:stCondLst>
+                                    <p:cond delay="0"/>
+                                  </p:stCondLst>
+                                  <p:childTnLst>
+                                    <p:set>
+                                      <p:cBhvr>
+                                        <p:cTn id="10" dur="1" fill="hold">
+                                          <p:stCondLst>
+                                            <p:cond delay="0"/>
+                                          </p:stCondLst>
+                                        </p:cTn>
+                                        <p:tgtEl>
+                                          <p:spTgt spid="3">
+                                            <p:txEl>
+                                              <p:pRg st="1" end="1"/>
+                                            </p:txEl>
+                                          </p:spTgt>
+                                        </p:tgtEl>
+                                        <p:attrNameLst>
+                                          <p:attrName>style.visibility</p:attrName>
+                                        </p:attrNameLst>
+                                      </p:cBhvr>
+                                      <p:to>
+                                        <p:strVal val="visible"/>
+                                      </p:to>
+                                    </p:set>
+                                  </p:childTnLst>
+                                </p:cTn>
+                              </p:par>
+                            </p:childTnLst>
+                          </p:cTn>
+                        </p:par>
+                      </p:childTnLst>
+                    </p:cTn>
+                  </p:par>
+                  <p:par>
+                    <p:cTn id="11" fill="hold">
+                      <p:stCondLst>
+                        <p:cond delay="indefinite"/>
+                      </p:stCondLst>
+                      <p:childTnLst>
+                        <p:par>
+                          <p:cTn id="12" fill="hold">
+                            <p:stCondLst>
+                              <p:cond delay="0"/>
+                            </p:stCondLst>
+                            <p:childTnLst>
+                              <p:par>
+                                <p:cTn id="13" presetID="1" presetClass="entr" presetSubtype="0" fill="hold" nodeType="clickEffect">
+                                  <p:stCondLst>
+                                    <p:cond delay="0"/>
+                                  </p:stCondLst>
+                                  <p:childTnLst>
+                                    <p:set>
+                                      <p:cBhvr>
+                                        <p:cTn id="14" dur="1" fill="hold">
+                                          <p:stCondLst>
+                                            <p:cond delay="0"/>
+                                          </p:stCondLst>
+                                        </p:cTn>
+                                        <p:tgtEl>
+                                          <p:spTgt spid="3">
+                                            <p:txEl>
+                                              <p:pRg st="2" end="2"/>
+                                            </p:txEl>
+                                          </p:spTgt>
+                                        </p:tgtEl>
+                                        <p:attrNameLst>
+                                          <p:attrName>style.visibility</p:attrName>
+                                        </p:attrNameLst>
+                                      </p:cBhvr>
+                                      <p:to>
+                                        <p:strVal val="visible"/>
+                                      </p:to>
+                                    </p:set>
+                                  </p:childTnLst>
+                                </p:cTn>
+                              </p:par>
+                              <p:par>
+                                <p:cTn id="15" presetID="1" presetClass="entr" presetSubtype="0" fill="hold" nodeType="withEffect">
+                                  <p:stCondLst>
+                                    <p:cond delay="0"/>
+                                  </p:stCondLst>
+                                  <p:childTnLst>
+                                    <p:set>
+                                      <p:cBhvr>
+                                        <p:cTn id="16" dur="1" fill="hold">
+                                          <p:stCondLst>
+                                            <p:cond delay="0"/>
+                                          </p:stCondLst>
+                                        </p:cTn>
+                                        <p:tgtEl>
+                                          <p:spTgt spid="3">
+                                            <p:txEl>
+                                              <p:pRg st="3" end="3"/>
+                                            </p:txEl>
+                                          </p:spTgt>
+                                        </p:tgtEl>
+                                        <p:attrNameLst>
+                                          <p:attrName>style.visibility</p:attrName>
+                                        </p:attrNameLst>
+                                      </p:cBhvr>
+                                      <p:to>
+                                        <p:strVal val="visible"/>
+                                      </p:to>
+                                    </p:set>
+                                  </p:childTnLst>
+                                </p:cTn>
+                              </p:par>
+                              <p:par>
+                                <p:cTn id="17" presetID="1" presetClass="entr" presetSubtype="0" fill="hold" nodeType="withEffect">
+                                  <p:stCondLst>
+                                    <p:cond delay="0"/>
+                                  </p:stCondLst>
+                                  <p:childTnLst>
+                                    <p:set>
+                                      <p:cBhvr>
+                                        <p:cTn id="18" dur="1" fill="hold">
+                                          <p:stCondLst>
+                                            <p:cond delay="0"/>
+                                          </p:stCondLst>
+                                        </p:cTn>
+                                        <p:tgtEl>
+                                          <p:spTgt spid="3">
+                                            <p:txEl>
+                                              <p:pRg st="4" end="4"/>
+                                            </p:txEl>
+                                          </p:spTgt>
+                                        </p:tgtEl>
+                                        <p:attrNameLst>
+                                          <p:attrName>style.visibility</p:attrName>
+                                        </p:attrNameLst>
+                                      </p:cBhvr>
+                                      <p:to>
+                                        <p:strVal val="visible"/>
+                                      </p:to>
+                                    </p:set>
+                                  </p:childTnLst>
+                                </p:cTn>
+                              </p:par>
+                            </p:childTnLst>
+                          </p:cTn>
+                        </p:par>
+                      </p:childTnLst>
+                    </p:cTn>
+                  </p:par>
+                </p:childTnLst>
+              </p:cTn>
+              <p:prevCondLst>
+                <p:cond evt="onPrev" delay="0">
+                  <p:tgtEl>
+                    <p:sldTgt/>
+                  </p:tgtEl>
+                </p:cond>
+              </p:prevCondLst>
+              <p:nextCondLst>
+                <p:cond evt="onNext" delay="0">
+                  <p:tgtEl>
+                    <p:sldTgt/>
+                  </p:tgtEl>
+                </p:cond>
+              </p:nextCondLst>
+            </p:seq>
+          </p:childTnLst>
+        </p:cTn>
+      </p:par>
+    </p:tnLst>
+  </p:timing>
+</p:sld>
+</file>
+
 <file path=ppt/slides/slide2.xml><?xml version="1.0" encoding="utf-8"?>
 <p:sld xmlns:a="http://schemas.openxmlformats.org/drawingml/2006/main" xmlns:r="http://schemas.openxmlformats.org/officeDocument/2006/relationships" xmlns:p="http://schemas.openxmlformats.org/presentationml/2006/main">
   <p:cSld>
@@ -3923,7 +6496,7 @@
                   </a:schemeClr>
                 </a:solidFill>
               </a:rPr>
-              <a:t>in Julia via </a:t>
+              <a:t>in Julia </a:t>
             </a:r>
             <a:br>
               <a:rPr lang="en-US" sz="4400" dirty="0">
@@ -3942,7 +6515,7 @@
                   </a:schemeClr>
                 </a:solidFill>
               </a:rPr>
-              <a:t>the </a:t>
+              <a:t>via the </a:t>
             </a:r>
             <a:r>
               <a:rPr lang="en-US" sz="4400" dirty="0" err="1">
@@ -4032,7 +6605,7 @@
           </p:nvPr>
         </p:nvPicPr>
         <p:blipFill>
-          <a:blip r:embed="rId4">
+          <a:blip r:embed="rId5">
             <a:extLst>
               <a:ext uri="{28A0092B-C50C-407E-A947-70E740481C1C}">
                 <a14:useLocalDpi xmlns:a14="http://schemas.microsoft.com/office/drawing/2010/main" val="0"/>
@@ -4072,7 +6645,7 @@
           </p:nvPr>
         </p:nvPicPr>
         <p:blipFill>
-          <a:blip r:embed="rId5">
+          <a:blip r:embed="rId6">
             <a:extLst>
               <a:ext uri="{28A0092B-C50C-407E-A947-70E740481C1C}">
                 <a14:useLocalDpi xmlns:a14="http://schemas.microsoft.com/office/drawing/2010/main" val="0"/>
@@ -4177,7 +6750,21 @@
           <a:p>
             <a:r>
               <a:rPr lang="en-US" sz="4400" dirty="0"/>
-              <a:t>Algorithmic solution </a:t>
+              <a:t>Algorithmic </a:t>
+            </a:r>
+            <a:r>
+              <a:rPr lang="en-US" sz="4400" dirty="0">
+                <a:solidFill>
+                  <a:schemeClr val="bg1">
+                    <a:lumMod val="65000"/>
+                  </a:schemeClr>
+                </a:solidFill>
+              </a:rPr>
+              <a:t>solution</a:t>
+            </a:r>
+            <a:r>
+              <a:rPr lang="en-US" sz="4400" dirty="0"/>
+              <a:t> </a:t>
             </a:r>
             <a:r>
               <a:rPr lang="en-US" sz="4400" dirty="0">
@@ -4225,11 +6812,27 @@
                   </a:schemeClr>
                 </a:solidFill>
               </a:rPr>
-              <a:t>in Julia via </a:t>
+              <a:t>in Julia </a:t>
             </a:r>
             <a:br>
-              <a:rPr lang="en-US" sz="4400" dirty="0"/>
+              <a:rPr lang="en-US" sz="4400" dirty="0">
+                <a:solidFill>
+                  <a:schemeClr val="bg1">
+                    <a:lumMod val="65000"/>
+                  </a:schemeClr>
+                </a:solidFill>
+              </a:rPr>
             </a:br>
+            <a:r>
+              <a:rPr lang="en-US" sz="4400" dirty="0">
+                <a:solidFill>
+                  <a:schemeClr val="bg1">
+                    <a:lumMod val="65000"/>
+                  </a:schemeClr>
+                </a:solidFill>
+              </a:rPr>
+              <a:t>via </a:t>
+            </a:r>
             <a:r>
               <a:rPr lang="en-US" sz="4400" dirty="0"/>
               <a:t>the </a:t>
@@ -4271,7 +6874,15 @@
             <a:pPr algn="l"/>
             <a:r>
               <a:rPr lang="en-US" dirty="0"/>
-              <a:t>*A method to solve a certain class of partial differential equations (PDEs) algorithmically.</a:t>
+              <a:t>*A method to solve a certain class of partial differential equations (PDEs) algorithmically</a:t>
+            </a:r>
+            <a:r>
+              <a:rPr lang="en-US" baseline="30000" dirty="0"/>
+              <a:t>1</a:t>
+            </a:r>
+            <a:r>
+              <a:rPr lang="en-US" dirty="0"/>
+              <a:t>.</a:t>
             </a:r>
           </a:p>
         </p:txBody>
@@ -4302,6 +6913,62 @@
               <a:t>3</a:t>
             </a:fld>
             <a:endParaRPr lang="en-US"/>
+          </a:p>
+        </p:txBody>
+      </p:sp>
+      <p:sp>
+        <p:nvSpPr>
+          <p:cNvPr id="5" name="TextBox 4">
+            <a:extLst>
+              <a:ext uri="{FF2B5EF4-FFF2-40B4-BE49-F238E27FC236}">
+                <a16:creationId xmlns:a16="http://schemas.microsoft.com/office/drawing/2014/main" id="{D2CAC037-AC84-433B-8CD6-063DDFEB7F90}"/>
+              </a:ext>
+            </a:extLst>
+          </p:cNvPr>
+          <p:cNvSpPr txBox="1"/>
+          <p:nvPr/>
+        </p:nvSpPr>
+        <p:spPr>
+          <a:xfrm>
+            <a:off x="1524001" y="6177158"/>
+            <a:ext cx="9144000" cy="646331"/>
+          </a:xfrm>
+          <a:prstGeom prst="rect">
+            <a:avLst/>
+          </a:prstGeom>
+          <a:noFill/>
+        </p:spPr>
+        <p:txBody>
+          <a:bodyPr wrap="square" rtlCol="0">
+            <a:spAutoFit/>
+          </a:bodyPr>
+          <a:lstStyle/>
+          <a:p>
+            <a:r>
+              <a:rPr lang="en-US" baseline="30000" dirty="0"/>
+              <a:t>1</a:t>
+            </a:r>
+            <a:r>
+              <a:rPr lang="en-US" dirty="0"/>
+              <a:t>D. A. Smith and A.S. </a:t>
+            </a:r>
+            <a:r>
+              <a:rPr lang="en-US" dirty="0" err="1"/>
+              <a:t>Fokas</a:t>
+            </a:r>
+            <a:r>
+              <a:rPr lang="en-US" dirty="0"/>
+              <a:t>. Evolution PDEs and augmented eigenfunctions. Half-line. </a:t>
+            </a:r>
+            <a:r>
+              <a:rPr lang="en-US" i="1" dirty="0"/>
+              <a:t>Journal of Spectral Theory</a:t>
+            </a:r>
+            <a:r>
+              <a:rPr lang="en-US" dirty="0"/>
+              <a:t>, 6(1):185-213, 2016.</a:t>
+            </a:r>
+            <a:endParaRPr lang="en-US" baseline="30000" dirty="0"/>
           </a:p>
         </p:txBody>
       </p:sp>
@@ -4410,24 +7077,8 @@
               <a:rPr lang="en-US" sz="4400" dirty="0"/>
               <a:t>Julia </a:t>
             </a:r>
-            <a:r>
-              <a:rPr lang="en-US" sz="4400" dirty="0">
-                <a:solidFill>
-                  <a:schemeClr val="bg1">
-                    <a:lumMod val="65000"/>
-                  </a:schemeClr>
-                </a:solidFill>
-              </a:rPr>
-              <a:t>via </a:t>
-            </a:r>
             <a:br>
-              <a:rPr lang="en-US" sz="4400" dirty="0">
-                <a:solidFill>
-                  <a:schemeClr val="bg1">
-                    <a:lumMod val="65000"/>
-                  </a:schemeClr>
-                </a:solidFill>
-              </a:rPr>
+              <a:rPr lang="en-US" sz="4400" dirty="0"/>
             </a:br>
             <a:r>
               <a:rPr lang="en-US" sz="4400" dirty="0">
@@ -4437,7 +7088,7 @@
                   </a:schemeClr>
                 </a:solidFill>
               </a:rPr>
-              <a:t>the </a:t>
+              <a:t>via the </a:t>
             </a:r>
             <a:r>
               <a:rPr lang="en-US" sz="4400" dirty="0" err="1">
@@ -4647,7 +7298,7 @@
       </p:sp>
       <p:sp>
         <p:nvSpPr>
-          <p:cNvPr id="8" name="Rectangle 7">
+          <p:cNvPr id="8" name="Rectangle: Rounded Corners 7">
             <a:extLst>
               <a:ext uri="{FF2B5EF4-FFF2-40B4-BE49-F238E27FC236}">
                 <a16:creationId xmlns:a16="http://schemas.microsoft.com/office/drawing/2014/main" id="{33AAA2E5-B484-4AFB-924D-9B5ED02BE777}"/>
@@ -4662,7 +7313,7 @@
             <a:off x="1732722" y="5014085"/>
             <a:ext cx="2544418" cy="1162878"/>
           </a:xfrm>
-          <a:prstGeom prst="rect">
+          <a:prstGeom prst="roundRect">
             <a:avLst/>
           </a:prstGeom>
         </p:spPr>
@@ -4690,18 +7341,11 @@
               <a:t>PDE</a:t>
             </a:r>
           </a:p>
-          <a:p>
-            <a:pPr algn="ctr"/>
-            <a:r>
-              <a:rPr lang="en-US" sz="2000" dirty="0"/>
-              <a:t>(with certain parameters)</a:t>
-            </a:r>
-          </a:p>
         </p:txBody>
       </p:sp>
       <p:sp>
         <p:nvSpPr>
-          <p:cNvPr id="9" name="Rectangle 8">
+          <p:cNvPr id="9" name="Rectangle: Rounded Corners 8">
             <a:extLst>
               <a:ext uri="{FF2B5EF4-FFF2-40B4-BE49-F238E27FC236}">
                 <a16:creationId xmlns:a16="http://schemas.microsoft.com/office/drawing/2014/main" id="{198C7055-4EED-41E9-AD0F-B8AEBFB19903}"/>
@@ -4716,7 +7360,7 @@
             <a:off x="1732722" y="2482920"/>
             <a:ext cx="2544418" cy="1162878"/>
           </a:xfrm>
-          <a:prstGeom prst="rect">
+          <a:prstGeom prst="roundRect">
             <a:avLst/>
           </a:prstGeom>
         </p:spPr>
@@ -4762,10 +7406,7 @@
               </a:ext>
             </a:extLst>
           </p:cNvPr>
-          <p:cNvCxnSpPr>
-            <a:stCxn id="8" idx="0"/>
-            <a:endCxn id="9" idx="2"/>
-          </p:cNvCxnSpPr>
+          <p:cNvCxnSpPr/>
           <p:nvPr/>
         </p:nvCxnSpPr>
         <p:spPr>
@@ -4841,7 +7482,7 @@
       </p:sp>
       <p:sp>
         <p:nvSpPr>
-          <p:cNvPr id="13" name="Rectangle 12">
+          <p:cNvPr id="13" name="Rectangle: Rounded Corners 12">
             <a:extLst>
               <a:ext uri="{FF2B5EF4-FFF2-40B4-BE49-F238E27FC236}">
                 <a16:creationId xmlns:a16="http://schemas.microsoft.com/office/drawing/2014/main" id="{D7C054A4-CB49-41E4-9B41-6D79AB000755}"/>
@@ -4856,7 +7497,7 @@
             <a:off x="7437782" y="5014085"/>
             <a:ext cx="2544418" cy="1162878"/>
           </a:xfrm>
-          <a:prstGeom prst="rect">
+          <a:prstGeom prst="roundRect">
             <a:avLst/>
           </a:prstGeom>
         </p:spPr>
@@ -4888,7 +7529,7 @@
       </p:sp>
       <p:sp>
         <p:nvSpPr>
-          <p:cNvPr id="14" name="Rectangle 13">
+          <p:cNvPr id="14" name="Rectangle: Rounded Corners 13">
             <a:extLst>
               <a:ext uri="{FF2B5EF4-FFF2-40B4-BE49-F238E27FC236}">
                 <a16:creationId xmlns:a16="http://schemas.microsoft.com/office/drawing/2014/main" id="{C0A02385-9F7E-43E7-B6FA-547A419C132C}"/>
@@ -4903,7 +7544,7 @@
             <a:off x="7437782" y="2482920"/>
             <a:ext cx="2544418" cy="1162878"/>
           </a:xfrm>
-          <a:prstGeom prst="rect">
+          <a:prstGeom prst="roundRect">
             <a:avLst/>
           </a:prstGeom>
         </p:spPr>
@@ -4944,8 +7585,6 @@
           </p:cNvPr>
           <p:cNvCxnSpPr>
             <a:cxnSpLocks/>
-            <a:stCxn id="9" idx="3"/>
-            <a:endCxn id="14" idx="1"/>
           </p:cNvCxnSpPr>
           <p:nvPr/>
         </p:nvCxnSpPr>
@@ -4985,10 +7624,7 @@
               </a:ext>
             </a:extLst>
           </p:cNvPr>
-          <p:cNvCxnSpPr>
-            <a:stCxn id="14" idx="2"/>
-            <a:endCxn id="13" idx="0"/>
-          </p:cNvCxnSpPr>
+          <p:cNvCxnSpPr/>
           <p:nvPr/>
         </p:nvCxnSpPr>
         <p:spPr>
@@ -5140,10 +7776,7 @@
               </a:ext>
             </a:extLst>
           </p:cNvPr>
-          <p:cNvCxnSpPr>
-            <a:stCxn id="8" idx="3"/>
-            <a:endCxn id="13" idx="1"/>
-          </p:cNvCxnSpPr>
+          <p:cNvCxnSpPr/>
           <p:nvPr/>
         </p:nvCxnSpPr>
         <p:spPr>
@@ -5183,6 +7816,388 @@
   <p:clrMapOvr>
     <a:masterClrMapping/>
   </p:clrMapOvr>
+  <p:timing>
+    <p:tnLst>
+      <p:par>
+        <p:cTn id="1" dur="indefinite" restart="never" nodeType="tmRoot">
+          <p:childTnLst>
+            <p:seq concurrent="1" nextAc="seek">
+              <p:cTn id="2" dur="indefinite" nodeType="mainSeq">
+                <p:childTnLst>
+                  <p:par>
+                    <p:cTn id="3" fill="hold">
+                      <p:stCondLst>
+                        <p:cond delay="indefinite"/>
+                      </p:stCondLst>
+                      <p:childTnLst>
+                        <p:par>
+                          <p:cTn id="4" fill="hold">
+                            <p:stCondLst>
+                              <p:cond delay="0"/>
+                            </p:stCondLst>
+                            <p:childTnLst>
+                              <p:par>
+                                <p:cTn id="5" presetID="1" presetClass="entr" presetSubtype="0" fill="hold" grpId="0" nodeType="clickEffect">
+                                  <p:stCondLst>
+                                    <p:cond delay="0"/>
+                                  </p:stCondLst>
+                                  <p:childTnLst>
+                                    <p:set>
+                                      <p:cBhvr>
+                                        <p:cTn id="6" dur="1" fill="hold">
+                                          <p:stCondLst>
+                                            <p:cond delay="0"/>
+                                          </p:stCondLst>
+                                        </p:cTn>
+                                        <p:tgtEl>
+                                          <p:spTgt spid="9"/>
+                                        </p:tgtEl>
+                                        <p:attrNameLst>
+                                          <p:attrName>style.visibility</p:attrName>
+                                        </p:attrNameLst>
+                                      </p:cBhvr>
+                                      <p:to>
+                                        <p:strVal val="visible"/>
+                                      </p:to>
+                                    </p:set>
+                                  </p:childTnLst>
+                                </p:cTn>
+                              </p:par>
+                              <p:par>
+                                <p:cTn id="7" presetID="1" presetClass="entr" presetSubtype="0" fill="hold" nodeType="withEffect">
+                                  <p:stCondLst>
+                                    <p:cond delay="0"/>
+                                  </p:stCondLst>
+                                  <p:childTnLst>
+                                    <p:set>
+                                      <p:cBhvr>
+                                        <p:cTn id="8" dur="1" fill="hold">
+                                          <p:stCondLst>
+                                            <p:cond delay="0"/>
+                                          </p:stCondLst>
+                                        </p:cTn>
+                                        <p:tgtEl>
+                                          <p:spTgt spid="16"/>
+                                        </p:tgtEl>
+                                        <p:attrNameLst>
+                                          <p:attrName>style.visibility</p:attrName>
+                                        </p:attrNameLst>
+                                      </p:cBhvr>
+                                      <p:to>
+                                        <p:strVal val="visible"/>
+                                      </p:to>
+                                    </p:set>
+                                  </p:childTnLst>
+                                </p:cTn>
+                              </p:par>
+                              <p:par>
+                                <p:cTn id="9" presetID="1" presetClass="entr" presetSubtype="0" fill="hold" grpId="0" nodeType="withEffect">
+                                  <p:stCondLst>
+                                    <p:cond delay="0"/>
+                                  </p:stCondLst>
+                                  <p:childTnLst>
+                                    <p:set>
+                                      <p:cBhvr>
+                                        <p:cTn id="10" dur="1" fill="hold">
+                                          <p:stCondLst>
+                                            <p:cond delay="0"/>
+                                          </p:stCondLst>
+                                        </p:cTn>
+                                        <p:tgtEl>
+                                          <p:spTgt spid="14"/>
+                                        </p:tgtEl>
+                                        <p:attrNameLst>
+                                          <p:attrName>style.visibility</p:attrName>
+                                        </p:attrNameLst>
+                                      </p:cBhvr>
+                                      <p:to>
+                                        <p:strVal val="visible"/>
+                                      </p:to>
+                                    </p:set>
+                                  </p:childTnLst>
+                                </p:cTn>
+                              </p:par>
+                              <p:par>
+                                <p:cTn id="11" presetID="1" presetClass="entr" presetSubtype="0" fill="hold" nodeType="withEffect">
+                                  <p:stCondLst>
+                                    <p:cond delay="0"/>
+                                  </p:stCondLst>
+                                  <p:childTnLst>
+                                    <p:set>
+                                      <p:cBhvr>
+                                        <p:cTn id="12" dur="1" fill="hold">
+                                          <p:stCondLst>
+                                            <p:cond delay="0"/>
+                                          </p:stCondLst>
+                                        </p:cTn>
+                                        <p:tgtEl>
+                                          <p:spTgt spid="18"/>
+                                        </p:tgtEl>
+                                        <p:attrNameLst>
+                                          <p:attrName>style.visibility</p:attrName>
+                                        </p:attrNameLst>
+                                      </p:cBhvr>
+                                      <p:to>
+                                        <p:strVal val="visible"/>
+                                      </p:to>
+                                    </p:set>
+                                  </p:childTnLst>
+                                </p:cTn>
+                              </p:par>
+                              <p:par>
+                                <p:cTn id="13" presetID="1" presetClass="entr" presetSubtype="0" fill="hold" grpId="0" nodeType="withEffect">
+                                  <p:stCondLst>
+                                    <p:cond delay="0"/>
+                                  </p:stCondLst>
+                                  <p:childTnLst>
+                                    <p:set>
+                                      <p:cBhvr>
+                                        <p:cTn id="14" dur="1" fill="hold">
+                                          <p:stCondLst>
+                                            <p:cond delay="0"/>
+                                          </p:stCondLst>
+                                        </p:cTn>
+                                        <p:tgtEl>
+                                          <p:spTgt spid="21"/>
+                                        </p:tgtEl>
+                                        <p:attrNameLst>
+                                          <p:attrName>style.visibility</p:attrName>
+                                        </p:attrNameLst>
+                                      </p:cBhvr>
+                                      <p:to>
+                                        <p:strVal val="visible"/>
+                                      </p:to>
+                                    </p:set>
+                                  </p:childTnLst>
+                                </p:cTn>
+                              </p:par>
+                              <p:par>
+                                <p:cTn id="15" presetID="1" presetClass="entr" presetSubtype="0" fill="hold" grpId="0" nodeType="withEffect">
+                                  <p:stCondLst>
+                                    <p:cond delay="0"/>
+                                  </p:stCondLst>
+                                  <p:childTnLst>
+                                    <p:set>
+                                      <p:cBhvr>
+                                        <p:cTn id="16" dur="1" fill="hold">
+                                          <p:stCondLst>
+                                            <p:cond delay="0"/>
+                                          </p:stCondLst>
+                                        </p:cTn>
+                                        <p:tgtEl>
+                                          <p:spTgt spid="13"/>
+                                        </p:tgtEl>
+                                        <p:attrNameLst>
+                                          <p:attrName>style.visibility</p:attrName>
+                                        </p:attrNameLst>
+                                      </p:cBhvr>
+                                      <p:to>
+                                        <p:strVal val="visible"/>
+                                      </p:to>
+                                    </p:set>
+                                  </p:childTnLst>
+                                </p:cTn>
+                              </p:par>
+                              <p:par>
+                                <p:cTn id="17" presetID="1" presetClass="entr" presetSubtype="0" fill="hold" grpId="0" nodeType="withEffect">
+                                  <p:stCondLst>
+                                    <p:cond delay="0"/>
+                                  </p:stCondLst>
+                                  <p:childTnLst>
+                                    <p:set>
+                                      <p:cBhvr>
+                                        <p:cTn id="18" dur="1" fill="hold">
+                                          <p:stCondLst>
+                                            <p:cond delay="0"/>
+                                          </p:stCondLst>
+                                        </p:cTn>
+                                        <p:tgtEl>
+                                          <p:spTgt spid="22"/>
+                                        </p:tgtEl>
+                                        <p:attrNameLst>
+                                          <p:attrName>style.visibility</p:attrName>
+                                        </p:attrNameLst>
+                                      </p:cBhvr>
+                                      <p:to>
+                                        <p:strVal val="visible"/>
+                                      </p:to>
+                                    </p:set>
+                                  </p:childTnLst>
+                                </p:cTn>
+                              </p:par>
+                              <p:par>
+                                <p:cTn id="19" presetID="1" presetClass="entr" presetSubtype="0" fill="hold" nodeType="withEffect">
+                                  <p:stCondLst>
+                                    <p:cond delay="0"/>
+                                  </p:stCondLst>
+                                  <p:childTnLst>
+                                    <p:set>
+                                      <p:cBhvr>
+                                        <p:cTn id="20" dur="1" fill="hold">
+                                          <p:stCondLst>
+                                            <p:cond delay="0"/>
+                                          </p:stCondLst>
+                                        </p:cTn>
+                                        <p:tgtEl>
+                                          <p:spTgt spid="26"/>
+                                        </p:tgtEl>
+                                        <p:attrNameLst>
+                                          <p:attrName>style.visibility</p:attrName>
+                                        </p:attrNameLst>
+                                      </p:cBhvr>
+                                      <p:to>
+                                        <p:strVal val="visible"/>
+                                      </p:to>
+                                    </p:set>
+                                  </p:childTnLst>
+                                </p:cTn>
+                              </p:par>
+                              <p:par>
+                                <p:cTn id="21" presetID="1" presetClass="entr" presetSubtype="0" fill="hold" grpId="0" nodeType="withEffect">
+                                  <p:stCondLst>
+                                    <p:cond delay="0"/>
+                                  </p:stCondLst>
+                                  <p:childTnLst>
+                                    <p:set>
+                                      <p:cBhvr>
+                                        <p:cTn id="22" dur="1" fill="hold">
+                                          <p:stCondLst>
+                                            <p:cond delay="0"/>
+                                          </p:stCondLst>
+                                        </p:cTn>
+                                        <p:tgtEl>
+                                          <p:spTgt spid="24"/>
+                                        </p:tgtEl>
+                                        <p:attrNameLst>
+                                          <p:attrName>style.visibility</p:attrName>
+                                        </p:attrNameLst>
+                                      </p:cBhvr>
+                                      <p:to>
+                                        <p:strVal val="visible"/>
+                                      </p:to>
+                                    </p:set>
+                                  </p:childTnLst>
+                                </p:cTn>
+                              </p:par>
+                              <p:par>
+                                <p:cTn id="23" presetID="1" presetClass="entr" presetSubtype="0" fill="hold" grpId="0" nodeType="withEffect">
+                                  <p:stCondLst>
+                                    <p:cond delay="0"/>
+                                  </p:stCondLst>
+                                  <p:childTnLst>
+                                    <p:set>
+                                      <p:cBhvr>
+                                        <p:cTn id="24" dur="1" fill="hold">
+                                          <p:stCondLst>
+                                            <p:cond delay="0"/>
+                                          </p:stCondLst>
+                                        </p:cTn>
+                                        <p:tgtEl>
+                                          <p:spTgt spid="8"/>
+                                        </p:tgtEl>
+                                        <p:attrNameLst>
+                                          <p:attrName>style.visibility</p:attrName>
+                                        </p:attrNameLst>
+                                      </p:cBhvr>
+                                      <p:to>
+                                        <p:strVal val="visible"/>
+                                      </p:to>
+                                    </p:set>
+                                  </p:childTnLst>
+                                </p:cTn>
+                              </p:par>
+                              <p:par>
+                                <p:cTn id="25" presetID="1" presetClass="entr" presetSubtype="0" fill="hold" grpId="0" nodeType="withEffect">
+                                  <p:stCondLst>
+                                    <p:cond delay="0"/>
+                                  </p:stCondLst>
+                                  <p:childTnLst>
+                                    <p:set>
+                                      <p:cBhvr>
+                                        <p:cTn id="26" dur="1" fill="hold">
+                                          <p:stCondLst>
+                                            <p:cond delay="0"/>
+                                          </p:stCondLst>
+                                        </p:cTn>
+                                        <p:tgtEl>
+                                          <p:spTgt spid="12"/>
+                                        </p:tgtEl>
+                                        <p:attrNameLst>
+                                          <p:attrName>style.visibility</p:attrName>
+                                        </p:attrNameLst>
+                                      </p:cBhvr>
+                                      <p:to>
+                                        <p:strVal val="visible"/>
+                                      </p:to>
+                                    </p:set>
+                                  </p:childTnLst>
+                                </p:cTn>
+                              </p:par>
+                              <p:par>
+                                <p:cTn id="27" presetID="1" presetClass="entr" presetSubtype="0" fill="hold" nodeType="withEffect">
+                                  <p:stCondLst>
+                                    <p:cond delay="0"/>
+                                  </p:stCondLst>
+                                  <p:childTnLst>
+                                    <p:set>
+                                      <p:cBhvr>
+                                        <p:cTn id="28" dur="1" fill="hold">
+                                          <p:stCondLst>
+                                            <p:cond delay="0"/>
+                                          </p:stCondLst>
+                                        </p:cTn>
+                                        <p:tgtEl>
+                                          <p:spTgt spid="11"/>
+                                        </p:tgtEl>
+                                        <p:attrNameLst>
+                                          <p:attrName>style.visibility</p:attrName>
+                                        </p:attrNameLst>
+                                      </p:cBhvr>
+                                      <p:to>
+                                        <p:strVal val="visible"/>
+                                      </p:to>
+                                    </p:set>
+                                  </p:childTnLst>
+                                </p:cTn>
+                              </p:par>
+                            </p:childTnLst>
+                          </p:cTn>
+                        </p:par>
+                      </p:childTnLst>
+                    </p:cTn>
+                  </p:par>
+                </p:childTnLst>
+              </p:cTn>
+              <p:prevCondLst>
+                <p:cond evt="onPrev" delay="0">
+                  <p:tgtEl>
+                    <p:sldTgt/>
+                  </p:tgtEl>
+                </p:cond>
+              </p:prevCondLst>
+              <p:nextCondLst>
+                <p:cond evt="onNext" delay="0">
+                  <p:tgtEl>
+                    <p:sldTgt/>
+                  </p:tgtEl>
+                </p:cond>
+              </p:nextCondLst>
+            </p:seq>
+          </p:childTnLst>
+        </p:cTn>
+      </p:par>
+    </p:tnLst>
+    <p:bldLst>
+      <p:bldP spid="8" grpId="0" animBg="1"/>
+      <p:bldP spid="9" grpId="0" animBg="1"/>
+      <p:bldP spid="12" grpId="0"/>
+      <p:bldP spid="13" grpId="0" animBg="1"/>
+      <p:bldP spid="14" grpId="0" animBg="1"/>
+      <p:bldP spid="21" grpId="0"/>
+      <p:bldP spid="22" grpId="0"/>
+      <p:bldP spid="24" grpId="0"/>
+    </p:bldLst>
+  </p:timing>
 </p:sld>
 </file>
 
@@ -5290,7 +8305,7 @@
       </p:sp>
       <p:sp>
         <p:nvSpPr>
-          <p:cNvPr id="8" name="Rectangle 7">
+          <p:cNvPr id="8" name="Rectangle: Rounded Corners 7">
             <a:extLst>
               <a:ext uri="{FF2B5EF4-FFF2-40B4-BE49-F238E27FC236}">
                 <a16:creationId xmlns:a16="http://schemas.microsoft.com/office/drawing/2014/main" id="{33AAA2E5-B484-4AFB-924D-9B5ED02BE777}"/>
@@ -5305,7 +8320,7 @@
             <a:off x="1732722" y="5014085"/>
             <a:ext cx="2544418" cy="1162878"/>
           </a:xfrm>
-          <a:prstGeom prst="rect">
+          <a:prstGeom prst="roundRect">
             <a:avLst/>
           </a:prstGeom>
         </p:spPr>
@@ -5333,18 +8348,11 @@
               <a:t>PDE</a:t>
             </a:r>
           </a:p>
-          <a:p>
-            <a:pPr algn="ctr"/>
-            <a:r>
-              <a:rPr lang="en-US" sz="2000" dirty="0"/>
-              <a:t>(with certain parameters)</a:t>
-            </a:r>
-          </a:p>
         </p:txBody>
       </p:sp>
       <p:sp>
         <p:nvSpPr>
-          <p:cNvPr id="13" name="Rectangle 12">
+          <p:cNvPr id="13" name="Rectangle: Rounded Corners 12">
             <a:extLst>
               <a:ext uri="{FF2B5EF4-FFF2-40B4-BE49-F238E27FC236}">
                 <a16:creationId xmlns:a16="http://schemas.microsoft.com/office/drawing/2014/main" id="{D7C054A4-CB49-41E4-9B41-6D79AB000755}"/>
@@ -5359,7 +8367,7 @@
             <a:off x="7437782" y="5014085"/>
             <a:ext cx="2544418" cy="1162878"/>
           </a:xfrm>
-          <a:prstGeom prst="rect">
+          <a:prstGeom prst="roundRect">
             <a:avLst/>
           </a:prstGeom>
         </p:spPr>
@@ -22264,7 +25272,7 @@
       </p:sp>
       <p:sp>
         <p:nvSpPr>
-          <p:cNvPr id="8" name="Rectangle 7">
+          <p:cNvPr id="8" name="Rectangle: Rounded Corners 7">
             <a:extLst>
               <a:ext uri="{FF2B5EF4-FFF2-40B4-BE49-F238E27FC236}">
                 <a16:creationId xmlns:a16="http://schemas.microsoft.com/office/drawing/2014/main" id="{33AAA2E5-B484-4AFB-924D-9B5ED02BE777}"/>
@@ -22279,7 +25287,7 @@
             <a:off x="1732722" y="5014085"/>
             <a:ext cx="2544418" cy="1162878"/>
           </a:xfrm>
-          <a:prstGeom prst="rect">
+          <a:prstGeom prst="roundRect">
             <a:avLst/>
           </a:prstGeom>
         </p:spPr>
@@ -22307,18 +25315,11 @@
               <a:t>PDE</a:t>
             </a:r>
           </a:p>
-          <a:p>
-            <a:pPr algn="ctr"/>
-            <a:r>
-              <a:rPr lang="en-US" sz="2000" dirty="0"/>
-              <a:t>(with certain parameters)</a:t>
-            </a:r>
-          </a:p>
         </p:txBody>
       </p:sp>
       <p:sp>
         <p:nvSpPr>
-          <p:cNvPr id="9" name="Rectangle 8">
+          <p:cNvPr id="9" name="Rectangle: Rounded Corners 8">
             <a:extLst>
               <a:ext uri="{FF2B5EF4-FFF2-40B4-BE49-F238E27FC236}">
                 <a16:creationId xmlns:a16="http://schemas.microsoft.com/office/drawing/2014/main" id="{198C7055-4EED-41E9-AD0F-B8AEBFB19903}"/>
@@ -22333,7 +25334,7 @@
             <a:off x="1732722" y="2482920"/>
             <a:ext cx="2544418" cy="1162878"/>
           </a:xfrm>
-          <a:prstGeom prst="rect">
+          <a:prstGeom prst="roundRect">
             <a:avLst/>
           </a:prstGeom>
         </p:spPr>
@@ -22361,13 +25362,6 @@
               <a:t>ODE</a:t>
             </a:r>
           </a:p>
-          <a:p>
-            <a:pPr algn="ctr"/>
-            <a:r>
-              <a:rPr lang="en-US" sz="2000" dirty="0"/>
-              <a:t>(Ordinary differential equations)</a:t>
-            </a:r>
-          </a:p>
         </p:txBody>
       </p:sp>
       <p:cxnSp>
@@ -22379,10 +25373,7 @@
               </a:ext>
             </a:extLst>
           </p:cNvPr>
-          <p:cNvCxnSpPr>
-            <a:stCxn id="8" idx="0"/>
-            <a:endCxn id="9" idx="2"/>
-          </p:cNvCxnSpPr>
+          <p:cNvCxnSpPr/>
           <p:nvPr/>
         </p:nvCxnSpPr>
         <p:spPr>
@@ -22427,7 +25418,7 @@
         </p:nvSpPr>
         <p:spPr>
           <a:xfrm>
-            <a:off x="258423" y="4099108"/>
+            <a:off x="27876" y="3920206"/>
             <a:ext cx="2948597" cy="461665"/>
           </a:xfrm>
           <a:prstGeom prst="rect">
@@ -22455,7 +25446,7 @@
       </p:sp>
       <p:sp>
         <p:nvSpPr>
-          <p:cNvPr id="13" name="Rectangle 12">
+          <p:cNvPr id="13" name="Rectangle: Rounded Corners 12">
             <a:extLst>
               <a:ext uri="{FF2B5EF4-FFF2-40B4-BE49-F238E27FC236}">
                 <a16:creationId xmlns:a16="http://schemas.microsoft.com/office/drawing/2014/main" id="{D7C054A4-CB49-41E4-9B41-6D79AB000755}"/>
@@ -22470,7 +25461,7 @@
             <a:off x="7437782" y="5014085"/>
             <a:ext cx="2544418" cy="1162878"/>
           </a:xfrm>
-          <a:prstGeom prst="rect">
+          <a:prstGeom prst="roundRect">
             <a:avLst/>
           </a:prstGeom>
         </p:spPr>
@@ -22502,7 +25493,7 @@
       </p:sp>
       <p:sp>
         <p:nvSpPr>
-          <p:cNvPr id="14" name="Rectangle 13">
+          <p:cNvPr id="14" name="Rectangle: Rounded Corners 13">
             <a:extLst>
               <a:ext uri="{FF2B5EF4-FFF2-40B4-BE49-F238E27FC236}">
                 <a16:creationId xmlns:a16="http://schemas.microsoft.com/office/drawing/2014/main" id="{C0A02385-9F7E-43E7-B6FA-547A419C132C}"/>
@@ -22517,7 +25508,7 @@
             <a:off x="7437782" y="2482920"/>
             <a:ext cx="2544418" cy="1162878"/>
           </a:xfrm>
-          <a:prstGeom prst="rect">
+          <a:prstGeom prst="roundRect">
             <a:avLst/>
           </a:prstGeom>
         </p:spPr>
@@ -22558,8 +25549,6 @@
           </p:cNvPr>
           <p:cNvCxnSpPr>
             <a:cxnSpLocks/>
-            <a:stCxn id="9" idx="3"/>
-            <a:endCxn id="14" idx="1"/>
           </p:cNvCxnSpPr>
           <p:nvPr/>
         </p:nvCxnSpPr>
@@ -22599,10 +25588,7 @@
               </a:ext>
             </a:extLst>
           </p:cNvPr>
-          <p:cNvCxnSpPr>
-            <a:stCxn id="14" idx="2"/>
-            <a:endCxn id="13" idx="0"/>
-          </p:cNvCxnSpPr>
+          <p:cNvCxnSpPr/>
           <p:nvPr/>
         </p:nvCxnSpPr>
         <p:spPr>
@@ -22646,7 +25632,7 @@
         </p:nvSpPr>
         <p:spPr>
           <a:xfrm>
-            <a:off x="8709991" y="4099108"/>
+            <a:off x="8979693" y="3920206"/>
             <a:ext cx="2948597" cy="461665"/>
           </a:xfrm>
           <a:prstGeom prst="rect">
@@ -22754,10 +25740,7 @@
               </a:ext>
             </a:extLst>
           </p:cNvPr>
-          <p:cNvCxnSpPr>
-            <a:stCxn id="8" idx="3"/>
-            <a:endCxn id="13" idx="1"/>
-          </p:cNvCxnSpPr>
+          <p:cNvCxnSpPr/>
           <p:nvPr/>
         </p:nvCxnSpPr>
         <p:spPr>
@@ -22789,10 +25772,10 @@
       </p:cxnSp>
       <p:pic>
         <p:nvPicPr>
-          <p:cNvPr id="10" name="Picture 9">
+          <p:cNvPr id="19" name="Picture 18">
             <a:extLst>
               <a:ext uri="{FF2B5EF4-FFF2-40B4-BE49-F238E27FC236}">
-                <a16:creationId xmlns:a16="http://schemas.microsoft.com/office/drawing/2014/main" id="{F4A8E815-8D3C-421B-9E1D-7A2F38B8CA00}"/>
+                <a16:creationId xmlns:a16="http://schemas.microsoft.com/office/drawing/2014/main" id="{CF06BE57-FA7F-405B-8B03-F7D29753F3CD}"/>
               </a:ext>
             </a:extLst>
           </p:cNvPr>
@@ -22806,7 +25789,7 @@
           </p:nvPr>
         </p:nvPicPr>
         <p:blipFill>
-          <a:blip r:embed="rId4">
+          <a:blip r:embed="rId5">
             <a:extLst>
               <a:ext uri="{28A0092B-C50C-407E-A947-70E740481C1C}">
                 <a14:useLocalDpi xmlns:a14="http://schemas.microsoft.com/office/drawing/2010/main" val="0"/>
@@ -22819,8 +25802,8 @@
         </p:blipFill>
         <p:spPr>
           <a:xfrm>
-            <a:off x="416557" y="4610156"/>
-            <a:ext cx="2485334" cy="251429"/>
+            <a:off x="119825" y="4381252"/>
+            <a:ext cx="2828191" cy="251429"/>
           </a:xfrm>
           <a:prstGeom prst="rect">
             <a:avLst/>
@@ -22829,10 +25812,10 @@
       </p:pic>
       <p:pic>
         <p:nvPicPr>
-          <p:cNvPr id="23" name="Picture 22">
+          <p:cNvPr id="25" name="Picture 24">
             <a:extLst>
               <a:ext uri="{FF2B5EF4-FFF2-40B4-BE49-F238E27FC236}">
-                <a16:creationId xmlns:a16="http://schemas.microsoft.com/office/drawing/2014/main" id="{5EBE531B-A14F-433D-86AE-C35D42272A1B}"/>
+                <a16:creationId xmlns:a16="http://schemas.microsoft.com/office/drawing/2014/main" id="{4B530430-B813-422B-82A2-BC34CD74BEF5}"/>
               </a:ext>
             </a:extLst>
           </p:cNvPr>
@@ -22846,7 +25829,7 @@
           </p:nvPr>
         </p:nvPicPr>
         <p:blipFill>
-          <a:blip r:embed="rId4">
+          <a:blip r:embed="rId6">
             <a:extLst>
               <a:ext uri="{28A0092B-C50C-407E-A947-70E740481C1C}">
                 <a14:useLocalDpi xmlns:a14="http://schemas.microsoft.com/office/drawing/2010/main" val="0"/>
@@ -22859,8 +25842,8 @@
         </p:blipFill>
         <p:spPr>
           <a:xfrm>
-            <a:off x="8868466" y="4610580"/>
-            <a:ext cx="2485334" cy="251429"/>
+            <a:off x="8868466" y="4330984"/>
+            <a:ext cx="3171049" cy="284953"/>
           </a:xfrm>
           <a:prstGeom prst="rect">
             <a:avLst/>
@@ -22877,6 +25860,166 @@
   <p:clrMapOvr>
     <a:masterClrMapping/>
   </p:clrMapOvr>
+  <p:timing>
+    <p:tnLst>
+      <p:par>
+        <p:cTn id="1" dur="indefinite" restart="never" nodeType="tmRoot">
+          <p:childTnLst>
+            <p:seq concurrent="1" nextAc="seek">
+              <p:cTn id="2" dur="indefinite" nodeType="mainSeq">
+                <p:childTnLst>
+                  <p:par>
+                    <p:cTn id="3" fill="hold">
+                      <p:stCondLst>
+                        <p:cond delay="indefinite"/>
+                      </p:stCondLst>
+                      <p:childTnLst>
+                        <p:par>
+                          <p:cTn id="4" fill="hold">
+                            <p:stCondLst>
+                              <p:cond delay="0"/>
+                            </p:stCondLst>
+                            <p:childTnLst>
+                              <p:par>
+                                <p:cTn id="5" presetID="1" presetClass="entr" presetSubtype="0" fill="hold" grpId="0" nodeType="clickEffect">
+                                  <p:stCondLst>
+                                    <p:cond delay="0"/>
+                                  </p:stCondLst>
+                                  <p:childTnLst>
+                                    <p:set>
+                                      <p:cBhvr>
+                                        <p:cTn id="6" dur="1" fill="hold">
+                                          <p:stCondLst>
+                                            <p:cond delay="0"/>
+                                          </p:stCondLst>
+                                        </p:cTn>
+                                        <p:tgtEl>
+                                          <p:spTgt spid="12"/>
+                                        </p:tgtEl>
+                                        <p:attrNameLst>
+                                          <p:attrName>style.visibility</p:attrName>
+                                        </p:attrNameLst>
+                                      </p:cBhvr>
+                                      <p:to>
+                                        <p:strVal val="visible"/>
+                                      </p:to>
+                                    </p:set>
+                                  </p:childTnLst>
+                                </p:cTn>
+                              </p:par>
+                              <p:par>
+                                <p:cTn id="7" presetID="1" presetClass="entr" presetSubtype="0" fill="hold" nodeType="withEffect">
+                                  <p:stCondLst>
+                                    <p:cond delay="0"/>
+                                  </p:stCondLst>
+                                  <p:childTnLst>
+                                    <p:set>
+                                      <p:cBhvr>
+                                        <p:cTn id="8" dur="1" fill="hold">
+                                          <p:stCondLst>
+                                            <p:cond delay="0"/>
+                                          </p:stCondLst>
+                                        </p:cTn>
+                                        <p:tgtEl>
+                                          <p:spTgt spid="19"/>
+                                        </p:tgtEl>
+                                        <p:attrNameLst>
+                                          <p:attrName>style.visibility</p:attrName>
+                                        </p:attrNameLst>
+                                      </p:cBhvr>
+                                      <p:to>
+                                        <p:strVal val="visible"/>
+                                      </p:to>
+                                    </p:set>
+                                  </p:childTnLst>
+                                </p:cTn>
+                              </p:par>
+                              <p:par>
+                                <p:cTn id="9" presetID="1" presetClass="entr" presetSubtype="0" fill="hold" grpId="0" nodeType="withEffect">
+                                  <p:stCondLst>
+                                    <p:cond delay="0"/>
+                                  </p:stCondLst>
+                                  <p:childTnLst>
+                                    <p:set>
+                                      <p:cBhvr>
+                                        <p:cTn id="10" dur="1" fill="hold">
+                                          <p:stCondLst>
+                                            <p:cond delay="0"/>
+                                          </p:stCondLst>
+                                        </p:cTn>
+                                        <p:tgtEl>
+                                          <p:spTgt spid="21"/>
+                                        </p:tgtEl>
+                                        <p:attrNameLst>
+                                          <p:attrName>style.visibility</p:attrName>
+                                        </p:attrNameLst>
+                                      </p:cBhvr>
+                                      <p:to>
+                                        <p:strVal val="visible"/>
+                                      </p:to>
+                                    </p:set>
+                                  </p:childTnLst>
+                                </p:cTn>
+                              </p:par>
+                              <p:par>
+                                <p:cTn id="11" presetID="1" presetClass="entr" presetSubtype="0" fill="hold" nodeType="withEffect">
+                                  <p:stCondLst>
+                                    <p:cond delay="0"/>
+                                  </p:stCondLst>
+                                  <p:childTnLst>
+                                    <p:set>
+                                      <p:cBhvr>
+                                        <p:cTn id="12" dur="1" fill="hold">
+                                          <p:stCondLst>
+                                            <p:cond delay="0"/>
+                                          </p:stCondLst>
+                                        </p:cTn>
+                                        <p:tgtEl>
+                                          <p:spTgt spid="25"/>
+                                        </p:tgtEl>
+                                        <p:attrNameLst>
+                                          <p:attrName>style.visibility</p:attrName>
+                                        </p:attrNameLst>
+                                      </p:cBhvr>
+                                      <p:to>
+                                        <p:strVal val="visible"/>
+                                      </p:to>
+                                    </p:set>
+                                  </p:childTnLst>
+                                </p:cTn>
+                              </p:par>
+                            </p:childTnLst>
+                          </p:cTn>
+                        </p:par>
+                      </p:childTnLst>
+                    </p:cTn>
+                  </p:par>
+                </p:childTnLst>
+              </p:cTn>
+              <p:prevCondLst>
+                <p:cond evt="onPrev" delay="0">
+                  <p:tgtEl>
+                    <p:sldTgt/>
+                  </p:tgtEl>
+                </p:cond>
+              </p:prevCondLst>
+              <p:nextCondLst>
+                <p:cond evt="onNext" delay="0">
+                  <p:tgtEl>
+                    <p:sldTgt/>
+                  </p:tgtEl>
+                </p:cond>
+              </p:nextCondLst>
+            </p:seq>
+          </p:childTnLst>
+        </p:cTn>
+      </p:par>
+    </p:tnLst>
+    <p:bldLst>
+      <p:bldP spid="12" grpId="0"/>
+      <p:bldP spid="21" grpId="0"/>
+    </p:bldLst>
+  </p:timing>
 </p:sld>
 </file>
 
@@ -22899,10 +26042,10 @@
       </p:grpSpPr>
       <p:sp>
         <p:nvSpPr>
-          <p:cNvPr id="2" name="Title 1">
+          <p:cNvPr id="5" name="Title 4">
             <a:extLst>
               <a:ext uri="{FF2B5EF4-FFF2-40B4-BE49-F238E27FC236}">
-                <a16:creationId xmlns:a16="http://schemas.microsoft.com/office/drawing/2014/main" id="{7A35B74B-81B3-4B78-8260-1465ABDBE975}"/>
+                <a16:creationId xmlns:a16="http://schemas.microsoft.com/office/drawing/2014/main" id="{D87C7790-F3D9-4263-9C2E-CAF63CA27E0D}"/>
               </a:ext>
             </a:extLst>
           </p:cNvPr>
@@ -22927,10 +26070,10 @@
       </p:sp>
       <p:sp>
         <p:nvSpPr>
-          <p:cNvPr id="3" name="Content Placeholder 2">
+          <p:cNvPr id="10" name="Content Placeholder 9">
             <a:extLst>
               <a:ext uri="{FF2B5EF4-FFF2-40B4-BE49-F238E27FC236}">
-                <a16:creationId xmlns:a16="http://schemas.microsoft.com/office/drawing/2014/main" id="{31B26637-20B8-4313-A724-DD79EB600808}"/>
+                <a16:creationId xmlns:a16="http://schemas.microsoft.com/office/drawing/2014/main" id="{2D974DB5-7585-4D10-84BC-3350CEF4DF40}"/>
               </a:ext>
             </a:extLst>
           </p:cNvPr>
@@ -22946,66 +26089,24 @@
           <a:bodyPr/>
           <a:lstStyle/>
           <a:p>
+            <a:pPr marL="0" indent="0" algn="ctr">
+              <a:buNone/>
+            </a:pPr>
             <a:r>
               <a:rPr lang="en-US" dirty="0"/>
-              <a:t>Goal: Solve many PDEs correctly and efficiently</a:t>
-            </a:r>
-          </a:p>
-          <a:p>
-            <a:r>
-              <a:rPr lang="en-US" dirty="0"/>
-              <a:t>The </a:t>
+              <a:t>Goal: Solve many types of PDEs correctly</a:t>
             </a:r>
             <a:r>
-              <a:rPr lang="en-US" dirty="0" err="1"/>
-              <a:t>Fokas</a:t>
+              <a:rPr lang="en-US" baseline="30000" dirty="0"/>
+              <a:t>1</a:t>
             </a:r>
             <a:r>
               <a:rPr lang="en-US" dirty="0"/>
-              <a:t> method</a:t>
-            </a:r>
-          </a:p>
-          <a:p>
-            <a:pPr lvl="1"/>
-            <a:r>
-              <a:rPr lang="en-US" dirty="0"/>
-              <a:t>Allows solving an entire class of PDEs algorithmically</a:t>
-            </a:r>
-          </a:p>
-          <a:p>
-            <a:pPr lvl="2"/>
-            <a:r>
-              <a:rPr lang="en-US" dirty="0"/>
-              <a:t>by constructing appropriate </a:t>
+              <a:t> and efficiently</a:t>
             </a:r>
             <a:r>
-              <a:rPr lang="en-US" dirty="0" err="1"/>
-              <a:t>Fokas</a:t>
-            </a:r>
-            <a:r>
-              <a:rPr lang="en-US" dirty="0"/>
-              <a:t> transform pairs based on the problem’s parameters (e.g., order of the PDE, boundary conditions)</a:t>
-            </a:r>
-          </a:p>
-          <a:p>
-            <a:pPr lvl="1"/>
-            <a:r>
-              <a:rPr lang="en-US" dirty="0"/>
-              <a:t>But is still much work if calculated by hand</a:t>
-            </a:r>
-          </a:p>
-          <a:p>
-            <a:r>
-              <a:rPr lang="en-US" b="1" dirty="0"/>
-              <a:t>Solution: Implement the </a:t>
-            </a:r>
-            <a:r>
-              <a:rPr lang="en-US" b="1" dirty="0" err="1"/>
-              <a:t>Fokas</a:t>
-            </a:r>
-            <a:r>
-              <a:rPr lang="en-US" b="1" dirty="0"/>
-              <a:t> method in Julia</a:t>
+              <a:rPr lang="en-US" baseline="30000" dirty="0"/>
+              <a:t>2</a:t>
             </a:r>
           </a:p>
         </p:txBody>
@@ -23015,7 +26116,7 @@
           <p:cNvPr id="4" name="Slide Number Placeholder 3">
             <a:extLst>
               <a:ext uri="{FF2B5EF4-FFF2-40B4-BE49-F238E27FC236}">
-                <a16:creationId xmlns:a16="http://schemas.microsoft.com/office/drawing/2014/main" id="{5FAD7BFC-D218-46B4-86B9-8CC2D9BF5F1D}"/>
+                <a16:creationId xmlns:a16="http://schemas.microsoft.com/office/drawing/2014/main" id="{45A39F12-3EB8-413B-B1F3-7E39102F98BD}"/>
               </a:ext>
             </a:extLst>
           </p:cNvPr>
@@ -23042,7 +26143,206 @@
     </p:spTree>
     <p:extLst>
       <p:ext uri="{BB962C8B-B14F-4D97-AF65-F5344CB8AC3E}">
-        <p14:creationId xmlns:p14="http://schemas.microsoft.com/office/powerpoint/2010/main" val="2892447498"/>
+        <p14:creationId xmlns:p14="http://schemas.microsoft.com/office/powerpoint/2010/main" val="874392526"/>
+      </p:ext>
+    </p:extLst>
+  </p:cSld>
+  <p:clrMapOvr>
+    <a:masterClrMapping/>
+  </p:clrMapOvr>
+</p:sld>
+</file>
+
+<file path=ppt/slides/slide9.xml><?xml version="1.0" encoding="utf-8"?>
+<p:sld xmlns:a="http://schemas.openxmlformats.org/drawingml/2006/main" xmlns:r="http://schemas.openxmlformats.org/officeDocument/2006/relationships" xmlns:p="http://schemas.openxmlformats.org/presentationml/2006/main">
+  <p:cSld>
+    <p:spTree>
+      <p:nvGrpSpPr>
+        <p:cNvPr id="1" name=""/>
+        <p:cNvGrpSpPr/>
+        <p:nvPr/>
+      </p:nvGrpSpPr>
+      <p:grpSpPr>
+        <a:xfrm>
+          <a:off x="0" y="0"/>
+          <a:ext cx="0" cy="0"/>
+          <a:chOff x="0" y="0"/>
+          <a:chExt cx="0" cy="0"/>
+        </a:xfrm>
+      </p:grpSpPr>
+      <p:sp>
+        <p:nvSpPr>
+          <p:cNvPr id="5" name="Title 4">
+            <a:extLst>
+              <a:ext uri="{FF2B5EF4-FFF2-40B4-BE49-F238E27FC236}">
+                <a16:creationId xmlns:a16="http://schemas.microsoft.com/office/drawing/2014/main" id="{D87C7790-F3D9-4263-9C2E-CAF63CA27E0D}"/>
+              </a:ext>
+            </a:extLst>
+          </p:cNvPr>
+          <p:cNvSpPr>
+            <a:spLocks noGrp="1"/>
+          </p:cNvSpPr>
+          <p:nvPr>
+            <p:ph type="title"/>
+          </p:nvPr>
+        </p:nvSpPr>
+        <p:spPr/>
+        <p:txBody>
+          <a:bodyPr/>
+          <a:lstStyle/>
+          <a:p>
+            <a:r>
+              <a:rPr lang="en-US" dirty="0"/>
+              <a:t>Motivation</a:t>
+            </a:r>
+          </a:p>
+        </p:txBody>
+      </p:sp>
+      <p:sp>
+        <p:nvSpPr>
+          <p:cNvPr id="10" name="Content Placeholder 9">
+            <a:extLst>
+              <a:ext uri="{FF2B5EF4-FFF2-40B4-BE49-F238E27FC236}">
+                <a16:creationId xmlns:a16="http://schemas.microsoft.com/office/drawing/2014/main" id="{2D974DB5-7585-4D10-84BC-3350CEF4DF40}"/>
+              </a:ext>
+            </a:extLst>
+          </p:cNvPr>
+          <p:cNvSpPr>
+            <a:spLocks noGrp="1"/>
+          </p:cNvSpPr>
+          <p:nvPr>
+            <p:ph idx="1"/>
+          </p:nvPr>
+        </p:nvSpPr>
+        <p:spPr/>
+        <p:txBody>
+          <a:bodyPr/>
+          <a:lstStyle/>
+          <a:p>
+            <a:pPr marL="0" indent="0" algn="ctr">
+              <a:buNone/>
+            </a:pPr>
+            <a:r>
+              <a:rPr lang="en-US" dirty="0">
+                <a:solidFill>
+                  <a:schemeClr val="bg1">
+                    <a:lumMod val="65000"/>
+                  </a:schemeClr>
+                </a:solidFill>
+              </a:rPr>
+              <a:t>Goal: Solve many types of PDEs </a:t>
+            </a:r>
+            <a:r>
+              <a:rPr lang="en-US" dirty="0"/>
+              <a:t>correctly</a:t>
+            </a:r>
+            <a:r>
+              <a:rPr lang="en-US" baseline="30000" dirty="0"/>
+              <a:t>1</a:t>
+            </a:r>
+            <a:r>
+              <a:rPr lang="en-US" dirty="0">
+                <a:solidFill>
+                  <a:schemeClr val="bg1">
+                    <a:lumMod val="65000"/>
+                  </a:schemeClr>
+                </a:solidFill>
+              </a:rPr>
+              <a:t> and efficiently</a:t>
+            </a:r>
+            <a:r>
+              <a:rPr lang="en-US" baseline="30000" dirty="0">
+                <a:solidFill>
+                  <a:schemeClr val="bg1">
+                    <a:lumMod val="65000"/>
+                  </a:schemeClr>
+                </a:solidFill>
+              </a:rPr>
+              <a:t>2</a:t>
+            </a:r>
+          </a:p>
+          <a:p>
+            <a:pPr marL="0" indent="0">
+              <a:buNone/>
+            </a:pPr>
+            <a:endParaRPr lang="en-US" dirty="0">
+              <a:solidFill>
+                <a:schemeClr val="bg1">
+                  <a:lumMod val="65000"/>
+                </a:schemeClr>
+              </a:solidFill>
+            </a:endParaRPr>
+          </a:p>
+          <a:p>
+            <a:pPr marL="0" indent="0">
+              <a:buNone/>
+            </a:pPr>
+            <a:r>
+              <a:rPr lang="en-US" baseline="30000" dirty="0"/>
+              <a:t>1</a:t>
+            </a:r>
+            <a:r>
+              <a:rPr lang="en-US" dirty="0"/>
+              <a:t>The </a:t>
+            </a:r>
+            <a:r>
+              <a:rPr lang="en-US" dirty="0" err="1"/>
+              <a:t>Fokas</a:t>
+            </a:r>
+            <a:r>
+              <a:rPr lang="en-US" dirty="0"/>
+              <a:t> method</a:t>
+            </a:r>
+          </a:p>
+          <a:p>
+            <a:pPr lvl="1"/>
+            <a:r>
+              <a:rPr lang="en-US" dirty="0"/>
+              <a:t>Allows solving an entire class of PDEs algorithmically</a:t>
+            </a:r>
+          </a:p>
+          <a:p>
+            <a:pPr lvl="1"/>
+            <a:r>
+              <a:rPr lang="en-US" dirty="0"/>
+              <a:t>But is still much work if done by hand</a:t>
+            </a:r>
+          </a:p>
+        </p:txBody>
+      </p:sp>
+      <p:sp>
+        <p:nvSpPr>
+          <p:cNvPr id="4" name="Slide Number Placeholder 3">
+            <a:extLst>
+              <a:ext uri="{FF2B5EF4-FFF2-40B4-BE49-F238E27FC236}">
+                <a16:creationId xmlns:a16="http://schemas.microsoft.com/office/drawing/2014/main" id="{45A39F12-3EB8-413B-B1F3-7E39102F98BD}"/>
+              </a:ext>
+            </a:extLst>
+          </p:cNvPr>
+          <p:cNvSpPr>
+            <a:spLocks noGrp="1"/>
+          </p:cNvSpPr>
+          <p:nvPr>
+            <p:ph type="sldNum" sz="quarter" idx="12"/>
+          </p:nvPr>
+        </p:nvSpPr>
+        <p:spPr/>
+        <p:txBody>
+          <a:bodyPr/>
+          <a:lstStyle/>
+          <a:p>
+            <a:fld id="{F3332EFC-B9C2-4EF3-A733-16B7EBFB30C8}" type="slidenum">
+              <a:rPr lang="en-US" smtClean="0"/>
+              <a:t>9</a:t>
+            </a:fld>
+            <a:endParaRPr lang="en-US"/>
+          </a:p>
+        </p:txBody>
+      </p:sp>
+    </p:spTree>
+    <p:extLst>
+      <p:ext uri="{BB962C8B-B14F-4D97-AF65-F5344CB8AC3E}">
+        <p14:creationId xmlns:p14="http://schemas.microsoft.com/office/powerpoint/2010/main" val="255882947"/>
       </p:ext>
     </p:extLst>
   </p:cSld>
@@ -23094,10 +26394,10 @@
 <p:tagLst xmlns:a="http://schemas.openxmlformats.org/drawingml/2006/main" xmlns:r="http://schemas.openxmlformats.org/officeDocument/2006/relationships" xmlns:p="http://schemas.openxmlformats.org/presentationml/2006/main">
   <p:tag name="OUTPUTDPI" val="1200"/>
   <p:tag name="ORIGINALHEIGHT" val="123.7346"/>
-  <p:tag name="ORIGINALWIDTH" val="1223.097"/>
-  <p:tag name="LATEXADDIN" val="\documentclass{article}&#10;\usepackage{amsmath}&#10;\pagestyle{empty}&#10;\begin{document}&#10;&#10;&#10;\[:=f(\text{PDE parameters})\]&#10;&#10;\end{document}"/>
+  <p:tag name="ORIGINALWIDTH" val="1391.826"/>
+  <p:tag name="LATEXADDIN" val="\documentclass{article}&#10;\usepackage{amsmath}&#10;\pagestyle{empty}&#10;\begin{document}&#10;&#10;&#10;\[\mathcal{F}:=F(\text{PDE parameters})\]&#10;&#10;\end{document}"/>
   <p:tag name="IGUANATEXSIZE" val="20"/>
-  <p:tag name="IGUANATEXCURSOR" val="97"/>
+  <p:tag name="IGUANATEXCURSOR" val="98"/>
   <p:tag name="TRANSPARENCY" val="True"/>
   <p:tag name="FILENAME" val=""/>
   <p:tag name="LATEXENGINEID" val="0"/>
@@ -23112,11 +26412,49 @@
 <file path=ppt/tags/tag4.xml><?xml version="1.0" encoding="utf-8"?>
 <p:tagLst xmlns:a="http://schemas.openxmlformats.org/drawingml/2006/main" xmlns:r="http://schemas.openxmlformats.org/officeDocument/2006/relationships" xmlns:p="http://schemas.openxmlformats.org/presentationml/2006/main">
   <p:tag name="OUTPUTDPI" val="1200"/>
+  <p:tag name="ORIGINALHEIGHT" val="140.2324"/>
+  <p:tag name="ORIGINALWIDTH" val="1560.555"/>
+  <p:tag name="LATEXADDIN" val="\documentclass{article}&#10;\usepackage{amsmath}&#10;\pagestyle{empty}&#10;\begin{document}&#10;&#10;&#10;\[\mathcal{F}^{-1}:=F'(\text{PDE parameters})\]&#10;&#10;\end{document}"/>
+  <p:tag name="IGUANATEXSIZE" val="20"/>
+  <p:tag name="IGUANATEXCURSOR" val="104"/>
+  <p:tag name="TRANSPARENCY" val="True"/>
+  <p:tag name="FILENAME" val=""/>
+  <p:tag name="LATEXENGINEID" val="0"/>
+  <p:tag name="TEMPFOLDER" val=".\"/>
+  <p:tag name="LATEXFORMHEIGHT" val="312"/>
+  <p:tag name="LATEXFORMWIDTH" val="384"/>
+  <p:tag name="LATEXFORMWRAP" val="True"/>
+  <p:tag name="BITMAPVECTOR" val="0"/>
+</p:tagLst>
+</file>
+
+<file path=ppt/tags/tag5.xml><?xml version="1.0" encoding="utf-8"?>
+<p:tagLst xmlns:a="http://schemas.openxmlformats.org/drawingml/2006/main" xmlns:r="http://schemas.openxmlformats.org/officeDocument/2006/relationships" xmlns:p="http://schemas.openxmlformats.org/presentationml/2006/main">
+  <p:tag name="OUTPUTDPI" val="1200"/>
+  <p:tag name="ORIGINALHEIGHT" val="140.2324"/>
+  <p:tag name="ORIGINALWIDTH" val="1560.555"/>
+  <p:tag name="LATEXADDIN" val="\documentclass{article}&#10;\usepackage{amsmath}&#10;\pagestyle{empty}&#10;\begin{document}&#10;&#10;&#10;\[\mathcal{F}^{-1}:=F'(\text{PDE parameters})\]&#10;&#10;\end{document}"/>
+  <p:tag name="IGUANATEXSIZE" val="20"/>
+  <p:tag name="IGUANATEXCURSOR" val="104"/>
+  <p:tag name="TRANSPARENCY" val="True"/>
+  <p:tag name="FILENAME" val=""/>
+  <p:tag name="LATEXENGINEID" val="0"/>
+  <p:tag name="TEMPFOLDER" val=".\"/>
+  <p:tag name="LATEXFORMHEIGHT" val="312"/>
+  <p:tag name="LATEXFORMWIDTH" val="384"/>
+  <p:tag name="LATEXFORMWRAP" val="True"/>
+  <p:tag name="BITMAPVECTOR" val="0"/>
+</p:tagLst>
+</file>
+
+<file path=ppt/tags/tag6.xml><?xml version="1.0" encoding="utf-8"?>
+<p:tagLst xmlns:a="http://schemas.openxmlformats.org/drawingml/2006/main" xmlns:r="http://schemas.openxmlformats.org/officeDocument/2006/relationships" xmlns:p="http://schemas.openxmlformats.org/presentationml/2006/main">
+  <p:tag name="OUTPUTDPI" val="1200"/>
   <p:tag name="ORIGINALHEIGHT" val="123.7346"/>
-  <p:tag name="ORIGINALWIDTH" val="1223.097"/>
-  <p:tag name="LATEXADDIN" val="\documentclass{article}&#10;\usepackage{amsmath}&#10;\pagestyle{empty}&#10;\begin{document}&#10;&#10;&#10;\[:=f(\text{PDE parameters})\]&#10;&#10;\end{document}"/>
+  <p:tag name="ORIGINALWIDTH" val="1391.826"/>
+  <p:tag name="LATEXADDIN" val="\documentclass{article}&#10;\usepackage{amsmath}&#10;\pagestyle{empty}&#10;\begin{document}&#10;&#10;&#10;\[\mathcal{F}:=F(\text{PDE parameters})\]&#10;&#10;\end{document}"/>
   <p:tag name="IGUANATEXSIZE" val="20"/>
-  <p:tag name="IGUANATEXCURSOR" val="97"/>
+  <p:tag name="IGUANATEXCURSOR" val="98"/>
   <p:tag name="TRANSPARENCY" val="True"/>
   <p:tag name="FILENAME" val=""/>
   <p:tag name="LATEXENGINEID" val="0"/>

</xml_diff>

<commit_message>
Implemented Chebyshev approximation with symbolic expression
</commit_message>
<xml_diff>
--- a/presentation/presentation.pptx
+++ b/presentation/presentation.pptx
@@ -5,7 +5,7 @@
     <p:sldMasterId id="2147483648" r:id="rId1"/>
   </p:sldMasterIdLst>
   <p:notesMasterIdLst>
-    <p:notesMasterId r:id="rId15"/>
+    <p:notesMasterId r:id="rId14"/>
   </p:notesMasterIdLst>
   <p:sldIdLst>
     <p:sldId id="256" r:id="rId2"/>
@@ -19,8 +19,7 @@
     <p:sldId id="266" r:id="rId10"/>
     <p:sldId id="267" r:id="rId11"/>
     <p:sldId id="268" r:id="rId12"/>
-    <p:sldId id="271" r:id="rId13"/>
-    <p:sldId id="270" r:id="rId14"/>
+    <p:sldId id="270" r:id="rId13"/>
   </p:sldIdLst>
   <p:sldSz cx="12192000" cy="6858000"/>
   <p:notesSz cx="6858000" cy="9144000"/>
@@ -209,7 +208,7 @@
           <a:p>
             <a:fld id="{D5D123B1-4E28-4CA6-A937-646E6B2B1E96}" type="datetimeFigureOut">
               <a:rPr lang="en-US" smtClean="0"/>
-              <a:t>10/24/2018</a:t>
+              <a:t>10/28/2018</a:t>
             </a:fld>
             <a:endParaRPr lang="en-US"/>
           </a:p>
@@ -520,7 +519,19 @@
           <a:bodyPr/>
           <a:lstStyle/>
           <a:p>
+            <a:r>
+              <a:rPr lang="en-US" dirty="0"/>
+              <a:t>Partial differential equations are equations that relate a function to its partial derivatives.</a:t>
+            </a:r>
+          </a:p>
+          <a:p>
             <a:endParaRPr lang="en-US" dirty="0"/>
+          </a:p>
+          <a:p>
+            <a:r>
+              <a:rPr lang="en-US" dirty="0"/>
+              <a:t>These are equations of the form described here, where u is a function of several variables, and f relates u to its partial derivatives.</a:t>
+            </a:r>
           </a:p>
         </p:txBody>
       </p:sp>
@@ -560,7 +571,333 @@
 </p:notes>
 </file>
 
+<file path=ppt/notesSlides/notesSlide10.xml><?xml version="1.0" encoding="utf-8"?>
+<p:notes xmlns:a="http://schemas.openxmlformats.org/drawingml/2006/main" xmlns:r="http://schemas.openxmlformats.org/officeDocument/2006/relationships" xmlns:p="http://schemas.openxmlformats.org/presentationml/2006/main">
+  <p:cSld>
+    <p:spTree>
+      <p:nvGrpSpPr>
+        <p:cNvPr id="1" name=""/>
+        <p:cNvGrpSpPr/>
+        <p:nvPr/>
+      </p:nvGrpSpPr>
+      <p:grpSpPr>
+        <a:xfrm>
+          <a:off x="0" y="0"/>
+          <a:ext cx="0" cy="0"/>
+          <a:chOff x="0" y="0"/>
+          <a:chExt cx="0" cy="0"/>
+        </a:xfrm>
+      </p:grpSpPr>
+      <p:sp>
+        <p:nvSpPr>
+          <p:cNvPr id="2" name="Slide Image Placeholder 1"/>
+          <p:cNvSpPr>
+            <a:spLocks noGrp="1" noRot="1" noChangeAspect="1"/>
+          </p:cNvSpPr>
+          <p:nvPr>
+            <p:ph type="sldImg"/>
+          </p:nvPr>
+        </p:nvSpPr>
+        <p:spPr/>
+      </p:sp>
+      <p:sp>
+        <p:nvSpPr>
+          <p:cNvPr id="3" name="Notes Placeholder 2"/>
+          <p:cNvSpPr>
+            <a:spLocks noGrp="1"/>
+          </p:cNvSpPr>
+          <p:nvPr>
+            <p:ph type="body" idx="1"/>
+          </p:nvPr>
+        </p:nvSpPr>
+        <p:spPr/>
+        <p:txBody>
+          <a:bodyPr/>
+          <a:lstStyle/>
+          <a:p>
+            <a:pPr marL="0" marR="0" lvl="0" indent="0" algn="l" defTabSz="914400" rtl="0" eaLnBrk="1" fontAlgn="auto" latinLnBrk="0" hangingPunct="1">
+              <a:lnSpc>
+                <a:spcPct val="100000"/>
+              </a:lnSpc>
+              <a:spcBef>
+                <a:spcPts val="0"/>
+              </a:spcBef>
+              <a:spcAft>
+                <a:spcPts val="0"/>
+              </a:spcAft>
+              <a:buClrTx/>
+              <a:buSzTx/>
+              <a:buFontTx/>
+              <a:buNone/>
+              <a:tabLst/>
+              <a:defRPr/>
+            </a:pPr>
+            <a:r>
+              <a:rPr lang="en-US" dirty="0"/>
+              <a:t>Build an integrator tailored to this type of problems that can provide…</a:t>
+            </a:r>
+          </a:p>
+          <a:p>
+            <a:pPr marL="0" marR="0" lvl="0" indent="0" algn="l" defTabSz="914400" rtl="0" eaLnBrk="1" fontAlgn="auto" latinLnBrk="0" hangingPunct="1">
+              <a:lnSpc>
+                <a:spcPct val="100000"/>
+              </a:lnSpc>
+              <a:spcBef>
+                <a:spcPts val="0"/>
+              </a:spcBef>
+              <a:spcAft>
+                <a:spcPts val="0"/>
+              </a:spcAft>
+              <a:buClrTx/>
+              <a:buSzTx/>
+              <a:buFontTx/>
+              <a:buNone/>
+              <a:tabLst/>
+              <a:defRPr/>
+            </a:pPr>
+            <a:endParaRPr lang="en-US" dirty="0"/>
+          </a:p>
+          <a:p>
+            <a:pPr marL="0" marR="0" lvl="0" indent="0" algn="l" defTabSz="914400" rtl="0" eaLnBrk="1" fontAlgn="auto" latinLnBrk="0" hangingPunct="1">
+              <a:lnSpc>
+                <a:spcPct val="100000"/>
+              </a:lnSpc>
+              <a:spcBef>
+                <a:spcPts val="0"/>
+              </a:spcBef>
+              <a:spcAft>
+                <a:spcPts val="0"/>
+              </a:spcAft>
+              <a:buClrTx/>
+              <a:buSzTx/>
+              <a:buFontTx/>
+              <a:buNone/>
+              <a:tabLst/>
+              <a:defRPr/>
+            </a:pPr>
+            <a:r>
+              <a:rPr lang="en-US" dirty="0"/>
+              <a:t>Solutions of PDEs usually involve infinite sums and integrals. Having accurate numerical descriptions for the solutions would be helpful in understanding and visualizing the solutions.</a:t>
+            </a:r>
+          </a:p>
+        </p:txBody>
+      </p:sp>
+      <p:sp>
+        <p:nvSpPr>
+          <p:cNvPr id="4" name="Slide Number Placeholder 3"/>
+          <p:cNvSpPr>
+            <a:spLocks noGrp="1"/>
+          </p:cNvSpPr>
+          <p:nvPr>
+            <p:ph type="sldNum" sz="quarter" idx="5"/>
+          </p:nvPr>
+        </p:nvSpPr>
+        <p:spPr/>
+        <p:txBody>
+          <a:bodyPr/>
+          <a:lstStyle/>
+          <a:p>
+            <a:fld id="{C0AE9E3C-4D80-4F32-8BE5-275D74EA0A70}" type="slidenum">
+              <a:rPr lang="en-US" smtClean="0"/>
+              <a:t>11</a:t>
+            </a:fld>
+            <a:endParaRPr lang="en-US"/>
+          </a:p>
+        </p:txBody>
+      </p:sp>
+    </p:spTree>
+    <p:extLst>
+      <p:ext uri="{BB962C8B-B14F-4D97-AF65-F5344CB8AC3E}">
+        <p14:creationId xmlns:p14="http://schemas.microsoft.com/office/powerpoint/2010/main" val="1562134030"/>
+      </p:ext>
+    </p:extLst>
+  </p:cSld>
+  <p:clrMapOvr>
+    <a:masterClrMapping/>
+  </p:clrMapOvr>
+</p:notes>
+</file>
+
 <file path=ppt/notesSlides/notesSlide2.xml><?xml version="1.0" encoding="utf-8"?>
+<p:notes xmlns:a="http://schemas.openxmlformats.org/drawingml/2006/main" xmlns:r="http://schemas.openxmlformats.org/officeDocument/2006/relationships" xmlns:p="http://schemas.openxmlformats.org/presentationml/2006/main">
+  <p:cSld>
+    <p:spTree>
+      <p:nvGrpSpPr>
+        <p:cNvPr id="1" name=""/>
+        <p:cNvGrpSpPr/>
+        <p:nvPr/>
+      </p:nvGrpSpPr>
+      <p:grpSpPr>
+        <a:xfrm>
+          <a:off x="0" y="0"/>
+          <a:ext cx="0" cy="0"/>
+          <a:chOff x="0" y="0"/>
+          <a:chExt cx="0" cy="0"/>
+        </a:xfrm>
+      </p:grpSpPr>
+      <p:sp>
+        <p:nvSpPr>
+          <p:cNvPr id="2" name="Slide Image Placeholder 1"/>
+          <p:cNvSpPr>
+            <a:spLocks noGrp="1" noRot="1" noChangeAspect="1"/>
+          </p:cNvSpPr>
+          <p:nvPr>
+            <p:ph type="sldImg"/>
+          </p:nvPr>
+        </p:nvSpPr>
+        <p:spPr/>
+      </p:sp>
+      <p:sp>
+        <p:nvSpPr>
+          <p:cNvPr id="3" name="Notes Placeholder 2"/>
+          <p:cNvSpPr>
+            <a:spLocks noGrp="1"/>
+          </p:cNvSpPr>
+          <p:nvPr>
+            <p:ph type="body" idx="1"/>
+          </p:nvPr>
+        </p:nvSpPr>
+        <p:spPr/>
+        <p:txBody>
+          <a:bodyPr/>
+          <a:lstStyle/>
+          <a:p>
+            <a:r>
+              <a:rPr lang="en-US" dirty="0"/>
+              <a:t>Algorithmically: For this class of PDEs, we know for sure that the </a:t>
+            </a:r>
+            <a:r>
+              <a:rPr lang="en-US" dirty="0" err="1"/>
+              <a:t>Fokas</a:t>
+            </a:r>
+            <a:r>
+              <a:rPr lang="en-US" dirty="0"/>
+              <a:t> method will produce the correct solutions.</a:t>
+            </a:r>
+          </a:p>
+        </p:txBody>
+      </p:sp>
+      <p:sp>
+        <p:nvSpPr>
+          <p:cNvPr id="4" name="Slide Number Placeholder 3"/>
+          <p:cNvSpPr>
+            <a:spLocks noGrp="1"/>
+          </p:cNvSpPr>
+          <p:nvPr>
+            <p:ph type="sldNum" sz="quarter" idx="5"/>
+          </p:nvPr>
+        </p:nvSpPr>
+        <p:spPr/>
+        <p:txBody>
+          <a:bodyPr/>
+          <a:lstStyle/>
+          <a:p>
+            <a:fld id="{C0AE9E3C-4D80-4F32-8BE5-275D74EA0A70}" type="slidenum">
+              <a:rPr lang="en-US" smtClean="0"/>
+              <a:t>3</a:t>
+            </a:fld>
+            <a:endParaRPr lang="en-US"/>
+          </a:p>
+        </p:txBody>
+      </p:sp>
+    </p:spTree>
+    <p:extLst>
+      <p:ext uri="{BB962C8B-B14F-4D97-AF65-F5344CB8AC3E}">
+        <p14:creationId xmlns:p14="http://schemas.microsoft.com/office/powerpoint/2010/main" val="565578303"/>
+      </p:ext>
+    </p:extLst>
+  </p:cSld>
+  <p:clrMapOvr>
+    <a:masterClrMapping/>
+  </p:clrMapOvr>
+</p:notes>
+</file>
+
+<file path=ppt/notesSlides/notesSlide3.xml><?xml version="1.0" encoding="utf-8"?>
+<p:notes xmlns:a="http://schemas.openxmlformats.org/drawingml/2006/main" xmlns:r="http://schemas.openxmlformats.org/officeDocument/2006/relationships" xmlns:p="http://schemas.openxmlformats.org/presentationml/2006/main">
+  <p:cSld>
+    <p:spTree>
+      <p:nvGrpSpPr>
+        <p:cNvPr id="1" name=""/>
+        <p:cNvGrpSpPr/>
+        <p:nvPr/>
+      </p:nvGrpSpPr>
+      <p:grpSpPr>
+        <a:xfrm>
+          <a:off x="0" y="0"/>
+          <a:ext cx="0" cy="0"/>
+          <a:chOff x="0" y="0"/>
+          <a:chExt cx="0" cy="0"/>
+        </a:xfrm>
+      </p:grpSpPr>
+      <p:sp>
+        <p:nvSpPr>
+          <p:cNvPr id="2" name="Slide Image Placeholder 1"/>
+          <p:cNvSpPr>
+            <a:spLocks noGrp="1" noRot="1" noChangeAspect="1"/>
+          </p:cNvSpPr>
+          <p:nvPr>
+            <p:ph type="sldImg"/>
+          </p:nvPr>
+        </p:nvSpPr>
+        <p:spPr/>
+      </p:sp>
+      <p:sp>
+        <p:nvSpPr>
+          <p:cNvPr id="3" name="Notes Placeholder 2"/>
+          <p:cNvSpPr>
+            <a:spLocks noGrp="1"/>
+          </p:cNvSpPr>
+          <p:nvPr>
+            <p:ph type="body" idx="1"/>
+          </p:nvPr>
+        </p:nvSpPr>
+        <p:spPr/>
+        <p:txBody>
+          <a:bodyPr/>
+          <a:lstStyle/>
+          <a:p>
+            <a:endParaRPr lang="en-US" dirty="0"/>
+          </a:p>
+        </p:txBody>
+      </p:sp>
+      <p:sp>
+        <p:nvSpPr>
+          <p:cNvPr id="4" name="Slide Number Placeholder 3"/>
+          <p:cNvSpPr>
+            <a:spLocks noGrp="1"/>
+          </p:cNvSpPr>
+          <p:nvPr>
+            <p:ph type="sldNum" sz="quarter" idx="5"/>
+          </p:nvPr>
+        </p:nvSpPr>
+        <p:spPr/>
+        <p:txBody>
+          <a:bodyPr/>
+          <a:lstStyle/>
+          <a:p>
+            <a:fld id="{C0AE9E3C-4D80-4F32-8BE5-275D74EA0A70}" type="slidenum">
+              <a:rPr lang="en-US" smtClean="0"/>
+              <a:t>4</a:t>
+            </a:fld>
+            <a:endParaRPr lang="en-US"/>
+          </a:p>
+        </p:txBody>
+      </p:sp>
+    </p:spTree>
+    <p:extLst>
+      <p:ext uri="{BB962C8B-B14F-4D97-AF65-F5344CB8AC3E}">
+        <p14:creationId xmlns:p14="http://schemas.microsoft.com/office/powerpoint/2010/main" val="1520907849"/>
+      </p:ext>
+    </p:extLst>
+  </p:cSld>
+  <p:clrMapOvr>
+    <a:masterClrMapping/>
+  </p:clrMapOvr>
+</p:notes>
+</file>
+
+<file path=ppt/notesSlides/notesSlide4.xml><?xml version="1.0" encoding="utf-8"?>
 <p:notes xmlns:a="http://schemas.openxmlformats.org/drawingml/2006/main" xmlns:r="http://schemas.openxmlformats.org/officeDocument/2006/relationships" xmlns:p="http://schemas.openxmlformats.org/presentationml/2006/main">
   <p:cSld>
     <p:spTree>
@@ -641,7 +978,7 @@
             </a:pPr>
             <a:r>
               <a:rPr lang="en-US" dirty="0"/>
-              <a:t>But most of the times we are unlucky.</a:t>
+              <a:t>But most of the times we are not this lucky.</a:t>
             </a:r>
           </a:p>
         </p:txBody>
@@ -682,7 +1019,7 @@
 </p:notes>
 </file>
 
-<file path=ppt/notesSlides/notesSlide3.xml><?xml version="1.0" encoding="utf-8"?>
+<file path=ppt/notesSlides/notesSlide5.xml><?xml version="1.0" encoding="utf-8"?>
 <p:notes xmlns:a="http://schemas.openxmlformats.org/drawingml/2006/main" xmlns:r="http://schemas.openxmlformats.org/officeDocument/2006/relationships" xmlns:p="http://schemas.openxmlformats.org/presentationml/2006/main">
   <p:cSld>
     <p:spTree>
@@ -740,6 +1077,15 @@
               <a:t>Methods found this way typically only work for the problem at hand and cannot be generalized to related problems with different parameters.</a:t>
             </a:r>
           </a:p>
+          <a:p>
+            <a:endParaRPr lang="en-US" dirty="0"/>
+          </a:p>
+          <a:p>
+            <a:r>
+              <a:rPr lang="en-US" dirty="0"/>
+              <a:t>E.g., if the order of PDE changes, the method would break.</a:t>
+            </a:r>
+          </a:p>
         </p:txBody>
       </p:sp>
       <p:sp>
@@ -778,7 +1124,7 @@
 </p:notes>
 </file>
 
-<file path=ppt/notesSlides/notesSlide4.xml><?xml version="1.0" encoding="utf-8"?>
+<file path=ppt/notesSlides/notesSlide6.xml><?xml version="1.0" encoding="utf-8"?>
 <p:notes xmlns:a="http://schemas.openxmlformats.org/drawingml/2006/main" xmlns:r="http://schemas.openxmlformats.org/officeDocument/2006/relationships" xmlns:p="http://schemas.openxmlformats.org/presentationml/2006/main">
   <p:cSld>
     <p:spTree>
@@ -849,7 +1195,7 @@
             </a:r>
             <a:r>
               <a:rPr lang="en-US" dirty="0"/>
-              <a:t> method makes this diagram possible for an entire class of PDEs. </a:t>
+              <a:t> method comes to our rescue by making this diagram possible for an entire class of PDEs. </a:t>
             </a:r>
           </a:p>
           <a:p>
@@ -900,7 +1246,7 @@
             </a:r>
             <a:r>
               <a:rPr lang="en-US" dirty="0"/>
-              <a:t> method is to construct appropriate transform pairs based on the problem’s parameters (e.g., order of the PDE, boundary conditions). </a:t>
+              <a:t> method is to construct appropriate transform pairs based on the problem’s parameters.</a:t>
             </a:r>
           </a:p>
           <a:p>
@@ -992,7 +1338,94 @@
 </p:notes>
 </file>
 
-<file path=ppt/notesSlides/notesSlide5.xml><?xml version="1.0" encoding="utf-8"?>
+<file path=ppt/notesSlides/notesSlide7.xml><?xml version="1.0" encoding="utf-8"?>
+<p:notes xmlns:a="http://schemas.openxmlformats.org/drawingml/2006/main" xmlns:r="http://schemas.openxmlformats.org/officeDocument/2006/relationships" xmlns:p="http://schemas.openxmlformats.org/presentationml/2006/main">
+  <p:cSld>
+    <p:spTree>
+      <p:nvGrpSpPr>
+        <p:cNvPr id="1" name=""/>
+        <p:cNvGrpSpPr/>
+        <p:nvPr/>
+      </p:nvGrpSpPr>
+      <p:grpSpPr>
+        <a:xfrm>
+          <a:off x="0" y="0"/>
+          <a:ext cx="0" cy="0"/>
+          <a:chOff x="0" y="0"/>
+          <a:chExt cx="0" cy="0"/>
+        </a:xfrm>
+      </p:grpSpPr>
+      <p:sp>
+        <p:nvSpPr>
+          <p:cNvPr id="2" name="Slide Image Placeholder 1"/>
+          <p:cNvSpPr>
+            <a:spLocks noGrp="1" noRot="1" noChangeAspect="1"/>
+          </p:cNvSpPr>
+          <p:nvPr>
+            <p:ph type="sldImg"/>
+          </p:nvPr>
+        </p:nvSpPr>
+        <p:spPr/>
+      </p:sp>
+      <p:sp>
+        <p:nvSpPr>
+          <p:cNvPr id="3" name="Notes Placeholder 2"/>
+          <p:cNvSpPr>
+            <a:spLocks noGrp="1"/>
+          </p:cNvSpPr>
+          <p:nvPr>
+            <p:ph type="body" idx="1"/>
+          </p:nvPr>
+        </p:nvSpPr>
+        <p:spPr/>
+        <p:txBody>
+          <a:bodyPr/>
+          <a:lstStyle/>
+          <a:p>
+            <a:r>
+              <a:rPr lang="en-US" dirty="0"/>
+              <a:t>Overarching goal</a:t>
+            </a:r>
+          </a:p>
+        </p:txBody>
+      </p:sp>
+      <p:sp>
+        <p:nvSpPr>
+          <p:cNvPr id="4" name="Slide Number Placeholder 3"/>
+          <p:cNvSpPr>
+            <a:spLocks noGrp="1"/>
+          </p:cNvSpPr>
+          <p:nvPr>
+            <p:ph type="sldNum" sz="quarter" idx="5"/>
+          </p:nvPr>
+        </p:nvSpPr>
+        <p:spPr/>
+        <p:txBody>
+          <a:bodyPr/>
+          <a:lstStyle/>
+          <a:p>
+            <a:fld id="{C0AE9E3C-4D80-4F32-8BE5-275D74EA0A70}" type="slidenum">
+              <a:rPr lang="en-US" smtClean="0"/>
+              <a:t>8</a:t>
+            </a:fld>
+            <a:endParaRPr lang="en-US"/>
+          </a:p>
+        </p:txBody>
+      </p:sp>
+    </p:spTree>
+    <p:extLst>
+      <p:ext uri="{BB962C8B-B14F-4D97-AF65-F5344CB8AC3E}">
+        <p14:creationId xmlns:p14="http://schemas.microsoft.com/office/powerpoint/2010/main" val="18757640"/>
+      </p:ext>
+    </p:extLst>
+  </p:cSld>
+  <p:clrMapOvr>
+    <a:masterClrMapping/>
+  </p:clrMapOvr>
+</p:notes>
+</file>
+
+<file path=ppt/notesSlides/notesSlide8.xml><?xml version="1.0" encoding="utf-8"?>
 <p:notes xmlns:a="http://schemas.openxmlformats.org/drawingml/2006/main" xmlns:r="http://schemas.openxmlformats.org/officeDocument/2006/relationships" xmlns:p="http://schemas.openxmlformats.org/presentationml/2006/main">
   <p:cSld>
     <p:spTree>
@@ -1046,15 +1479,7 @@
             </a:r>
             <a:r>
               <a:rPr lang="en-US" dirty="0"/>
-              <a:t> method provides a way to solve many PDEs algorithmically, which means that for this class of PDEs, we know for sure that the </a:t>
-            </a:r>
-            <a:r>
-              <a:rPr lang="en-US" dirty="0" err="1"/>
-              <a:t>Fokas</a:t>
-            </a:r>
-            <a:r>
-              <a:rPr lang="en-US" dirty="0"/>
-              <a:t> method will produce the correct solutions.</a:t>
+              <a:t> method takes cares of the correctness requirement by providing a way to solve many PDEs algorithmically, </a:t>
             </a:r>
           </a:p>
         </p:txBody>
@@ -1095,7 +1520,7 @@
 </p:notes>
 </file>
 
-<file path=ppt/notesSlides/notesSlide6.xml><?xml version="1.0" encoding="utf-8"?>
+<file path=ppt/notesSlides/notesSlide9.xml><?xml version="1.0" encoding="utf-8"?>
 <p:notes xmlns:a="http://schemas.openxmlformats.org/drawingml/2006/main" xmlns:r="http://schemas.openxmlformats.org/officeDocument/2006/relationships" xmlns:p="http://schemas.openxmlformats.org/presentationml/2006/main">
   <p:cSld>
     <p:spTree>
@@ -1139,26 +1564,17 @@
           <a:bodyPr/>
           <a:lstStyle/>
           <a:p>
-            <a:pPr marL="0" marR="0" lvl="0" indent="0" algn="l" defTabSz="914400" rtl="0" eaLnBrk="1" fontAlgn="auto" latinLnBrk="0" hangingPunct="1">
-              <a:lnSpc>
-                <a:spcPct val="100000"/>
-              </a:lnSpc>
-              <a:spcBef>
-                <a:spcPts val="0"/>
-              </a:spcBef>
-              <a:spcAft>
-                <a:spcPts val="0"/>
-              </a:spcAft>
-              <a:buClrTx/>
-              <a:buSzTx/>
-              <a:buFontTx/>
-              <a:buNone/>
-              <a:tabLst/>
-              <a:defRPr/>
-            </a:pPr>
             <a:r>
               <a:rPr lang="en-US" dirty="0"/>
-              <a:t>Solutions of PDEs usually involve infinite sums and integrals. Having accurate numerical descriptions for the solutions would be helpful in visualizing the solutions.</a:t>
+              <a:t>Capstone: aims at taking care of the efficiency requirement by implementing the </a:t>
+            </a:r>
+            <a:r>
+              <a:rPr lang="en-US" dirty="0" err="1"/>
+              <a:t>Fokas</a:t>
+            </a:r>
+            <a:r>
+              <a:rPr lang="en-US" dirty="0"/>
+              <a:t> method in Julia</a:t>
             </a:r>
           </a:p>
         </p:txBody>
@@ -1180,7 +1596,7 @@
           <a:p>
             <a:fld id="{C0AE9E3C-4D80-4F32-8BE5-275D74EA0A70}" type="slidenum">
               <a:rPr lang="en-US" smtClean="0"/>
-              <a:t>11</a:t>
+              <a:t>10</a:t>
             </a:fld>
             <a:endParaRPr lang="en-US"/>
           </a:p>
@@ -1189,240 +1605,7 @@
     </p:spTree>
     <p:extLst>
       <p:ext uri="{BB962C8B-B14F-4D97-AF65-F5344CB8AC3E}">
-        <p14:creationId xmlns:p14="http://schemas.microsoft.com/office/powerpoint/2010/main" val="1562134030"/>
-      </p:ext>
-    </p:extLst>
-  </p:cSld>
-  <p:clrMapOvr>
-    <a:masterClrMapping/>
-  </p:clrMapOvr>
-</p:notes>
-</file>
-
-<file path=ppt/notesSlides/notesSlide7.xml><?xml version="1.0" encoding="utf-8"?>
-<p:notes xmlns:a="http://schemas.openxmlformats.org/drawingml/2006/main" xmlns:r="http://schemas.openxmlformats.org/officeDocument/2006/relationships" xmlns:p="http://schemas.openxmlformats.org/presentationml/2006/main">
-  <p:cSld>
-    <p:spTree>
-      <p:nvGrpSpPr>
-        <p:cNvPr id="1" name=""/>
-        <p:cNvGrpSpPr/>
-        <p:nvPr/>
-      </p:nvGrpSpPr>
-      <p:grpSpPr>
-        <a:xfrm>
-          <a:off x="0" y="0"/>
-          <a:ext cx="0" cy="0"/>
-          <a:chOff x="0" y="0"/>
-          <a:chExt cx="0" cy="0"/>
-        </a:xfrm>
-      </p:grpSpPr>
-      <p:sp>
-        <p:nvSpPr>
-          <p:cNvPr id="2" name="Slide Image Placeholder 1"/>
-          <p:cNvSpPr>
-            <a:spLocks noGrp="1" noRot="1" noChangeAspect="1"/>
-          </p:cNvSpPr>
-          <p:nvPr>
-            <p:ph type="sldImg"/>
-          </p:nvPr>
-        </p:nvSpPr>
-        <p:spPr/>
-      </p:sp>
-      <p:sp>
-        <p:nvSpPr>
-          <p:cNvPr id="3" name="Notes Placeholder 2"/>
-          <p:cNvSpPr>
-            <a:spLocks noGrp="1"/>
-          </p:cNvSpPr>
-          <p:nvPr>
-            <p:ph type="body" idx="1"/>
-          </p:nvPr>
-        </p:nvSpPr>
-        <p:spPr/>
-        <p:txBody>
-          <a:bodyPr/>
-          <a:lstStyle/>
-          <a:p>
-            <a:pPr marL="0" marR="0" lvl="0" indent="0" algn="l" defTabSz="914400" rtl="0" eaLnBrk="1" fontAlgn="auto" latinLnBrk="0" hangingPunct="1">
-              <a:lnSpc>
-                <a:spcPct val="100000"/>
-              </a:lnSpc>
-              <a:spcBef>
-                <a:spcPts val="0"/>
-              </a:spcBef>
-              <a:spcAft>
-                <a:spcPts val="0"/>
-              </a:spcAft>
-              <a:buClrTx/>
-              <a:buSzTx/>
-              <a:buFontTx/>
-              <a:buNone/>
-              <a:tabLst/>
-              <a:defRPr/>
-            </a:pPr>
-            <a:r>
-              <a:rPr lang="en-US" dirty="0"/>
-              <a:t>Focusing on the primary goal: To complete the diagram, need to have the PDE parameters, the </a:t>
-            </a:r>
-            <a:r>
-              <a:rPr lang="en-US" dirty="0" err="1"/>
-              <a:t>Fokas</a:t>
-            </a:r>
-            <a:r>
-              <a:rPr lang="en-US" dirty="0"/>
-              <a:t> transform pairs, and know how to find the ODE solution.</a:t>
-            </a:r>
-          </a:p>
-          <a:p>
-            <a:pPr marL="0" marR="0" lvl="0" indent="0" algn="l" defTabSz="914400" rtl="0" eaLnBrk="1" fontAlgn="auto" latinLnBrk="0" hangingPunct="1">
-              <a:lnSpc>
-                <a:spcPct val="100000"/>
-              </a:lnSpc>
-              <a:spcBef>
-                <a:spcPts val="0"/>
-              </a:spcBef>
-              <a:spcAft>
-                <a:spcPts val="0"/>
-              </a:spcAft>
-              <a:buClrTx/>
-              <a:buSzTx/>
-              <a:buFontTx/>
-              <a:buNone/>
-              <a:tabLst/>
-              <a:defRPr/>
-            </a:pPr>
-            <a:endParaRPr lang="en-US" dirty="0"/>
-          </a:p>
-          <a:p>
-            <a:pPr marL="228600" marR="0" lvl="0" indent="-228600" algn="l" defTabSz="914400" rtl="0" eaLnBrk="1" fontAlgn="auto" latinLnBrk="0" hangingPunct="1">
-              <a:lnSpc>
-                <a:spcPct val="100000"/>
-              </a:lnSpc>
-              <a:spcBef>
-                <a:spcPts val="0"/>
-              </a:spcBef>
-              <a:spcAft>
-                <a:spcPts val="0"/>
-              </a:spcAft>
-              <a:buClrTx/>
-              <a:buSzTx/>
-              <a:buFontTx/>
-              <a:buAutoNum type="arabicPeriod"/>
-              <a:tabLst/>
-              <a:defRPr/>
-            </a:pPr>
-            <a:r>
-              <a:rPr lang="en-US" dirty="0"/>
-              <a:t>Finished encoding or constructing the PDE parameters needed to find the </a:t>
-            </a:r>
-            <a:r>
-              <a:rPr lang="en-US" dirty="0" err="1"/>
-              <a:t>Fokas</a:t>
-            </a:r>
-            <a:r>
-              <a:rPr lang="en-US" dirty="0"/>
-              <a:t> transform pair. Some parameters can be taken directly from the given problem, some need to be constructed and require more work. But they are now done.</a:t>
-            </a:r>
-          </a:p>
-          <a:p>
-            <a:pPr marL="228600" marR="0" lvl="0" indent="-228600" algn="l" defTabSz="914400" rtl="0" eaLnBrk="1" fontAlgn="auto" latinLnBrk="0" hangingPunct="1">
-              <a:lnSpc>
-                <a:spcPct val="100000"/>
-              </a:lnSpc>
-              <a:spcBef>
-                <a:spcPts val="0"/>
-              </a:spcBef>
-              <a:spcAft>
-                <a:spcPts val="0"/>
-              </a:spcAft>
-              <a:buClrTx/>
-              <a:buSzTx/>
-              <a:buFontTx/>
-              <a:buAutoNum type="arabicPeriod"/>
-              <a:tabLst/>
-              <a:defRPr/>
-            </a:pPr>
-            <a:r>
-              <a:rPr lang="en-US" dirty="0"/>
-              <a:t>Now working on implementing the algorithm to find the appropriate </a:t>
-            </a:r>
-            <a:r>
-              <a:rPr lang="en-US" dirty="0" err="1"/>
-              <a:t>Fokas</a:t>
-            </a:r>
-            <a:r>
-              <a:rPr lang="en-US" dirty="0"/>
-              <a:t> transform pair based on the PDE parameters previously constructed.</a:t>
-            </a:r>
-          </a:p>
-          <a:p>
-            <a:pPr marL="228600" marR="0" lvl="0" indent="-228600" algn="l" defTabSz="914400" rtl="0" eaLnBrk="1" fontAlgn="auto" latinLnBrk="0" hangingPunct="1">
-              <a:lnSpc>
-                <a:spcPct val="100000"/>
-              </a:lnSpc>
-              <a:spcBef>
-                <a:spcPts val="0"/>
-              </a:spcBef>
-              <a:spcAft>
-                <a:spcPts val="0"/>
-              </a:spcAft>
-              <a:buClrTx/>
-              <a:buSzTx/>
-              <a:buFontTx/>
-              <a:buAutoNum type="arabicPeriod"/>
-              <a:tabLst/>
-              <a:defRPr/>
-            </a:pPr>
-            <a:r>
-              <a:rPr lang="en-US" dirty="0"/>
-              <a:t>Last step: Implement the algorithm to solve the ODE resulting form the </a:t>
-            </a:r>
-            <a:r>
-              <a:rPr lang="en-US" dirty="0" err="1"/>
-              <a:t>Fokas</a:t>
-            </a:r>
-            <a:r>
-              <a:rPr lang="en-US" dirty="0"/>
-              <a:t> transform, so that when we apply the inverse </a:t>
-            </a:r>
-            <a:r>
-              <a:rPr lang="en-US" dirty="0" err="1"/>
-              <a:t>Fokas</a:t>
-            </a:r>
-            <a:r>
-              <a:rPr lang="en-US" dirty="0"/>
-              <a:t> transform, we get the PDE solution.</a:t>
-            </a:r>
-          </a:p>
-        </p:txBody>
-      </p:sp>
-      <p:sp>
-        <p:nvSpPr>
-          <p:cNvPr id="4" name="Slide Number Placeholder 3"/>
-          <p:cNvSpPr>
-            <a:spLocks noGrp="1"/>
-          </p:cNvSpPr>
-          <p:nvPr>
-            <p:ph type="sldNum" sz="quarter" idx="5"/>
-          </p:nvPr>
-        </p:nvSpPr>
-        <p:spPr/>
-        <p:txBody>
-          <a:bodyPr/>
-          <a:lstStyle/>
-          <a:p>
-            <a:fld id="{C0AE9E3C-4D80-4F32-8BE5-275D74EA0A70}" type="slidenum">
-              <a:rPr lang="en-US" smtClean="0"/>
-              <a:t>12</a:t>
-            </a:fld>
-            <a:endParaRPr lang="en-US"/>
-          </a:p>
-        </p:txBody>
-      </p:sp>
-    </p:spTree>
-    <p:extLst>
-      <p:ext uri="{BB962C8B-B14F-4D97-AF65-F5344CB8AC3E}">
-        <p14:creationId xmlns:p14="http://schemas.microsoft.com/office/powerpoint/2010/main" val="309454526"/>
+        <p14:creationId xmlns:p14="http://schemas.microsoft.com/office/powerpoint/2010/main" val="2000965801"/>
       </p:ext>
     </p:extLst>
   </p:cSld>
@@ -1579,7 +1762,7 @@
           <a:p>
             <a:fld id="{743D5B1A-E5B9-41B2-A4A4-BC15EE566FEB}" type="datetime1">
               <a:rPr lang="en-US" smtClean="0"/>
-              <a:t>10/24/2018</a:t>
+              <a:t>10/28/2018</a:t>
             </a:fld>
             <a:endParaRPr lang="en-US"/>
           </a:p>
@@ -1777,7 +1960,7 @@
           <a:p>
             <a:fld id="{96850174-28E0-4A7F-9A7F-1D3666E9A7E5}" type="datetime1">
               <a:rPr lang="en-US" smtClean="0"/>
-              <a:t>10/24/2018</a:t>
+              <a:t>10/28/2018</a:t>
             </a:fld>
             <a:endParaRPr lang="en-US"/>
           </a:p>
@@ -1985,7 +2168,7 @@
           <a:p>
             <a:fld id="{06C3B4AE-98D8-467E-B13B-BA07FD493EF0}" type="datetime1">
               <a:rPr lang="en-US" smtClean="0"/>
-              <a:t>10/24/2018</a:t>
+              <a:t>10/28/2018</a:t>
             </a:fld>
             <a:endParaRPr lang="en-US"/>
           </a:p>
@@ -2202,7 +2385,7 @@
           <a:p>
             <a:fld id="{2E8C54B8-8BAA-472C-810E-6899C25BB322}" type="datetime1">
               <a:rPr lang="en-US" smtClean="0"/>
-              <a:t>10/24/2018</a:t>
+              <a:t>10/28/2018</a:t>
             </a:fld>
             <a:endParaRPr lang="en-US"/>
           </a:p>
@@ -2477,7 +2660,7 @@
           <a:p>
             <a:fld id="{CC0D8F71-0E54-4C2D-878F-974D77493300}" type="datetime1">
               <a:rPr lang="en-US" smtClean="0"/>
-              <a:t>10/24/2018</a:t>
+              <a:t>10/28/2018</a:t>
             </a:fld>
             <a:endParaRPr lang="en-US"/>
           </a:p>
@@ -2742,7 +2925,7 @@
           <a:p>
             <a:fld id="{03B724D8-50C5-4155-93C4-91B7560F528B}" type="datetime1">
               <a:rPr lang="en-US" smtClean="0"/>
-              <a:t>10/24/2018</a:t>
+              <a:t>10/28/2018</a:t>
             </a:fld>
             <a:endParaRPr lang="en-US"/>
           </a:p>
@@ -3154,7 +3337,7 @@
           <a:p>
             <a:fld id="{D349CC33-BA31-4C58-BC94-66A1D63C8B76}" type="datetime1">
               <a:rPr lang="en-US" smtClean="0"/>
-              <a:t>10/24/2018</a:t>
+              <a:t>10/28/2018</a:t>
             </a:fld>
             <a:endParaRPr lang="en-US"/>
           </a:p>
@@ -3295,7 +3478,7 @@
           <a:p>
             <a:fld id="{EA0D023E-CC73-4DDA-A566-0E148E9E0CA2}" type="datetime1">
               <a:rPr lang="en-US" smtClean="0"/>
-              <a:t>10/24/2018</a:t>
+              <a:t>10/28/2018</a:t>
             </a:fld>
             <a:endParaRPr lang="en-US"/>
           </a:p>
@@ -3408,7 +3591,7 @@
           <a:p>
             <a:fld id="{0BB7F487-1AB1-462C-9F23-505E165EB2E2}" type="datetime1">
               <a:rPr lang="en-US" smtClean="0"/>
-              <a:t>10/24/2018</a:t>
+              <a:t>10/28/2018</a:t>
             </a:fld>
             <a:endParaRPr lang="en-US"/>
           </a:p>
@@ -3719,7 +3902,7 @@
           <a:p>
             <a:fld id="{BB79D818-7B31-4B18-9D61-17C981FE4C8D}" type="datetime1">
               <a:rPr lang="en-US" smtClean="0"/>
-              <a:t>10/24/2018</a:t>
+              <a:t>10/28/2018</a:t>
             </a:fld>
             <a:endParaRPr lang="en-US"/>
           </a:p>
@@ -4007,7 +4190,7 @@
           <a:p>
             <a:fld id="{31D16347-A1A3-40FD-A0AF-D3C5B64BCF98}" type="datetime1">
               <a:rPr lang="en-US" smtClean="0"/>
-              <a:t>10/24/2018</a:t>
+              <a:t>10/28/2018</a:t>
             </a:fld>
             <a:endParaRPr lang="en-US"/>
           </a:p>
@@ -4248,7 +4431,7 @@
           <a:p>
             <a:fld id="{4690E525-EBCB-416D-B630-9C89D51ABD08}" type="datetime1">
               <a:rPr lang="en-US" smtClean="0"/>
-              <a:t>10/24/2018</a:t>
+              <a:t>10/28/2018</a:t>
             </a:fld>
             <a:endParaRPr lang="en-US"/>
           </a:p>
@@ -4808,7 +4991,10 @@
               <a:rPr lang="en-US" smtClean="0"/>
               <a:t>1</a:t>
             </a:fld>
-            <a:endParaRPr lang="en-US"/>
+            <a:r>
+              <a:rPr lang="en-US" dirty="0"/>
+              <a:t>/12</a:t>
+            </a:r>
           </a:p>
         </p:txBody>
       </p:sp>
@@ -5026,7 +5212,10 @@
               <a:rPr lang="en-US" smtClean="0"/>
               <a:t>10</a:t>
             </a:fld>
-            <a:endParaRPr lang="en-US"/>
+            <a:r>
+              <a:rPr lang="en-US" dirty="0"/>
+              <a:t>/12</a:t>
+            </a:r>
           </a:p>
         </p:txBody>
       </p:sp>
@@ -5171,7 +5360,10 @@
               <a:rPr lang="en-US" smtClean="0"/>
               <a:t>11</a:t>
             </a:fld>
-            <a:endParaRPr lang="en-US"/>
+            <a:r>
+              <a:rPr lang="en-US" dirty="0"/>
+              <a:t>/12</a:t>
+            </a:r>
           </a:p>
         </p:txBody>
       </p:sp>
@@ -5189,841 +5381,6 @@
 </file>
 
 <file path=ppt/slides/slide12.xml><?xml version="1.0" encoding="utf-8"?>
-<p:sld xmlns:a="http://schemas.openxmlformats.org/drawingml/2006/main" xmlns:r="http://schemas.openxmlformats.org/officeDocument/2006/relationships" xmlns:p="http://schemas.openxmlformats.org/presentationml/2006/main" show="0">
-  <p:cSld>
-    <p:spTree>
-      <p:nvGrpSpPr>
-        <p:cNvPr id="1" name=""/>
-        <p:cNvGrpSpPr/>
-        <p:nvPr/>
-      </p:nvGrpSpPr>
-      <p:grpSpPr>
-        <a:xfrm>
-          <a:off x="0" y="0"/>
-          <a:ext cx="0" cy="0"/>
-          <a:chOff x="0" y="0"/>
-          <a:chExt cx="0" cy="0"/>
-        </a:xfrm>
-      </p:grpSpPr>
-      <p:sp>
-        <p:nvSpPr>
-          <p:cNvPr id="2" name="Title 1">
-            <a:extLst>
-              <a:ext uri="{FF2B5EF4-FFF2-40B4-BE49-F238E27FC236}">
-                <a16:creationId xmlns:a16="http://schemas.microsoft.com/office/drawing/2014/main" id="{2EB59BB1-CD0A-4244-8DEF-DD3CD08C78A2}"/>
-              </a:ext>
-            </a:extLst>
-          </p:cNvPr>
-          <p:cNvSpPr>
-            <a:spLocks noGrp="1"/>
-          </p:cNvSpPr>
-          <p:nvPr>
-            <p:ph type="title"/>
-          </p:nvPr>
-        </p:nvSpPr>
-        <p:spPr/>
-        <p:txBody>
-          <a:bodyPr/>
-          <a:lstStyle/>
-          <a:p>
-            <a:r>
-              <a:rPr lang="en-US" dirty="0"/>
-              <a:t>Capstone outline</a:t>
-            </a:r>
-          </a:p>
-        </p:txBody>
-      </p:sp>
-      <p:sp>
-        <p:nvSpPr>
-          <p:cNvPr id="3" name="Content Placeholder 2">
-            <a:extLst>
-              <a:ext uri="{FF2B5EF4-FFF2-40B4-BE49-F238E27FC236}">
-                <a16:creationId xmlns:a16="http://schemas.microsoft.com/office/drawing/2014/main" id="{D215A1B0-7E78-4C4C-AF67-5ACD0A22475E}"/>
-              </a:ext>
-            </a:extLst>
-          </p:cNvPr>
-          <p:cNvSpPr>
-            <a:spLocks noGrp="1"/>
-          </p:cNvSpPr>
-          <p:nvPr>
-            <p:ph idx="1"/>
-          </p:nvPr>
-        </p:nvSpPr>
-        <p:spPr/>
-        <p:txBody>
-          <a:bodyPr/>
-          <a:lstStyle/>
-          <a:p>
-            <a:r>
-              <a:rPr lang="en-US" dirty="0"/>
-              <a:t>Progress</a:t>
-            </a:r>
-          </a:p>
-        </p:txBody>
-      </p:sp>
-      <p:sp>
-        <p:nvSpPr>
-          <p:cNvPr id="4" name="Slide Number Placeholder 3">
-            <a:extLst>
-              <a:ext uri="{FF2B5EF4-FFF2-40B4-BE49-F238E27FC236}">
-                <a16:creationId xmlns:a16="http://schemas.microsoft.com/office/drawing/2014/main" id="{202DAD29-2EF5-43DD-9D0C-CBCC8F564E13}"/>
-              </a:ext>
-            </a:extLst>
-          </p:cNvPr>
-          <p:cNvSpPr>
-            <a:spLocks noGrp="1"/>
-          </p:cNvSpPr>
-          <p:nvPr>
-            <p:ph type="sldNum" sz="quarter" idx="12"/>
-          </p:nvPr>
-        </p:nvSpPr>
-        <p:spPr/>
-        <p:txBody>
-          <a:bodyPr/>
-          <a:lstStyle/>
-          <a:p>
-            <a:fld id="{F3332EFC-B9C2-4EF3-A733-16B7EBFB30C8}" type="slidenum">
-              <a:rPr lang="en-US" smtClean="0">
-                <a:solidFill>
-                  <a:schemeClr val="bg1">
-                    <a:lumMod val="65000"/>
-                  </a:schemeClr>
-                </a:solidFill>
-              </a:rPr>
-              <a:t>12</a:t>
-            </a:fld>
-            <a:endParaRPr lang="en-US">
-              <a:solidFill>
-                <a:schemeClr val="bg1">
-                  <a:lumMod val="65000"/>
-                </a:schemeClr>
-              </a:solidFill>
-            </a:endParaRPr>
-          </a:p>
-        </p:txBody>
-      </p:sp>
-      <p:sp>
-        <p:nvSpPr>
-          <p:cNvPr id="7" name="Rectangle: Rounded Corners 6">
-            <a:extLst>
-              <a:ext uri="{FF2B5EF4-FFF2-40B4-BE49-F238E27FC236}">
-                <a16:creationId xmlns:a16="http://schemas.microsoft.com/office/drawing/2014/main" id="{477E647D-4DCD-4792-828E-F8F08A47F803}"/>
-              </a:ext>
-            </a:extLst>
-          </p:cNvPr>
-          <p:cNvSpPr/>
-          <p:nvPr/>
-        </p:nvSpPr>
-        <p:spPr>
-          <a:xfrm>
-            <a:off x="1732722" y="5014085"/>
-            <a:ext cx="2544418" cy="1162878"/>
-          </a:xfrm>
-          <a:prstGeom prst="roundRect">
-            <a:avLst/>
-          </a:prstGeom>
-        </p:spPr>
-        <p:style>
-          <a:lnRef idx="2">
-            <a:schemeClr val="dk1"/>
-          </a:lnRef>
-          <a:fillRef idx="1">
-            <a:schemeClr val="lt1"/>
-          </a:fillRef>
-          <a:effectRef idx="0">
-            <a:schemeClr val="dk1"/>
-          </a:effectRef>
-          <a:fontRef idx="minor">
-            <a:schemeClr val="dk1"/>
-          </a:fontRef>
-        </p:style>
-        <p:txBody>
-          <a:bodyPr rtlCol="0" anchor="ctr"/>
-          <a:lstStyle/>
-          <a:p>
-            <a:pPr algn="ctr"/>
-            <a:r>
-              <a:rPr lang="en-US" sz="2800" dirty="0">
-                <a:solidFill>
-                  <a:schemeClr val="tx1"/>
-                </a:solidFill>
-              </a:rPr>
-              <a:t>PDE</a:t>
-            </a:r>
-          </a:p>
-          <a:p>
-            <a:pPr algn="ctr"/>
-            <a:r>
-              <a:rPr lang="en-US" sz="2400" dirty="0">
-                <a:solidFill>
-                  <a:schemeClr val="tx1"/>
-                </a:solidFill>
-              </a:rPr>
-              <a:t>(with certain parameters)</a:t>
-            </a:r>
-          </a:p>
-        </p:txBody>
-      </p:sp>
-      <p:sp>
-        <p:nvSpPr>
-          <p:cNvPr id="8" name="Rectangle: Rounded Corners 7">
-            <a:extLst>
-              <a:ext uri="{FF2B5EF4-FFF2-40B4-BE49-F238E27FC236}">
-                <a16:creationId xmlns:a16="http://schemas.microsoft.com/office/drawing/2014/main" id="{234FA807-0F1C-413F-96C9-53DEB0D464C8}"/>
-              </a:ext>
-            </a:extLst>
-          </p:cNvPr>
-          <p:cNvSpPr/>
-          <p:nvPr/>
-        </p:nvSpPr>
-        <p:spPr>
-          <a:xfrm>
-            <a:off x="1732722" y="2482920"/>
-            <a:ext cx="2544418" cy="1162878"/>
-          </a:xfrm>
-          <a:prstGeom prst="roundRect">
-            <a:avLst/>
-          </a:prstGeom>
-          <a:ln>
-            <a:solidFill>
-              <a:schemeClr val="bg1">
-                <a:lumMod val="65000"/>
-              </a:schemeClr>
-            </a:solidFill>
-          </a:ln>
-        </p:spPr>
-        <p:style>
-          <a:lnRef idx="2">
-            <a:schemeClr val="dk1"/>
-          </a:lnRef>
-          <a:fillRef idx="1">
-            <a:schemeClr val="lt1"/>
-          </a:fillRef>
-          <a:effectRef idx="0">
-            <a:schemeClr val="dk1"/>
-          </a:effectRef>
-          <a:fontRef idx="minor">
-            <a:schemeClr val="dk1"/>
-          </a:fontRef>
-        </p:style>
-        <p:txBody>
-          <a:bodyPr rtlCol="0" anchor="ctr"/>
-          <a:lstStyle/>
-          <a:p>
-            <a:pPr algn="ctr"/>
-            <a:r>
-              <a:rPr lang="en-US" sz="2800" dirty="0">
-                <a:solidFill>
-                  <a:schemeClr val="bg1">
-                    <a:lumMod val="65000"/>
-                  </a:schemeClr>
-                </a:solidFill>
-              </a:rPr>
-              <a:t>ODE</a:t>
-            </a:r>
-          </a:p>
-        </p:txBody>
-      </p:sp>
-      <p:cxnSp>
-        <p:nvCxnSpPr>
-          <p:cNvPr id="9" name="Straight Arrow Connector 8">
-            <a:extLst>
-              <a:ext uri="{FF2B5EF4-FFF2-40B4-BE49-F238E27FC236}">
-                <a16:creationId xmlns:a16="http://schemas.microsoft.com/office/drawing/2014/main" id="{9C701BA7-49A9-4470-A37E-E0DBDAFD35B7}"/>
-              </a:ext>
-            </a:extLst>
-          </p:cNvPr>
-          <p:cNvCxnSpPr/>
-          <p:nvPr/>
-        </p:nvCxnSpPr>
-        <p:spPr>
-          <a:xfrm flipV="1">
-            <a:off x="3004931" y="3645798"/>
-            <a:ext cx="0" cy="1368287"/>
-          </a:xfrm>
-          <a:prstGeom prst="straightConnector1">
-            <a:avLst/>
-          </a:prstGeom>
-          <a:ln>
-            <a:prstDash val="solid"/>
-            <a:tailEnd type="triangle"/>
-          </a:ln>
-        </p:spPr>
-        <p:style>
-          <a:lnRef idx="1">
-            <a:schemeClr val="dk1"/>
-          </a:lnRef>
-          <a:fillRef idx="0">
-            <a:schemeClr val="dk1"/>
-          </a:fillRef>
-          <a:effectRef idx="0">
-            <a:schemeClr val="dk1"/>
-          </a:effectRef>
-          <a:fontRef idx="minor">
-            <a:schemeClr val="tx1"/>
-          </a:fontRef>
-        </p:style>
-      </p:cxnSp>
-      <p:sp>
-        <p:nvSpPr>
-          <p:cNvPr id="10" name="Rectangle: Rounded Corners 9">
-            <a:extLst>
-              <a:ext uri="{FF2B5EF4-FFF2-40B4-BE49-F238E27FC236}">
-                <a16:creationId xmlns:a16="http://schemas.microsoft.com/office/drawing/2014/main" id="{39E0394B-01E8-48F5-939B-EE224AB3B055}"/>
-              </a:ext>
-            </a:extLst>
-          </p:cNvPr>
-          <p:cNvSpPr/>
-          <p:nvPr/>
-        </p:nvSpPr>
-        <p:spPr>
-          <a:xfrm>
-            <a:off x="7437782" y="5014085"/>
-            <a:ext cx="2544418" cy="1162878"/>
-          </a:xfrm>
-          <a:prstGeom prst="roundRect">
-            <a:avLst/>
-          </a:prstGeom>
-          <a:ln>
-            <a:solidFill>
-              <a:schemeClr val="bg1">
-                <a:lumMod val="65000"/>
-              </a:schemeClr>
-            </a:solidFill>
-          </a:ln>
-        </p:spPr>
-        <p:style>
-          <a:lnRef idx="2">
-            <a:schemeClr val="dk1"/>
-          </a:lnRef>
-          <a:fillRef idx="1">
-            <a:schemeClr val="lt1"/>
-          </a:fillRef>
-          <a:effectRef idx="0">
-            <a:schemeClr val="dk1"/>
-          </a:effectRef>
-          <a:fontRef idx="minor">
-            <a:schemeClr val="dk1"/>
-          </a:fontRef>
-        </p:style>
-        <p:txBody>
-          <a:bodyPr rtlCol="0" anchor="ctr"/>
-          <a:lstStyle/>
-          <a:p>
-            <a:pPr algn="ctr"/>
-            <a:r>
-              <a:rPr lang="en-US" sz="2800" dirty="0">
-                <a:solidFill>
-                  <a:schemeClr val="bg1">
-                    <a:lumMod val="65000"/>
-                  </a:schemeClr>
-                </a:solidFill>
-              </a:rPr>
-              <a:t>PDE solution</a:t>
-            </a:r>
-          </a:p>
-        </p:txBody>
-      </p:sp>
-      <p:sp>
-        <p:nvSpPr>
-          <p:cNvPr id="11" name="Rectangle: Rounded Corners 10">
-            <a:extLst>
-              <a:ext uri="{FF2B5EF4-FFF2-40B4-BE49-F238E27FC236}">
-                <a16:creationId xmlns:a16="http://schemas.microsoft.com/office/drawing/2014/main" id="{255F1536-A156-4537-AD34-647B571FFF1A}"/>
-              </a:ext>
-            </a:extLst>
-          </p:cNvPr>
-          <p:cNvSpPr/>
-          <p:nvPr/>
-        </p:nvSpPr>
-        <p:spPr>
-          <a:xfrm>
-            <a:off x="7437782" y="2482920"/>
-            <a:ext cx="2544418" cy="1162878"/>
-          </a:xfrm>
-          <a:prstGeom prst="roundRect">
-            <a:avLst/>
-          </a:prstGeom>
-          <a:ln>
-            <a:solidFill>
-              <a:schemeClr val="bg1">
-                <a:lumMod val="65000"/>
-              </a:schemeClr>
-            </a:solidFill>
-          </a:ln>
-        </p:spPr>
-        <p:style>
-          <a:lnRef idx="2">
-            <a:schemeClr val="dk1"/>
-          </a:lnRef>
-          <a:fillRef idx="1">
-            <a:schemeClr val="lt1"/>
-          </a:fillRef>
-          <a:effectRef idx="0">
-            <a:schemeClr val="dk1"/>
-          </a:effectRef>
-          <a:fontRef idx="minor">
-            <a:schemeClr val="dk1"/>
-          </a:fontRef>
-        </p:style>
-        <p:txBody>
-          <a:bodyPr rtlCol="0" anchor="ctr"/>
-          <a:lstStyle/>
-          <a:p>
-            <a:pPr algn="ctr"/>
-            <a:r>
-              <a:rPr lang="en-US" sz="2800" dirty="0">
-                <a:solidFill>
-                  <a:schemeClr val="bg1">
-                    <a:lumMod val="65000"/>
-                  </a:schemeClr>
-                </a:solidFill>
-              </a:rPr>
-              <a:t>ODE solution</a:t>
-            </a:r>
-          </a:p>
-        </p:txBody>
-      </p:sp>
-      <p:cxnSp>
-        <p:nvCxnSpPr>
-          <p:cNvPr id="12" name="Straight Arrow Connector 11">
-            <a:extLst>
-              <a:ext uri="{FF2B5EF4-FFF2-40B4-BE49-F238E27FC236}">
-                <a16:creationId xmlns:a16="http://schemas.microsoft.com/office/drawing/2014/main" id="{D2AFB6B5-E275-4736-A25D-769F527A0342}"/>
-              </a:ext>
-            </a:extLst>
-          </p:cNvPr>
-          <p:cNvCxnSpPr>
-            <a:cxnSpLocks/>
-          </p:cNvCxnSpPr>
-          <p:nvPr/>
-        </p:nvCxnSpPr>
-        <p:spPr>
-          <a:xfrm>
-            <a:off x="4277140" y="3064359"/>
-            <a:ext cx="3160642" cy="0"/>
-          </a:xfrm>
-          <a:prstGeom prst="straightConnector1">
-            <a:avLst/>
-          </a:prstGeom>
-          <a:ln>
-            <a:solidFill>
-              <a:schemeClr val="bg1">
-                <a:lumMod val="65000"/>
-              </a:schemeClr>
-            </a:solidFill>
-            <a:tailEnd type="triangle"/>
-          </a:ln>
-        </p:spPr>
-        <p:style>
-          <a:lnRef idx="1">
-            <a:schemeClr val="dk1"/>
-          </a:lnRef>
-          <a:fillRef idx="0">
-            <a:schemeClr val="dk1"/>
-          </a:fillRef>
-          <a:effectRef idx="0">
-            <a:schemeClr val="dk1"/>
-          </a:effectRef>
-          <a:fontRef idx="minor">
-            <a:schemeClr val="tx1"/>
-          </a:fontRef>
-        </p:style>
-      </p:cxnSp>
-      <p:cxnSp>
-        <p:nvCxnSpPr>
-          <p:cNvPr id="13" name="Straight Arrow Connector 12">
-            <a:extLst>
-              <a:ext uri="{FF2B5EF4-FFF2-40B4-BE49-F238E27FC236}">
-                <a16:creationId xmlns:a16="http://schemas.microsoft.com/office/drawing/2014/main" id="{A72F9DBB-DDD0-4A55-A218-7CD966F5A51C}"/>
-              </a:ext>
-            </a:extLst>
-          </p:cNvPr>
-          <p:cNvCxnSpPr/>
-          <p:nvPr/>
-        </p:nvCxnSpPr>
-        <p:spPr>
-          <a:xfrm>
-            <a:off x="8709991" y="3645798"/>
-            <a:ext cx="0" cy="1368287"/>
-          </a:xfrm>
-          <a:prstGeom prst="straightConnector1">
-            <a:avLst/>
-          </a:prstGeom>
-          <a:ln>
-            <a:tailEnd type="triangle"/>
-          </a:ln>
-        </p:spPr>
-        <p:style>
-          <a:lnRef idx="1">
-            <a:schemeClr val="dk1"/>
-          </a:lnRef>
-          <a:fillRef idx="0">
-            <a:schemeClr val="dk1"/>
-          </a:fillRef>
-          <a:effectRef idx="0">
-            <a:schemeClr val="dk1"/>
-          </a:effectRef>
-          <a:fontRef idx="minor">
-            <a:schemeClr val="tx1"/>
-          </a:fontRef>
-        </p:style>
-      </p:cxnSp>
-      <p:sp>
-        <p:nvSpPr>
-          <p:cNvPr id="15" name="TextBox 14">
-            <a:extLst>
-              <a:ext uri="{FF2B5EF4-FFF2-40B4-BE49-F238E27FC236}">
-                <a16:creationId xmlns:a16="http://schemas.microsoft.com/office/drawing/2014/main" id="{4A517629-1A28-4881-9444-62F36EFF83FF}"/>
-              </a:ext>
-            </a:extLst>
-          </p:cNvPr>
-          <p:cNvSpPr txBox="1"/>
-          <p:nvPr/>
-        </p:nvSpPr>
-        <p:spPr>
-          <a:xfrm>
-            <a:off x="4383162" y="3074804"/>
-            <a:ext cx="2948597" cy="461665"/>
-          </a:xfrm>
-          <a:prstGeom prst="rect">
-            <a:avLst/>
-          </a:prstGeom>
-          <a:noFill/>
-        </p:spPr>
-        <p:txBody>
-          <a:bodyPr wrap="square" rtlCol="0">
-            <a:spAutoFit/>
-          </a:bodyPr>
-          <a:lstStyle/>
-          <a:p>
-            <a:pPr algn="ctr"/>
-            <a:r>
-              <a:rPr lang="en-US" sz="2400" b="1" dirty="0">
-                <a:solidFill>
-                  <a:schemeClr val="bg1">
-                    <a:lumMod val="65000"/>
-                  </a:schemeClr>
-                </a:solidFill>
-              </a:rPr>
-              <a:t>Easy</a:t>
-            </a:r>
-          </a:p>
-        </p:txBody>
-      </p:sp>
-      <p:sp>
-        <p:nvSpPr>
-          <p:cNvPr id="16" name="TextBox 15">
-            <a:extLst>
-              <a:ext uri="{FF2B5EF4-FFF2-40B4-BE49-F238E27FC236}">
-                <a16:creationId xmlns:a16="http://schemas.microsoft.com/office/drawing/2014/main" id="{69064DA8-537E-4F97-9EC5-A669D5BA299A}"/>
-              </a:ext>
-            </a:extLst>
-          </p:cNvPr>
-          <p:cNvSpPr txBox="1"/>
-          <p:nvPr/>
-        </p:nvSpPr>
-        <p:spPr>
-          <a:xfrm>
-            <a:off x="4383162" y="5133859"/>
-            <a:ext cx="2948597" cy="461665"/>
-          </a:xfrm>
-          <a:prstGeom prst="rect">
-            <a:avLst/>
-          </a:prstGeom>
-          <a:noFill/>
-        </p:spPr>
-        <p:txBody>
-          <a:bodyPr wrap="square" rtlCol="0">
-            <a:spAutoFit/>
-          </a:bodyPr>
-          <a:lstStyle/>
-          <a:p>
-            <a:pPr algn="ctr"/>
-            <a:r>
-              <a:rPr lang="en-US" sz="2400" b="1" dirty="0">
-                <a:solidFill>
-                  <a:schemeClr val="bg1">
-                    <a:lumMod val="65000"/>
-                  </a:schemeClr>
-                </a:solidFill>
-              </a:rPr>
-              <a:t>H</a:t>
-            </a:r>
-            <a:r>
-              <a:rPr lang="en-US" altLang="zh-CN" sz="2400" b="1" dirty="0">
-                <a:solidFill>
-                  <a:schemeClr val="bg1">
-                    <a:lumMod val="65000"/>
-                  </a:schemeClr>
-                </a:solidFill>
-              </a:rPr>
-              <a:t>ard</a:t>
-            </a:r>
-            <a:endParaRPr lang="en-US" sz="2400" b="1" dirty="0">
-              <a:solidFill>
-                <a:schemeClr val="bg1">
-                  <a:lumMod val="65000"/>
-                </a:schemeClr>
-              </a:solidFill>
-            </a:endParaRPr>
-          </a:p>
-        </p:txBody>
-      </p:sp>
-      <p:cxnSp>
-        <p:nvCxnSpPr>
-          <p:cNvPr id="17" name="Straight Arrow Connector 16">
-            <a:extLst>
-              <a:ext uri="{FF2B5EF4-FFF2-40B4-BE49-F238E27FC236}">
-                <a16:creationId xmlns:a16="http://schemas.microsoft.com/office/drawing/2014/main" id="{18718E12-7293-4EEF-9C25-3BFAF43B0615}"/>
-              </a:ext>
-            </a:extLst>
-          </p:cNvPr>
-          <p:cNvCxnSpPr/>
-          <p:nvPr/>
-        </p:nvCxnSpPr>
-        <p:spPr>
-          <a:xfrm>
-            <a:off x="4277140" y="5595524"/>
-            <a:ext cx="3160642" cy="0"/>
-          </a:xfrm>
-          <a:prstGeom prst="straightConnector1">
-            <a:avLst/>
-          </a:prstGeom>
-          <a:ln>
-            <a:solidFill>
-              <a:schemeClr val="bg1">
-                <a:lumMod val="65000"/>
-              </a:schemeClr>
-            </a:solidFill>
-            <a:tailEnd type="triangle"/>
-          </a:ln>
-        </p:spPr>
-        <p:style>
-          <a:lnRef idx="1">
-            <a:schemeClr val="dk1"/>
-          </a:lnRef>
-          <a:fillRef idx="0">
-            <a:schemeClr val="dk1"/>
-          </a:fillRef>
-          <a:effectRef idx="0">
-            <a:schemeClr val="dk1"/>
-          </a:effectRef>
-          <a:fontRef idx="minor">
-            <a:schemeClr val="tx1"/>
-          </a:fontRef>
-        </p:style>
-      </p:cxnSp>
-      <p:sp>
-        <p:nvSpPr>
-          <p:cNvPr id="21" name="TextBox 20">
-            <a:extLst>
-              <a:ext uri="{FF2B5EF4-FFF2-40B4-BE49-F238E27FC236}">
-                <a16:creationId xmlns:a16="http://schemas.microsoft.com/office/drawing/2014/main" id="{342484A3-9C6E-496C-8DAE-A239F7D212C5}"/>
-              </a:ext>
-            </a:extLst>
-          </p:cNvPr>
-          <p:cNvSpPr txBox="1"/>
-          <p:nvPr/>
-        </p:nvSpPr>
-        <p:spPr>
-          <a:xfrm>
-            <a:off x="27876" y="3717006"/>
-            <a:ext cx="2948597" cy="1200329"/>
-          </a:xfrm>
-          <a:prstGeom prst="rect">
-            <a:avLst/>
-          </a:prstGeom>
-          <a:noFill/>
-        </p:spPr>
-        <p:txBody>
-          <a:bodyPr wrap="square" rtlCol="0">
-            <a:spAutoFit/>
-          </a:bodyPr>
-          <a:lstStyle/>
-          <a:p>
-            <a:pPr algn="ctr"/>
-            <a:r>
-              <a:rPr lang="en-US" sz="2400" dirty="0" err="1"/>
-              <a:t>Fokas</a:t>
-            </a:r>
-            <a:r>
-              <a:rPr lang="en-US" sz="2400" dirty="0"/>
-              <a:t> transform</a:t>
-            </a:r>
-          </a:p>
-          <a:p>
-            <a:pPr algn="ctr"/>
-            <a:r>
-              <a:rPr lang="en-US" sz="2400" dirty="0"/>
-              <a:t>(depends on PDE parameters)</a:t>
-            </a:r>
-          </a:p>
-        </p:txBody>
-      </p:sp>
-      <p:sp>
-        <p:nvSpPr>
-          <p:cNvPr id="22" name="TextBox 21">
-            <a:extLst>
-              <a:ext uri="{FF2B5EF4-FFF2-40B4-BE49-F238E27FC236}">
-                <a16:creationId xmlns:a16="http://schemas.microsoft.com/office/drawing/2014/main" id="{3E9750F2-96E2-4C45-BB83-1110ADD477A8}"/>
-              </a:ext>
-            </a:extLst>
-          </p:cNvPr>
-          <p:cNvSpPr txBox="1"/>
-          <p:nvPr/>
-        </p:nvSpPr>
-        <p:spPr>
-          <a:xfrm>
-            <a:off x="8979693" y="3717006"/>
-            <a:ext cx="2948597" cy="1200329"/>
-          </a:xfrm>
-          <a:prstGeom prst="rect">
-            <a:avLst/>
-          </a:prstGeom>
-          <a:noFill/>
-        </p:spPr>
-        <p:txBody>
-          <a:bodyPr wrap="square" rtlCol="0">
-            <a:spAutoFit/>
-          </a:bodyPr>
-          <a:lstStyle/>
-          <a:p>
-            <a:pPr algn="ctr"/>
-            <a:r>
-              <a:rPr lang="en-US" sz="2400" dirty="0"/>
-              <a:t>inverse transform</a:t>
-            </a:r>
-          </a:p>
-          <a:p>
-            <a:pPr algn="ctr"/>
-            <a:r>
-              <a:rPr lang="en-US" sz="2400" dirty="0"/>
-              <a:t>(depends on PDE parameters)</a:t>
-            </a:r>
-          </a:p>
-        </p:txBody>
-      </p:sp>
-    </p:spTree>
-    <p:extLst>
-      <p:ext uri="{BB962C8B-B14F-4D97-AF65-F5344CB8AC3E}">
-        <p14:creationId xmlns:p14="http://schemas.microsoft.com/office/powerpoint/2010/main" val="2033689713"/>
-      </p:ext>
-    </p:extLst>
-  </p:cSld>
-  <p:clrMapOvr>
-    <a:masterClrMapping/>
-  </p:clrMapOvr>
-  <p:timing>
-    <p:tnLst>
-      <p:par>
-        <p:cTn id="1" dur="indefinite" restart="never" nodeType="tmRoot">
-          <p:childTnLst>
-            <p:seq concurrent="1" nextAc="seek">
-              <p:cTn id="2" dur="indefinite" nodeType="mainSeq">
-                <p:childTnLst>
-                  <p:par>
-                    <p:cTn id="3" fill="hold">
-                      <p:stCondLst>
-                        <p:cond delay="indefinite"/>
-                      </p:stCondLst>
-                      <p:childTnLst>
-                        <p:par>
-                          <p:cTn id="4" fill="hold">
-                            <p:stCondLst>
-                              <p:cond delay="0"/>
-                            </p:stCondLst>
-                            <p:childTnLst>
-                              <p:par>
-                                <p:cTn id="5" presetID="1" presetClass="entr" presetSubtype="0" fill="hold" grpId="0" nodeType="clickEffect">
-                                  <p:stCondLst>
-                                    <p:cond delay="0"/>
-                                  </p:stCondLst>
-                                  <p:childTnLst>
-                                    <p:set>
-                                      <p:cBhvr>
-                                        <p:cTn id="6" dur="1" fill="hold">
-                                          <p:stCondLst>
-                                            <p:cond delay="0"/>
-                                          </p:stCondLst>
-                                        </p:cTn>
-                                        <p:tgtEl>
-                                          <p:spTgt spid="21"/>
-                                        </p:tgtEl>
-                                        <p:attrNameLst>
-                                          <p:attrName>style.visibility</p:attrName>
-                                        </p:attrNameLst>
-                                      </p:cBhvr>
-                                      <p:to>
-                                        <p:strVal val="visible"/>
-                                      </p:to>
-                                    </p:set>
-                                  </p:childTnLst>
-                                </p:cTn>
-                              </p:par>
-                              <p:par>
-                                <p:cTn id="7" presetID="1" presetClass="entr" presetSubtype="0" fill="hold" grpId="0" nodeType="withEffect">
-                                  <p:stCondLst>
-                                    <p:cond delay="0"/>
-                                  </p:stCondLst>
-                                  <p:childTnLst>
-                                    <p:set>
-                                      <p:cBhvr>
-                                        <p:cTn id="8" dur="1" fill="hold">
-                                          <p:stCondLst>
-                                            <p:cond delay="0"/>
-                                          </p:stCondLst>
-                                        </p:cTn>
-                                        <p:tgtEl>
-                                          <p:spTgt spid="22"/>
-                                        </p:tgtEl>
-                                        <p:attrNameLst>
-                                          <p:attrName>style.visibility</p:attrName>
-                                        </p:attrNameLst>
-                                      </p:cBhvr>
-                                      <p:to>
-                                        <p:strVal val="visible"/>
-                                      </p:to>
-                                    </p:set>
-                                  </p:childTnLst>
-                                </p:cTn>
-                              </p:par>
-                            </p:childTnLst>
-                          </p:cTn>
-                        </p:par>
-                      </p:childTnLst>
-                    </p:cTn>
-                  </p:par>
-                </p:childTnLst>
-              </p:cTn>
-              <p:prevCondLst>
-                <p:cond evt="onPrev" delay="0">
-                  <p:tgtEl>
-                    <p:sldTgt/>
-                  </p:tgtEl>
-                </p:cond>
-              </p:prevCondLst>
-              <p:nextCondLst>
-                <p:cond evt="onNext" delay="0">
-                  <p:tgtEl>
-                    <p:sldTgt/>
-                  </p:tgtEl>
-                </p:cond>
-              </p:nextCondLst>
-            </p:seq>
-          </p:childTnLst>
-        </p:cTn>
-      </p:par>
-    </p:tnLst>
-    <p:bldLst>
-      <p:bldP spid="21" grpId="0"/>
-      <p:bldP spid="22" grpId="0"/>
-    </p:bldLst>
-  </p:timing>
-</p:sld>
-</file>
-
-<file path=ppt/slides/slide13.xml><?xml version="1.0" encoding="utf-8"?>
 <p:sld xmlns:a="http://schemas.openxmlformats.org/drawingml/2006/main" xmlns:r="http://schemas.openxmlformats.org/officeDocument/2006/relationships" xmlns:p="http://schemas.openxmlformats.org/presentationml/2006/main">
   <p:cSld>
     <p:spTree>
@@ -6087,7 +5444,7 @@
         <p:spPr/>
         <p:txBody>
           <a:bodyPr>
-            <a:normAutofit lnSpcReduction="10000"/>
+            <a:normAutofit/>
           </a:bodyPr>
           <a:lstStyle/>
           <a:p>
@@ -6097,7 +5454,7 @@
             </a:pPr>
             <a:r>
               <a:rPr lang="en-US" dirty="0"/>
-              <a:t>Solving (complicated) PDEs usually requires ad-hoc methods that are often problem-specific and cannot be generalized to related PDEs.</a:t>
+              <a:t>Solving (complicated) PDEs usually requires ad-hoc methods that are often problem-specific and cannot be generalized to related PDEs with different parameters.</a:t>
             </a:r>
           </a:p>
           <a:p>
@@ -6161,7 +5518,7 @@
             </a:pPr>
             <a:r>
               <a:rPr lang="en-US" dirty="0"/>
-              <a:t>and (perhaps) numerical descriptions of them, which would help with visualizing PDE solutions.</a:t>
+              <a:t>and numerical descriptions of them.</a:t>
             </a:r>
           </a:p>
           <a:p>
@@ -6192,9 +5549,12 @@
           <a:p>
             <a:fld id="{F3332EFC-B9C2-4EF3-A733-16B7EBFB30C8}" type="slidenum">
               <a:rPr lang="en-US" smtClean="0"/>
-              <a:t>13</a:t>
+              <a:t>12</a:t>
             </a:fld>
-            <a:endParaRPr lang="en-US"/>
+            <a:r>
+              <a:rPr lang="en-US" dirty="0"/>
+              <a:t>/12</a:t>
+            </a:r>
           </a:p>
         </p:txBody>
       </p:sp>
@@ -6723,7 +6083,10 @@
               <a:rPr lang="en-US" smtClean="0"/>
               <a:t>2</a:t>
             </a:fld>
-            <a:endParaRPr lang="en-US"/>
+            <a:r>
+              <a:rPr lang="en-US" dirty="0"/>
+              <a:t>/12</a:t>
+            </a:r>
           </a:p>
         </p:txBody>
       </p:sp>
@@ -6944,7 +6307,10 @@
               <a:rPr lang="en-US" smtClean="0"/>
               <a:t>3</a:t>
             </a:fld>
-            <a:endParaRPr lang="en-US"/>
+            <a:r>
+              <a:rPr lang="en-US" dirty="0"/>
+              <a:t>/12</a:t>
+            </a:r>
           </a:p>
         </p:txBody>
       </p:sp>
@@ -7201,7 +6567,10 @@
               <a:rPr lang="en-US" smtClean="0"/>
               <a:t>4</a:t>
             </a:fld>
-            <a:endParaRPr lang="en-US"/>
+            <a:r>
+              <a:rPr lang="en-US" dirty="0"/>
+              <a:t>/12</a:t>
+            </a:r>
           </a:p>
         </p:txBody>
       </p:sp>
@@ -7316,7 +6685,10 @@
               <a:rPr lang="en-US" smtClean="0"/>
               <a:t>5</a:t>
             </a:fld>
-            <a:endParaRPr lang="en-US"/>
+            <a:r>
+              <a:rPr lang="en-US" dirty="0"/>
+              <a:t>/12</a:t>
+            </a:r>
           </a:p>
         </p:txBody>
       </p:sp>
@@ -8323,7 +7695,10 @@
               <a:rPr lang="en-US" smtClean="0"/>
               <a:t>6</a:t>
             </a:fld>
-            <a:endParaRPr lang="en-US"/>
+            <a:r>
+              <a:rPr lang="en-US" dirty="0"/>
+              <a:t>/12</a:t>
+            </a:r>
           </a:p>
         </p:txBody>
       </p:sp>
@@ -25290,7 +24665,10 @@
               <a:rPr lang="en-US" smtClean="0"/>
               <a:t>7</a:t>
             </a:fld>
-            <a:endParaRPr lang="en-US"/>
+            <a:r>
+              <a:rPr lang="en-US" dirty="0"/>
+              <a:t>/12</a:t>
+            </a:r>
           </a:p>
         </p:txBody>
       </p:sp>
@@ -26040,7 +25418,10 @@
               <a:rPr lang="en-US" smtClean="0"/>
               <a:t>8</a:t>
             </a:fld>
-            <a:endParaRPr lang="en-US"/>
+            <a:r>
+              <a:rPr lang="en-US" dirty="0"/>
+              <a:t>/12</a:t>
+            </a:r>
           </a:p>
         </p:txBody>
       </p:sp>
@@ -26239,7 +25620,10 @@
               <a:rPr lang="en-US" smtClean="0"/>
               <a:t>9</a:t>
             </a:fld>
-            <a:endParaRPr lang="en-US"/>
+            <a:r>
+              <a:rPr lang="en-US" dirty="0"/>
+              <a:t>/12</a:t>
+            </a:r>
           </a:p>
         </p:txBody>
       </p:sp>

</xml_diff>